<commit_message>
PowerPoint progress, screenshots of app added
</commit_message>
<xml_diff>
--- a/documents/Presentation.pptx
+++ b/documents/Presentation.pptx
@@ -8,6 +8,9 @@
     <p:sldId id="256" r:id="rId2"/>
     <p:sldId id="257" r:id="rId3"/>
     <p:sldId id="258" r:id="rId4"/>
+    <p:sldId id="261" r:id="rId5"/>
+    <p:sldId id="260" r:id="rId6"/>
+    <p:sldId id="259" r:id="rId7"/>
   </p:sldIdLst>
   <p:sldSz cx="9144000" cy="6858000" type="screen4x3"/>
   <p:notesSz cx="6858000" cy="9144000"/>
@@ -300,7 +303,7 @@
             <a:fld id="{1D8BD707-D9CF-40AE-B4C6-C98DA3205C09}" type="datetimeFigureOut">
               <a:rPr lang="en-US" smtClean="0"/>
               <a:pPr/>
-              <a:t>4/25/2013</a:t>
+              <a:t>4/30/2013</a:t>
             </a:fld>
             <a:endParaRPr lang="en-US"/>
           </a:p>
@@ -486,7 +489,7 @@
             <a:fld id="{1D8BD707-D9CF-40AE-B4C6-C98DA3205C09}" type="datetimeFigureOut">
               <a:rPr lang="en-US" smtClean="0"/>
               <a:pPr/>
-              <a:t>4/25/2013</a:t>
+              <a:t>4/30/2013</a:t>
             </a:fld>
             <a:endParaRPr lang="en-US"/>
           </a:p>
@@ -675,7 +678,7 @@
             <a:fld id="{1D8BD707-D9CF-40AE-B4C6-C98DA3205C09}" type="datetimeFigureOut">
               <a:rPr lang="en-US" smtClean="0"/>
               <a:pPr/>
-              <a:t>4/25/2013</a:t>
+              <a:t>4/30/2013</a:t>
             </a:fld>
             <a:endParaRPr lang="en-US"/>
           </a:p>
@@ -854,7 +857,7 @@
             <a:fld id="{1D8BD707-D9CF-40AE-B4C6-C98DA3205C09}" type="datetimeFigureOut">
               <a:rPr lang="en-US" smtClean="0"/>
               <a:pPr/>
-              <a:t>4/25/2013</a:t>
+              <a:t>4/30/2013</a:t>
             </a:fld>
             <a:endParaRPr lang="en-US"/>
           </a:p>
@@ -1116,7 +1119,7 @@
             <a:fld id="{1D8BD707-D9CF-40AE-B4C6-C98DA3205C09}" type="datetimeFigureOut">
               <a:rPr lang="en-US" smtClean="0"/>
               <a:pPr/>
-              <a:t>4/25/2013</a:t>
+              <a:t>4/30/2013</a:t>
             </a:fld>
             <a:endParaRPr lang="en-US"/>
           </a:p>
@@ -1420,7 +1423,7 @@
             <a:fld id="{1D8BD707-D9CF-40AE-B4C6-C98DA3205C09}" type="datetimeFigureOut">
               <a:rPr lang="en-US" smtClean="0"/>
               <a:pPr/>
-              <a:t>4/25/2013</a:t>
+              <a:t>4/30/2013</a:t>
             </a:fld>
             <a:endParaRPr lang="en-US"/>
           </a:p>
@@ -1557,11 +1560,11 @@
           </a:xfrm>
         </p:spPr>
         <p:txBody>
-          <a:bodyPr anchor="b"/>
+          <a:bodyPr anchor="t"/>
           <a:lstStyle>
-            <a:lvl1pPr marL="0" indent="0">
-              <a:buNone/>
-              <a:defRPr sz="2400" b="1"/>
+            <a:lvl1pPr marL="0" indent="0" algn="ctr">
+              <a:buNone/>
+              <a:defRPr sz="2400" b="1" spc="-100" baseline="0"/>
             </a:lvl1pPr>
             <a:lvl2pPr marL="457200" indent="0">
               <a:buNone/>
@@ -1707,11 +1710,11 @@
           </a:xfrm>
         </p:spPr>
         <p:txBody>
-          <a:bodyPr anchor="b"/>
+          <a:bodyPr anchor="t"/>
           <a:lstStyle>
-            <a:lvl1pPr marL="0" indent="0">
-              <a:buNone/>
-              <a:defRPr sz="2400" b="1"/>
+            <a:lvl1pPr marL="0" indent="0" algn="ctr">
+              <a:buNone/>
+              <a:defRPr sz="2400" b="1" spc="-100" baseline="0"/>
             </a:lvl1pPr>
             <a:lvl2pPr marL="457200" indent="0">
               <a:buNone/>
@@ -1858,7 +1861,7 @@
             <a:fld id="{1D8BD707-D9CF-40AE-B4C6-C98DA3205C09}" type="datetimeFigureOut">
               <a:rPr lang="en-US" smtClean="0"/>
               <a:pPr/>
-              <a:t>4/25/2013</a:t>
+              <a:t>4/30/2013</a:t>
             </a:fld>
             <a:endParaRPr lang="en-US"/>
           </a:p>
@@ -1985,7 +1988,7 @@
             <a:fld id="{1D8BD707-D9CF-40AE-B4C6-C98DA3205C09}" type="datetimeFigureOut">
               <a:rPr lang="en-US" smtClean="0"/>
               <a:pPr/>
-              <a:t>4/25/2013</a:t>
+              <a:t>4/30/2013</a:t>
             </a:fld>
             <a:endParaRPr lang="en-US"/>
           </a:p>
@@ -2089,7 +2092,7 @@
             <a:fld id="{1D8BD707-D9CF-40AE-B4C6-C98DA3205C09}" type="datetimeFigureOut">
               <a:rPr lang="en-US" smtClean="0"/>
               <a:pPr/>
-              <a:t>4/25/2013</a:t>
+              <a:t>4/30/2013</a:t>
             </a:fld>
             <a:endParaRPr lang="en-US"/>
           </a:p>
@@ -2375,7 +2378,7 @@
             <a:fld id="{1D8BD707-D9CF-40AE-B4C6-C98DA3205C09}" type="datetimeFigureOut">
               <a:rPr lang="en-US" smtClean="0"/>
               <a:pPr/>
-              <a:t>4/25/2013</a:t>
+              <a:t>4/30/2013</a:t>
             </a:fld>
             <a:endParaRPr lang="en-US"/>
           </a:p>
@@ -2637,7 +2640,7 @@
             <a:fld id="{1D8BD707-D9CF-40AE-B4C6-C98DA3205C09}" type="datetimeFigureOut">
               <a:rPr lang="en-US" smtClean="0"/>
               <a:pPr/>
-              <a:t>4/25/2013</a:t>
+              <a:t>4/30/2013</a:t>
             </a:fld>
             <a:endParaRPr lang="en-US"/>
           </a:p>
@@ -2912,7 +2915,7 @@
             <a:fld id="{1D8BD707-D9CF-40AE-B4C6-C98DA3205C09}" type="datetimeFigureOut">
               <a:rPr lang="en-US" smtClean="0"/>
               <a:pPr/>
-              <a:t>4/25/2013</a:t>
+              <a:t>4/30/2013</a:t>
             </a:fld>
             <a:endParaRPr lang="en-US"/>
           </a:p>
@@ -3329,14 +3332,16 @@
         </p:nvSpPr>
         <p:spPr/>
         <p:txBody>
-          <a:bodyPr/>
-          <a:lstStyle/>
-          <a:p>
-            <a:r>
-              <a:rPr lang="en-US" dirty="0" smtClean="0"/>
+          <a:bodyPr>
+            <a:normAutofit/>
+          </a:bodyPr>
+          <a:lstStyle/>
+          <a:p>
+            <a:r>
+              <a:rPr lang="en-US" sz="6000" dirty="0" smtClean="0"/>
               <a:t>Charter Fishing</a:t>
             </a:r>
-            <a:endParaRPr lang="en-US" dirty="0"/>
+            <a:endParaRPr lang="en-US" sz="6000" dirty="0"/>
           </a:p>
         </p:txBody>
       </p:sp>
@@ -3560,22 +3565,39 @@
               <a:t>It’s called </a:t>
             </a:r>
             <a:r>
-              <a:rPr lang="en-US" i="1" dirty="0" smtClean="0"/>
+              <a:rPr lang="en-US" b="1" dirty="0" smtClean="0"/>
               <a:t>Fish ‘n’ Spots</a:t>
             </a:r>
+          </a:p>
+          <a:p>
+            <a:r>
+              <a:rPr lang="en-US" dirty="0" smtClean="0"/>
+              <a:t>Check </a:t>
+            </a:r>
+            <a:r>
+              <a:rPr lang="en-US" dirty="0" smtClean="0"/>
+              <a:t>out </a:t>
+            </a:r>
+            <a:r>
+              <a:rPr lang="en-US" dirty="0" smtClean="0"/>
+              <a:t>our custom </a:t>
+            </a:r>
+            <a:r>
+              <a:rPr lang="en-US" dirty="0" smtClean="0"/>
+              <a:t>icon</a:t>
+            </a:r>
+            <a:r>
+              <a:rPr lang="en-US" dirty="0" smtClean="0"/>
+              <a:t>!</a:t>
+            </a:r>
+          </a:p>
+          <a:p>
+            <a:pPr lvl="1"/>
+            <a:r>
+              <a:rPr lang="en-US" dirty="0" smtClean="0"/>
+              <a:t>We haven’t yet decided what kind of fish that is</a:t>
+            </a:r>
             <a:endParaRPr lang="en-US" dirty="0" smtClean="0"/>
-          </a:p>
-          <a:p>
-            <a:r>
-              <a:rPr lang="en-US" dirty="0" smtClean="0"/>
-              <a:t>Built for Android v4.0 (Ice Cream Sandwich) and above</a:t>
-            </a:r>
-          </a:p>
-          <a:p>
-            <a:r>
-              <a:rPr lang="en-US" dirty="0" smtClean="0"/>
-              <a:t>Check out our icon!</a:t>
-            </a:r>
           </a:p>
         </p:txBody>
       </p:sp>
@@ -3612,6 +3634,437 @@
     <p:extLst>
       <p:ext uri="{BB962C8B-B14F-4D97-AF65-F5344CB8AC3E}">
         <p14:creationId xmlns:p14="http://schemas.microsoft.com/office/powerpoint/2010/main" val="2897272366"/>
+      </p:ext>
+    </p:extLst>
+  </p:cSld>
+  <p:clrMapOvr>
+    <a:masterClrMapping/>
+  </p:clrMapOvr>
+  <mc:AlternateContent xmlns:mc="http://schemas.openxmlformats.org/markup-compatibility/2006" xmlns:p14="http://schemas.microsoft.com/office/powerpoint/2010/main">
+    <mc:Choice Requires="p14">
+      <p:transition p14:dur="150">
+        <p:fade/>
+      </p:transition>
+    </mc:Choice>
+    <mc:Fallback xmlns="">
+      <p:transition>
+        <p:fade/>
+      </p:transition>
+    </mc:Fallback>
+  </mc:AlternateContent>
+  <p:timing>
+    <p:tnLst>
+      <p:par>
+        <p:cTn id="1" dur="indefinite" restart="never" nodeType="tmRoot"/>
+      </p:par>
+    </p:tnLst>
+  </p:timing>
+</p:sld>
+</file>
+
+<file path=ppt/slides/slide4.xml><?xml version="1.0" encoding="utf-8"?>
+<p:sld xmlns:a="http://schemas.openxmlformats.org/drawingml/2006/main" xmlns:r="http://schemas.openxmlformats.org/officeDocument/2006/relationships" xmlns:p="http://schemas.openxmlformats.org/presentationml/2006/main">
+  <p:cSld>
+    <p:spTree>
+      <p:nvGrpSpPr>
+        <p:cNvPr id="1" name=""/>
+        <p:cNvGrpSpPr/>
+        <p:nvPr/>
+      </p:nvGrpSpPr>
+      <p:grpSpPr>
+        <a:xfrm>
+          <a:off x="0" y="0"/>
+          <a:ext cx="0" cy="0"/>
+          <a:chOff x="0" y="0"/>
+          <a:chExt cx="0" cy="0"/>
+        </a:xfrm>
+      </p:grpSpPr>
+      <p:sp>
+        <p:nvSpPr>
+          <p:cNvPr id="2" name="Title 1"/>
+          <p:cNvSpPr>
+            <a:spLocks noGrp="1"/>
+          </p:cNvSpPr>
+          <p:nvPr>
+            <p:ph type="title"/>
+          </p:nvPr>
+        </p:nvSpPr>
+        <p:spPr/>
+        <p:txBody>
+          <a:bodyPr/>
+          <a:lstStyle/>
+          <a:p>
+            <a:r>
+              <a:rPr lang="en-US" dirty="0" smtClean="0"/>
+              <a:t>About Fish ‘n’ Spots</a:t>
+            </a:r>
+            <a:endParaRPr lang="en-US" dirty="0"/>
+          </a:p>
+        </p:txBody>
+      </p:sp>
+      <p:sp>
+        <p:nvSpPr>
+          <p:cNvPr id="3" name="Content Placeholder 2"/>
+          <p:cNvSpPr>
+            <a:spLocks noGrp="1"/>
+          </p:cNvSpPr>
+          <p:nvPr>
+            <p:ph sz="half" idx="1"/>
+          </p:nvPr>
+        </p:nvSpPr>
+        <p:spPr/>
+        <p:txBody>
+          <a:bodyPr/>
+          <a:lstStyle/>
+          <a:p>
+            <a:endParaRPr lang="en-US"/>
+          </a:p>
+        </p:txBody>
+      </p:sp>
+      <p:sp>
+        <p:nvSpPr>
+          <p:cNvPr id="4" name="Content Placeholder 3"/>
+          <p:cNvSpPr>
+            <a:spLocks noGrp="1"/>
+          </p:cNvSpPr>
+          <p:nvPr>
+            <p:ph sz="half" idx="2"/>
+          </p:nvPr>
+        </p:nvSpPr>
+        <p:spPr/>
+        <p:txBody>
+          <a:bodyPr/>
+          <a:lstStyle/>
+          <a:p>
+            <a:endParaRPr lang="en-US"/>
+          </a:p>
+        </p:txBody>
+      </p:sp>
+    </p:spTree>
+    <p:extLst>
+      <p:ext uri="{BB962C8B-B14F-4D97-AF65-F5344CB8AC3E}">
+        <p14:creationId xmlns:p14="http://schemas.microsoft.com/office/powerpoint/2010/main" val="3448264058"/>
+      </p:ext>
+    </p:extLst>
+  </p:cSld>
+  <p:clrMapOvr>
+    <a:masterClrMapping/>
+  </p:clrMapOvr>
+  <mc:AlternateContent xmlns:mc="http://schemas.openxmlformats.org/markup-compatibility/2006" xmlns:p14="http://schemas.microsoft.com/office/powerpoint/2010/main">
+    <mc:Choice Requires="p14">
+      <p:transition p14:dur="150">
+        <p:fade/>
+      </p:transition>
+    </mc:Choice>
+    <mc:Fallback xmlns="">
+      <p:transition>
+        <p:fade/>
+      </p:transition>
+    </mc:Fallback>
+  </mc:AlternateContent>
+  <p:timing>
+    <p:tnLst>
+      <p:par>
+        <p:cTn id="1" dur="indefinite" restart="never" nodeType="tmRoot"/>
+      </p:par>
+    </p:tnLst>
+  </p:timing>
+</p:sld>
+</file>
+
+<file path=ppt/slides/slide5.xml><?xml version="1.0" encoding="utf-8"?>
+<p:sld xmlns:a="http://schemas.openxmlformats.org/drawingml/2006/main" xmlns:r="http://schemas.openxmlformats.org/officeDocument/2006/relationships" xmlns:p="http://schemas.openxmlformats.org/presentationml/2006/main">
+  <p:cSld>
+    <p:spTree>
+      <p:nvGrpSpPr>
+        <p:cNvPr id="1" name=""/>
+        <p:cNvGrpSpPr/>
+        <p:nvPr/>
+      </p:nvGrpSpPr>
+      <p:grpSpPr>
+        <a:xfrm>
+          <a:off x="0" y="0"/>
+          <a:ext cx="0" cy="0"/>
+          <a:chOff x="0" y="0"/>
+          <a:chExt cx="0" cy="0"/>
+        </a:xfrm>
+      </p:grpSpPr>
+      <p:sp>
+        <p:nvSpPr>
+          <p:cNvPr id="2" name="Title 1"/>
+          <p:cNvSpPr>
+            <a:spLocks noGrp="1"/>
+          </p:cNvSpPr>
+          <p:nvPr>
+            <p:ph type="title"/>
+          </p:nvPr>
+        </p:nvSpPr>
+        <p:spPr/>
+        <p:txBody>
+          <a:bodyPr/>
+          <a:lstStyle/>
+          <a:p>
+            <a:r>
+              <a:rPr lang="en-US" dirty="0" smtClean="0"/>
+              <a:t>About Fish ‘n’ Spots</a:t>
+            </a:r>
+            <a:endParaRPr lang="en-US" dirty="0"/>
+          </a:p>
+        </p:txBody>
+      </p:sp>
+      <p:pic>
+        <p:nvPicPr>
+          <p:cNvPr id="7" name="Content Placeholder 6"/>
+          <p:cNvPicPr>
+            <a:picLocks noGrp="1" noChangeAspect="1"/>
+          </p:cNvPicPr>
+          <p:nvPr>
+            <p:ph sz="half" idx="1"/>
+          </p:nvPr>
+        </p:nvPicPr>
+        <p:blipFill>
+          <a:blip r:embed="rId2" cstate="print">
+            <a:extLst>
+              <a:ext uri="{28A0092B-C50C-407E-A947-70E740481C1C}">
+                <a14:useLocalDpi xmlns:a14="http://schemas.microsoft.com/office/drawing/2010/main" val="0"/>
+              </a:ext>
+            </a:extLst>
+          </a:blip>
+          <a:stretch>
+            <a:fillRect/>
+          </a:stretch>
+        </p:blipFill>
+        <p:spPr>
+          <a:xfrm>
+            <a:off x="560428" y="1600200"/>
+            <a:ext cx="3832143" cy="4525963"/>
+          </a:xfrm>
+        </p:spPr>
+      </p:pic>
+      <p:sp>
+        <p:nvSpPr>
+          <p:cNvPr id="4" name="Content Placeholder 3"/>
+          <p:cNvSpPr>
+            <a:spLocks noGrp="1"/>
+          </p:cNvSpPr>
+          <p:nvPr>
+            <p:ph sz="half" idx="2"/>
+          </p:nvPr>
+        </p:nvSpPr>
+        <p:spPr/>
+        <p:txBody>
+          <a:bodyPr>
+            <a:normAutofit fontScale="92500" lnSpcReduction="10000"/>
+          </a:bodyPr>
+          <a:lstStyle/>
+          <a:p>
+            <a:r>
+              <a:rPr lang="en-US" dirty="0"/>
+              <a:t>Built for Android v4.0 (Ice Cream Sandwich) and above</a:t>
+            </a:r>
+          </a:p>
+          <a:p>
+            <a:r>
+              <a:rPr lang="en-US" dirty="0" smtClean="0"/>
+              <a:t>Uses the Fragment class</a:t>
+            </a:r>
+          </a:p>
+          <a:p>
+            <a:pPr lvl="1"/>
+            <a:r>
+              <a:rPr lang="en-US" dirty="0" smtClean="0"/>
+              <a:t>This means that it works awesomely (and differently) on devices with bigger screens</a:t>
+            </a:r>
+          </a:p>
+          <a:p>
+            <a:r>
+              <a:rPr lang="en-US" dirty="0" smtClean="0"/>
+              <a:t>Uses the Google Maps SDK to show a satellite view of saved locations</a:t>
+            </a:r>
+            <a:endParaRPr lang="en-US" dirty="0"/>
+          </a:p>
+        </p:txBody>
+      </p:sp>
+    </p:spTree>
+    <p:extLst>
+      <p:ext uri="{BB962C8B-B14F-4D97-AF65-F5344CB8AC3E}">
+        <p14:creationId xmlns:p14="http://schemas.microsoft.com/office/powerpoint/2010/main" val="3951424718"/>
+      </p:ext>
+    </p:extLst>
+  </p:cSld>
+  <p:clrMapOvr>
+    <a:masterClrMapping/>
+  </p:clrMapOvr>
+  <mc:AlternateContent xmlns:mc="http://schemas.openxmlformats.org/markup-compatibility/2006" xmlns:p14="http://schemas.microsoft.com/office/powerpoint/2010/main">
+    <mc:Choice Requires="p14">
+      <p:transition p14:dur="150">
+        <p:fade/>
+      </p:transition>
+    </mc:Choice>
+    <mc:Fallback xmlns="">
+      <p:transition>
+        <p:fade/>
+      </p:transition>
+    </mc:Fallback>
+  </mc:AlternateContent>
+  <p:timing>
+    <p:tnLst>
+      <p:par>
+        <p:cTn id="1" dur="indefinite" restart="never" nodeType="tmRoot"/>
+      </p:par>
+    </p:tnLst>
+  </p:timing>
+</p:sld>
+</file>
+
+<file path=ppt/slides/slide6.xml><?xml version="1.0" encoding="utf-8"?>
+<p:sld xmlns:a="http://schemas.openxmlformats.org/drawingml/2006/main" xmlns:r="http://schemas.openxmlformats.org/officeDocument/2006/relationships" xmlns:p="http://schemas.openxmlformats.org/presentationml/2006/main">
+  <p:cSld>
+    <p:spTree>
+      <p:nvGrpSpPr>
+        <p:cNvPr id="1" name=""/>
+        <p:cNvGrpSpPr/>
+        <p:nvPr/>
+      </p:nvGrpSpPr>
+      <p:grpSpPr>
+        <a:xfrm>
+          <a:off x="0" y="0"/>
+          <a:ext cx="0" cy="0"/>
+          <a:chOff x="0" y="0"/>
+          <a:chExt cx="0" cy="0"/>
+        </a:xfrm>
+      </p:grpSpPr>
+      <p:sp>
+        <p:nvSpPr>
+          <p:cNvPr id="2" name="Title 1"/>
+          <p:cNvSpPr>
+            <a:spLocks noGrp="1"/>
+          </p:cNvSpPr>
+          <p:nvPr>
+            <p:ph type="title"/>
+          </p:nvPr>
+        </p:nvSpPr>
+        <p:spPr/>
+        <p:txBody>
+          <a:bodyPr/>
+          <a:lstStyle/>
+          <a:p>
+            <a:r>
+              <a:rPr lang="en-US" dirty="0" smtClean="0"/>
+              <a:t>Fish ‘n’ Spots: Screenshots</a:t>
+            </a:r>
+            <a:endParaRPr lang="en-US" dirty="0"/>
+          </a:p>
+        </p:txBody>
+      </p:sp>
+      <p:sp>
+        <p:nvSpPr>
+          <p:cNvPr id="3" name="Text Placeholder 2"/>
+          <p:cNvSpPr>
+            <a:spLocks noGrp="1"/>
+          </p:cNvSpPr>
+          <p:nvPr>
+            <p:ph type="body" idx="1"/>
+          </p:nvPr>
+        </p:nvSpPr>
+        <p:spPr/>
+        <p:txBody>
+          <a:bodyPr/>
+          <a:lstStyle/>
+          <a:p>
+            <a:r>
+              <a:rPr lang="en-US" dirty="0" smtClean="0"/>
+              <a:t>Location List on Phone</a:t>
+            </a:r>
+            <a:endParaRPr lang="en-US" dirty="0"/>
+          </a:p>
+        </p:txBody>
+      </p:sp>
+      <p:pic>
+        <p:nvPicPr>
+          <p:cNvPr id="7" name="Content Placeholder 6"/>
+          <p:cNvPicPr>
+            <a:picLocks noGrp="1" noChangeAspect="1"/>
+          </p:cNvPicPr>
+          <p:nvPr>
+            <p:ph sz="half" idx="2"/>
+          </p:nvPr>
+        </p:nvPicPr>
+        <p:blipFill>
+          <a:blip r:embed="rId2" cstate="print">
+            <a:extLst>
+              <a:ext uri="{28A0092B-C50C-407E-A947-70E740481C1C}">
+                <a14:useLocalDpi xmlns:a14="http://schemas.microsoft.com/office/drawing/2010/main" val="0"/>
+              </a:ext>
+            </a:extLst>
+          </a:blip>
+          <a:stretch>
+            <a:fillRect/>
+          </a:stretch>
+        </p:blipFill>
+        <p:spPr>
+          <a:xfrm>
+            <a:off x="1365994" y="2174875"/>
+            <a:ext cx="2222599" cy="3951288"/>
+          </a:xfrm>
+        </p:spPr>
+      </p:pic>
+      <p:sp>
+        <p:nvSpPr>
+          <p:cNvPr id="5" name="Text Placeholder 4"/>
+          <p:cNvSpPr>
+            <a:spLocks noGrp="1"/>
+          </p:cNvSpPr>
+          <p:nvPr>
+            <p:ph type="body" sz="quarter" idx="3"/>
+          </p:nvPr>
+        </p:nvSpPr>
+        <p:spPr/>
+        <p:txBody>
+          <a:bodyPr/>
+          <a:lstStyle/>
+          <a:p>
+            <a:r>
+              <a:rPr lang="en-US" dirty="0" smtClean="0"/>
+              <a:t>Location List on Tablet</a:t>
+            </a:r>
+            <a:endParaRPr lang="en-US" dirty="0"/>
+          </a:p>
+        </p:txBody>
+      </p:sp>
+      <p:pic>
+        <p:nvPicPr>
+          <p:cNvPr id="8" name="Content Placeholder 7"/>
+          <p:cNvPicPr>
+            <a:picLocks noGrp="1" noChangeAspect="1"/>
+          </p:cNvPicPr>
+          <p:nvPr>
+            <p:ph sz="quarter" idx="4"/>
+          </p:nvPr>
+        </p:nvPicPr>
+        <p:blipFill>
+          <a:blip r:embed="rId3" cstate="print">
+            <a:extLst>
+              <a:ext uri="{28A0092B-C50C-407E-A947-70E740481C1C}">
+                <a14:useLocalDpi xmlns:a14="http://schemas.microsoft.com/office/drawing/2010/main" val="0"/>
+              </a:ext>
+            </a:extLst>
+          </a:blip>
+          <a:stretch>
+            <a:fillRect/>
+          </a:stretch>
+        </p:blipFill>
+        <p:spPr>
+          <a:xfrm>
+            <a:off x="5431135" y="2174875"/>
+            <a:ext cx="2469555" cy="3951288"/>
+          </a:xfrm>
+        </p:spPr>
+      </p:pic>
+    </p:spTree>
+    <p:extLst>
+      <p:ext uri="{BB962C8B-B14F-4D97-AF65-F5344CB8AC3E}">
+        <p14:creationId xmlns:p14="http://schemas.microsoft.com/office/powerpoint/2010/main" val="2020334194"/>
       </p:ext>
     </p:extLst>
   </p:cSld>

</xml_diff>

<commit_message>
Fish 'n' Spots section of PowerPoint finished
</commit_message>
<xml_diff>
--- a/documents/Presentation.pptx
+++ b/documents/Presentation.pptx
@@ -11,6 +11,8 @@
     <p:sldId id="261" r:id="rId5"/>
     <p:sldId id="260" r:id="rId6"/>
     <p:sldId id="259" r:id="rId7"/>
+    <p:sldId id="262" r:id="rId8"/>
+    <p:sldId id="263" r:id="rId9"/>
   </p:sldIdLst>
   <p:sldSz cx="9144000" cy="6858000" type="screen4x3"/>
   <p:notesSz cx="6858000" cy="9144000"/>
@@ -131,18 +133,64 @@
       </p:grpSpPr>
       <p:sp>
         <p:nvSpPr>
-          <p:cNvPr id="2" name="Title 1"/>
-          <p:cNvSpPr>
-            <a:spLocks noGrp="1"/>
-          </p:cNvSpPr>
-          <p:nvPr>
-            <p:ph type="ctrTitle"/>
-          </p:nvPr>
+          <p:cNvPr id="7" name="Rectangle 6"/>
+          <p:cNvSpPr/>
+          <p:nvPr userDrawn="1"/>
         </p:nvSpPr>
         <p:spPr>
           <a:xfrm>
-            <a:off x="685800" y="2130425"/>
-            <a:ext cx="7772400" cy="1470025"/>
+            <a:off x="0" y="0"/>
+            <a:ext cx="9144000" cy="6858000"/>
+          </a:xfrm>
+          <a:prstGeom prst="rect">
+            <a:avLst/>
+          </a:prstGeom>
+          <a:solidFill>
+            <a:srgbClr val="231F20"/>
+          </a:solidFill>
+          <a:ln>
+            <a:noFill/>
+          </a:ln>
+        </p:spPr>
+        <p:style>
+          <a:lnRef idx="2">
+            <a:schemeClr val="accent1">
+              <a:shade val="50000"/>
+            </a:schemeClr>
+          </a:lnRef>
+          <a:fillRef idx="1">
+            <a:schemeClr val="accent1"/>
+          </a:fillRef>
+          <a:effectRef idx="0">
+            <a:schemeClr val="accent1"/>
+          </a:effectRef>
+          <a:fontRef idx="minor">
+            <a:schemeClr val="lt1"/>
+          </a:fontRef>
+        </p:style>
+        <p:txBody>
+          <a:bodyPr rtlCol="0" anchor="ctr"/>
+          <a:lstStyle/>
+          <a:p>
+            <a:pPr algn="ctr"/>
+            <a:endParaRPr lang="en-US"/>
+          </a:p>
+        </p:txBody>
+      </p:sp>
+      <p:sp>
+        <p:nvSpPr>
+          <p:cNvPr id="2" name="Title 1"/>
+          <p:cNvSpPr>
+            <a:spLocks noGrp="1"/>
+          </p:cNvSpPr>
+          <p:nvPr>
+            <p:ph type="ctrTitle"/>
+          </p:nvPr>
+        </p:nvSpPr>
+        <p:spPr>
+          <a:xfrm>
+            <a:off x="0" y="2130425"/>
+            <a:ext cx="9144000" cy="1470025"/>
           </a:xfrm>
         </p:spPr>
         <p:txBody>
@@ -180,12 +228,12 @@
         </p:nvSpPr>
         <p:spPr>
           <a:xfrm>
-            <a:off x="1371600" y="3886200"/>
-            <a:ext cx="6400800" cy="1752600"/>
+            <a:off x="0" y="3886200"/>
+            <a:ext cx="9144000" cy="1752600"/>
           </a:xfrm>
         </p:spPr>
         <p:txBody>
-          <a:bodyPr/>
+          <a:bodyPr anchor="ctr"/>
           <a:lstStyle>
             <a:lvl1pPr marL="0" indent="0" algn="ctr">
               <a:buNone/>
@@ -348,7 +396,7 @@
               <a:pPr/>
               <a:t>‹#›</a:t>
             </a:fld>
-            <a:endParaRPr lang="en-US"/>
+            <a:endParaRPr lang="en-US" dirty="0"/>
           </a:p>
         </p:txBody>
       </p:sp>
@@ -3355,14 +3403,9 @@
             <p:ph type="subTitle" idx="1"/>
           </p:nvPr>
         </p:nvSpPr>
-        <p:spPr>
-          <a:xfrm>
-            <a:off x="0" y="3886200"/>
-            <a:ext cx="9144000" cy="1752600"/>
-          </a:xfrm>
-        </p:spPr>
-        <p:txBody>
-          <a:bodyPr anchor="ctr"/>
+        <p:spPr/>
+        <p:txBody>
+          <a:bodyPr/>
           <a:lstStyle/>
           <a:p>
             <a:r>
@@ -3572,23 +3615,7 @@
           <a:p>
             <a:r>
               <a:rPr lang="en-US" dirty="0" smtClean="0"/>
-              <a:t>Check </a:t>
-            </a:r>
-            <a:r>
-              <a:rPr lang="en-US" dirty="0" smtClean="0"/>
-              <a:t>out </a:t>
-            </a:r>
-            <a:r>
-              <a:rPr lang="en-US" dirty="0" smtClean="0"/>
-              <a:t>our custom </a:t>
-            </a:r>
-            <a:r>
-              <a:rPr lang="en-US" dirty="0" smtClean="0"/>
-              <a:t>icon</a:t>
-            </a:r>
-            <a:r>
-              <a:rPr lang="en-US" dirty="0" smtClean="0"/>
-              <a:t>!</a:t>
+              <a:t>Check out our custom icon!</a:t>
             </a:r>
           </a:p>
           <a:p>
@@ -3597,7 +3624,6 @@
               <a:rPr lang="en-US" dirty="0" smtClean="0"/>
               <a:t>We haven’t yet decided what kind of fish that is</a:t>
             </a:r>
-            <a:endParaRPr lang="en-US" dirty="0" smtClean="0"/>
           </a:p>
         </p:txBody>
       </p:sp>
@@ -3696,7 +3722,15 @@
           <a:p>
             <a:r>
               <a:rPr lang="en-US" dirty="0" smtClean="0"/>
-              <a:t>About Fish ‘n’ Spots</a:t>
+              <a:t>What is Fish </a:t>
+            </a:r>
+            <a:r>
+              <a:rPr lang="en-US" dirty="0" smtClean="0"/>
+              <a:t>‘n’ </a:t>
+            </a:r>
+            <a:r>
+              <a:rPr lang="en-US" dirty="0" smtClean="0"/>
+              <a:t>Spots?</a:t>
             </a:r>
             <a:endParaRPr lang="en-US" dirty="0"/>
           </a:p>
@@ -3714,32 +3748,83 @@
         </p:nvSpPr>
         <p:spPr/>
         <p:txBody>
-          <a:bodyPr/>
-          <a:lstStyle/>
-          <a:p>
-            <a:endParaRPr lang="en-US"/>
-          </a:p>
-        </p:txBody>
-      </p:sp>
-      <p:sp>
-        <p:nvSpPr>
-          <p:cNvPr id="4" name="Content Placeholder 3"/>
-          <p:cNvSpPr>
-            <a:spLocks noGrp="1"/>
-          </p:cNvSpPr>
+          <a:bodyPr>
+            <a:normAutofit fontScale="92500" lnSpcReduction="20000"/>
+          </a:bodyPr>
+          <a:lstStyle/>
+          <a:p>
+            <a:r>
+              <a:rPr lang="en-US" dirty="0" smtClean="0"/>
+              <a:t>An application that can allow a fisherman to save their current location</a:t>
+            </a:r>
+          </a:p>
+          <a:p>
+            <a:pPr lvl="1"/>
+            <a:r>
+              <a:rPr lang="en-US" dirty="0" smtClean="0"/>
+              <a:t>Location is found using the device’s GPS</a:t>
+            </a:r>
+            <a:endParaRPr lang="en-US" dirty="0" smtClean="0"/>
+          </a:p>
+          <a:p>
+            <a:r>
+              <a:rPr lang="en-US" dirty="0" smtClean="0"/>
+              <a:t>Allows angler to build up a list of locations</a:t>
+            </a:r>
+          </a:p>
+          <a:p>
+            <a:pPr lvl="1"/>
+            <a:r>
+              <a:rPr lang="en-US" dirty="0" smtClean="0"/>
+              <a:t>These are their favorite fishing spots!</a:t>
+            </a:r>
+          </a:p>
+          <a:p>
+            <a:r>
+              <a:rPr lang="en-US" dirty="0" smtClean="0"/>
+              <a:t>Shows a Google satellite picture of the </a:t>
+            </a:r>
+            <a:r>
+              <a:rPr lang="en-US" dirty="0" err="1" smtClean="0"/>
+              <a:t>fishin</a:t>
+            </a:r>
+            <a:r>
+              <a:rPr lang="en-US" dirty="0" smtClean="0"/>
+              <a:t>’ spot</a:t>
+            </a:r>
+            <a:endParaRPr lang="en-US" dirty="0"/>
+          </a:p>
+        </p:txBody>
+      </p:sp>
+      <p:pic>
+        <p:nvPicPr>
+          <p:cNvPr id="5" name="Content Placeholder 4"/>
+          <p:cNvPicPr>
+            <a:picLocks noGrp="1" noChangeAspect="1"/>
+          </p:cNvPicPr>
           <p:nvPr>
             <p:ph sz="half" idx="2"/>
           </p:nvPr>
-        </p:nvSpPr>
-        <p:spPr/>
-        <p:txBody>
-          <a:bodyPr/>
-          <a:lstStyle/>
-          <a:p>
-            <a:endParaRPr lang="en-US"/>
-          </a:p>
-        </p:txBody>
-      </p:sp>
+        </p:nvPicPr>
+        <p:blipFill>
+          <a:blip r:embed="rId2" cstate="print">
+            <a:extLst>
+              <a:ext uri="{28A0092B-C50C-407E-A947-70E740481C1C}">
+                <a14:useLocalDpi xmlns:a14="http://schemas.microsoft.com/office/drawing/2010/main" val="0"/>
+              </a:ext>
+            </a:extLst>
+          </a:blip>
+          <a:stretch>
+            <a:fillRect/>
+          </a:stretch>
+        </p:blipFill>
+        <p:spPr>
+          <a:xfrm>
+            <a:off x="5253137" y="1600200"/>
+            <a:ext cx="2828726" cy="4525963"/>
+          </a:xfrm>
+        </p:spPr>
+      </p:pic>
     </p:spTree>
     <p:extLst>
       <p:ext uri="{BB962C8B-B14F-4D97-AF65-F5344CB8AC3E}">
@@ -3806,7 +3891,11 @@
           <a:p>
             <a:r>
               <a:rPr lang="en-US" dirty="0" smtClean="0"/>
-              <a:t>About Fish ‘n’ Spots</a:t>
+              <a:t>Technology in Fish </a:t>
+            </a:r>
+            <a:r>
+              <a:rPr lang="en-US" dirty="0" smtClean="0"/>
+              <a:t>‘n’ Spots</a:t>
             </a:r>
             <a:endParaRPr lang="en-US" dirty="0"/>
           </a:p>
@@ -3946,12 +4035,22 @@
         </p:nvSpPr>
         <p:spPr/>
         <p:txBody>
-          <a:bodyPr/>
+          <a:bodyPr>
+            <a:normAutofit fontScale="90000"/>
+          </a:bodyPr>
           <a:lstStyle/>
           <a:p>
             <a:r>
               <a:rPr lang="en-US" dirty="0" smtClean="0"/>
-              <a:t>Fish ‘n’ Spots: Screenshots</a:t>
+              <a:t>Screenshots of Fish </a:t>
+            </a:r>
+            <a:r>
+              <a:rPr lang="en-US" dirty="0" smtClean="0"/>
+              <a:t>‘n’ </a:t>
+            </a:r>
+            <a:r>
+              <a:rPr lang="en-US" dirty="0" smtClean="0"/>
+              <a:t>Spots</a:t>
             </a:r>
             <a:endParaRPr lang="en-US" dirty="0"/>
           </a:p>
@@ -3974,7 +4073,11 @@
           <a:p>
             <a:r>
               <a:rPr lang="en-US" dirty="0" smtClean="0"/>
-              <a:t>Location List on Phone</a:t>
+              <a:t>Location List </a:t>
+            </a:r>
+            <a:r>
+              <a:rPr lang="en-US" dirty="0" smtClean="0"/>
+              <a:t>(Phone)</a:t>
             </a:r>
             <a:endParaRPr lang="en-US" dirty="0"/>
           </a:p>
@@ -4026,7 +4129,11 @@
           <a:p>
             <a:r>
               <a:rPr lang="en-US" dirty="0" smtClean="0"/>
-              <a:t>Location List on Tablet</a:t>
+              <a:t>Location List </a:t>
+            </a:r>
+            <a:r>
+              <a:rPr lang="en-US" dirty="0" smtClean="0"/>
+              <a:t>(Tablet)</a:t>
             </a:r>
             <a:endParaRPr lang="en-US" dirty="0"/>
           </a:p>
@@ -4065,6 +4172,362 @@
     <p:extLst>
       <p:ext uri="{BB962C8B-B14F-4D97-AF65-F5344CB8AC3E}">
         <p14:creationId xmlns:p14="http://schemas.microsoft.com/office/powerpoint/2010/main" val="2020334194"/>
+      </p:ext>
+    </p:extLst>
+  </p:cSld>
+  <p:clrMapOvr>
+    <a:masterClrMapping/>
+  </p:clrMapOvr>
+  <mc:AlternateContent xmlns:mc="http://schemas.openxmlformats.org/markup-compatibility/2006" xmlns:p14="http://schemas.microsoft.com/office/powerpoint/2010/main">
+    <mc:Choice Requires="p14">
+      <p:transition p14:dur="150">
+        <p:fade/>
+      </p:transition>
+    </mc:Choice>
+    <mc:Fallback xmlns="">
+      <p:transition>
+        <p:fade/>
+      </p:transition>
+    </mc:Fallback>
+  </mc:AlternateContent>
+  <p:timing>
+    <p:tnLst>
+      <p:par>
+        <p:cTn id="1" dur="indefinite" restart="never" nodeType="tmRoot"/>
+      </p:par>
+    </p:tnLst>
+  </p:timing>
+</p:sld>
+</file>
+
+<file path=ppt/slides/slide7.xml><?xml version="1.0" encoding="utf-8"?>
+<p:sld xmlns:a="http://schemas.openxmlformats.org/drawingml/2006/main" xmlns:r="http://schemas.openxmlformats.org/officeDocument/2006/relationships" xmlns:p="http://schemas.openxmlformats.org/presentationml/2006/main">
+  <p:cSld>
+    <p:spTree>
+      <p:nvGrpSpPr>
+        <p:cNvPr id="1" name=""/>
+        <p:cNvGrpSpPr/>
+        <p:nvPr/>
+      </p:nvGrpSpPr>
+      <p:grpSpPr>
+        <a:xfrm>
+          <a:off x="0" y="0"/>
+          <a:ext cx="0" cy="0"/>
+          <a:chOff x="0" y="0"/>
+          <a:chExt cx="0" cy="0"/>
+        </a:xfrm>
+      </p:grpSpPr>
+      <p:sp>
+        <p:nvSpPr>
+          <p:cNvPr id="2" name="Title 1"/>
+          <p:cNvSpPr>
+            <a:spLocks noGrp="1"/>
+          </p:cNvSpPr>
+          <p:nvPr>
+            <p:ph type="title"/>
+          </p:nvPr>
+        </p:nvSpPr>
+        <p:spPr/>
+        <p:txBody>
+          <a:bodyPr>
+            <a:normAutofit fontScale="90000"/>
+          </a:bodyPr>
+          <a:lstStyle/>
+          <a:p>
+            <a:r>
+              <a:rPr lang="en-US" dirty="0" smtClean="0"/>
+              <a:t>Screenshots of Fish ‘n’ Spots</a:t>
+            </a:r>
+            <a:endParaRPr lang="en-US" dirty="0"/>
+          </a:p>
+        </p:txBody>
+      </p:sp>
+      <p:sp>
+        <p:nvSpPr>
+          <p:cNvPr id="3" name="Text Placeholder 2"/>
+          <p:cNvSpPr>
+            <a:spLocks noGrp="1"/>
+          </p:cNvSpPr>
+          <p:nvPr>
+            <p:ph type="body" idx="1"/>
+          </p:nvPr>
+        </p:nvSpPr>
+        <p:spPr/>
+        <p:txBody>
+          <a:bodyPr/>
+          <a:lstStyle/>
+          <a:p>
+            <a:r>
+              <a:rPr lang="en-US" dirty="0" smtClean="0"/>
+              <a:t>Creating a Location (Phone)</a:t>
+            </a:r>
+            <a:endParaRPr lang="en-US" dirty="0"/>
+          </a:p>
+        </p:txBody>
+      </p:sp>
+      <p:pic>
+        <p:nvPicPr>
+          <p:cNvPr id="7" name="Content Placeholder 6"/>
+          <p:cNvPicPr>
+            <a:picLocks noGrp="1" noChangeAspect="1"/>
+          </p:cNvPicPr>
+          <p:nvPr>
+            <p:ph sz="half" idx="2"/>
+          </p:nvPr>
+        </p:nvPicPr>
+        <p:blipFill>
+          <a:blip r:embed="rId2" cstate="print">
+            <a:extLst>
+              <a:ext uri="{28A0092B-C50C-407E-A947-70E740481C1C}">
+                <a14:useLocalDpi xmlns:a14="http://schemas.microsoft.com/office/drawing/2010/main" val="0"/>
+              </a:ext>
+            </a:extLst>
+          </a:blip>
+          <a:stretch>
+            <a:fillRect/>
+          </a:stretch>
+        </p:blipFill>
+        <p:spPr>
+          <a:xfrm>
+            <a:off x="1365994" y="2174875"/>
+            <a:ext cx="2222599" cy="3951288"/>
+          </a:xfrm>
+        </p:spPr>
+      </p:pic>
+      <p:sp>
+        <p:nvSpPr>
+          <p:cNvPr id="5" name="Text Placeholder 4"/>
+          <p:cNvSpPr>
+            <a:spLocks noGrp="1"/>
+          </p:cNvSpPr>
+          <p:nvPr>
+            <p:ph type="body" sz="quarter" idx="3"/>
+          </p:nvPr>
+        </p:nvSpPr>
+        <p:spPr/>
+        <p:txBody>
+          <a:bodyPr/>
+          <a:lstStyle/>
+          <a:p>
+            <a:r>
+              <a:rPr lang="en-US" dirty="0" smtClean="0"/>
+              <a:t>Deleting a Location (Tablet)</a:t>
+            </a:r>
+            <a:endParaRPr lang="en-US" dirty="0"/>
+          </a:p>
+        </p:txBody>
+      </p:sp>
+      <p:pic>
+        <p:nvPicPr>
+          <p:cNvPr id="8" name="Content Placeholder 7"/>
+          <p:cNvPicPr>
+            <a:picLocks noGrp="1" noChangeAspect="1"/>
+          </p:cNvPicPr>
+          <p:nvPr>
+            <p:ph sz="quarter" idx="4"/>
+          </p:nvPr>
+        </p:nvPicPr>
+        <p:blipFill>
+          <a:blip r:embed="rId3" cstate="print">
+            <a:extLst>
+              <a:ext uri="{28A0092B-C50C-407E-A947-70E740481C1C}">
+                <a14:useLocalDpi xmlns:a14="http://schemas.microsoft.com/office/drawing/2010/main" val="0"/>
+              </a:ext>
+            </a:extLst>
+          </a:blip>
+          <a:stretch>
+            <a:fillRect/>
+          </a:stretch>
+        </p:blipFill>
+        <p:spPr>
+          <a:xfrm>
+            <a:off x="5431135" y="2174875"/>
+            <a:ext cx="2469555" cy="3951288"/>
+          </a:xfrm>
+        </p:spPr>
+      </p:pic>
+    </p:spTree>
+    <p:extLst>
+      <p:ext uri="{BB962C8B-B14F-4D97-AF65-F5344CB8AC3E}">
+        <p14:creationId xmlns:p14="http://schemas.microsoft.com/office/powerpoint/2010/main" val="1633303520"/>
+      </p:ext>
+    </p:extLst>
+  </p:cSld>
+  <p:clrMapOvr>
+    <a:masterClrMapping/>
+  </p:clrMapOvr>
+  <mc:AlternateContent xmlns:mc="http://schemas.openxmlformats.org/markup-compatibility/2006" xmlns:p14="http://schemas.microsoft.com/office/powerpoint/2010/main">
+    <mc:Choice Requires="p14">
+      <p:transition p14:dur="150">
+        <p:fade/>
+      </p:transition>
+    </mc:Choice>
+    <mc:Fallback xmlns="">
+      <p:transition>
+        <p:fade/>
+      </p:transition>
+    </mc:Fallback>
+  </mc:AlternateContent>
+  <p:timing>
+    <p:tnLst>
+      <p:par>
+        <p:cTn id="1" dur="indefinite" restart="never" nodeType="tmRoot"/>
+      </p:par>
+    </p:tnLst>
+  </p:timing>
+</p:sld>
+</file>
+
+<file path=ppt/slides/slide8.xml><?xml version="1.0" encoding="utf-8"?>
+<p:sld xmlns:a="http://schemas.openxmlformats.org/drawingml/2006/main" xmlns:r="http://schemas.openxmlformats.org/officeDocument/2006/relationships" xmlns:p="http://schemas.openxmlformats.org/presentationml/2006/main">
+  <p:cSld>
+    <p:spTree>
+      <p:nvGrpSpPr>
+        <p:cNvPr id="1" name=""/>
+        <p:cNvGrpSpPr/>
+        <p:nvPr/>
+      </p:nvGrpSpPr>
+      <p:grpSpPr>
+        <a:xfrm>
+          <a:off x="0" y="0"/>
+          <a:ext cx="0" cy="0"/>
+          <a:chOff x="0" y="0"/>
+          <a:chExt cx="0" cy="0"/>
+        </a:xfrm>
+      </p:grpSpPr>
+      <p:sp>
+        <p:nvSpPr>
+          <p:cNvPr id="2" name="Title 1"/>
+          <p:cNvSpPr>
+            <a:spLocks noGrp="1"/>
+          </p:cNvSpPr>
+          <p:nvPr>
+            <p:ph type="title"/>
+          </p:nvPr>
+        </p:nvSpPr>
+        <p:spPr/>
+        <p:txBody>
+          <a:bodyPr>
+            <a:normAutofit fontScale="90000"/>
+          </a:bodyPr>
+          <a:lstStyle/>
+          <a:p>
+            <a:r>
+              <a:rPr lang="en-US" dirty="0" smtClean="0"/>
+              <a:t>Screenshots of Fish ‘n’ Spots</a:t>
+            </a:r>
+            <a:endParaRPr lang="en-US" dirty="0"/>
+          </a:p>
+        </p:txBody>
+      </p:sp>
+      <p:sp>
+        <p:nvSpPr>
+          <p:cNvPr id="3" name="Text Placeholder 2"/>
+          <p:cNvSpPr>
+            <a:spLocks noGrp="1"/>
+          </p:cNvSpPr>
+          <p:nvPr>
+            <p:ph type="body" idx="1"/>
+          </p:nvPr>
+        </p:nvSpPr>
+        <p:spPr/>
+        <p:txBody>
+          <a:bodyPr/>
+          <a:lstStyle/>
+          <a:p>
+            <a:r>
+              <a:rPr lang="en-US" dirty="0" smtClean="0"/>
+              <a:t>Viewing a Location (Phone)</a:t>
+            </a:r>
+            <a:endParaRPr lang="en-US" dirty="0"/>
+          </a:p>
+        </p:txBody>
+      </p:sp>
+      <p:pic>
+        <p:nvPicPr>
+          <p:cNvPr id="7" name="Content Placeholder 6"/>
+          <p:cNvPicPr>
+            <a:picLocks noGrp="1" noChangeAspect="1"/>
+          </p:cNvPicPr>
+          <p:nvPr>
+            <p:ph sz="half" idx="2"/>
+          </p:nvPr>
+        </p:nvPicPr>
+        <p:blipFill>
+          <a:blip r:embed="rId2" cstate="print">
+            <a:extLst>
+              <a:ext uri="{28A0092B-C50C-407E-A947-70E740481C1C}">
+                <a14:useLocalDpi xmlns:a14="http://schemas.microsoft.com/office/drawing/2010/main" val="0"/>
+              </a:ext>
+            </a:extLst>
+          </a:blip>
+          <a:stretch>
+            <a:fillRect/>
+          </a:stretch>
+        </p:blipFill>
+        <p:spPr>
+          <a:xfrm>
+            <a:off x="1365994" y="2174875"/>
+            <a:ext cx="2222599" cy="3951288"/>
+          </a:xfrm>
+        </p:spPr>
+      </p:pic>
+      <p:sp>
+        <p:nvSpPr>
+          <p:cNvPr id="5" name="Text Placeholder 4"/>
+          <p:cNvSpPr>
+            <a:spLocks noGrp="1"/>
+          </p:cNvSpPr>
+          <p:nvPr>
+            <p:ph type="body" sz="quarter" idx="3"/>
+          </p:nvPr>
+        </p:nvSpPr>
+        <p:spPr/>
+        <p:txBody>
+          <a:bodyPr/>
+          <a:lstStyle/>
+          <a:p>
+            <a:r>
+              <a:rPr lang="en-US" dirty="0" smtClean="0"/>
+              <a:t>Viewing a Location (Tablet)</a:t>
+            </a:r>
+            <a:endParaRPr lang="en-US" dirty="0"/>
+          </a:p>
+        </p:txBody>
+      </p:sp>
+      <p:pic>
+        <p:nvPicPr>
+          <p:cNvPr id="8" name="Content Placeholder 7"/>
+          <p:cNvPicPr>
+            <a:picLocks noGrp="1" noChangeAspect="1"/>
+          </p:cNvPicPr>
+          <p:nvPr>
+            <p:ph sz="quarter" idx="4"/>
+          </p:nvPr>
+        </p:nvPicPr>
+        <p:blipFill>
+          <a:blip r:embed="rId3" cstate="print">
+            <a:extLst>
+              <a:ext uri="{28A0092B-C50C-407E-A947-70E740481C1C}">
+                <a14:useLocalDpi xmlns:a14="http://schemas.microsoft.com/office/drawing/2010/main" val="0"/>
+              </a:ext>
+            </a:extLst>
+          </a:blip>
+          <a:stretch>
+            <a:fillRect/>
+          </a:stretch>
+        </p:blipFill>
+        <p:spPr>
+          <a:xfrm>
+            <a:off x="5431135" y="2174875"/>
+            <a:ext cx="2469555" cy="3951288"/>
+          </a:xfrm>
+        </p:spPr>
+      </p:pic>
+    </p:spTree>
+    <p:extLst>
+      <p:ext uri="{BB962C8B-B14F-4D97-AF65-F5344CB8AC3E}">
+        <p14:creationId xmlns:p14="http://schemas.microsoft.com/office/powerpoint/2010/main" val="3092310823"/>
       </p:ext>
     </p:extLst>
   </p:cSld>

</xml_diff>

<commit_message>
began entering data into the database, some powerpoint work
</commit_message>
<xml_diff>
--- a/documents/Presentation.pptx
+++ b/documents/Presentation.pptx
@@ -13,6 +13,7 @@
     <p:sldId id="259" r:id="rId7"/>
     <p:sldId id="262" r:id="rId8"/>
     <p:sldId id="263" r:id="rId9"/>
+    <p:sldId id="264" r:id="rId10"/>
   </p:sldIdLst>
   <p:sldSz cx="9144000" cy="6858000" type="screen4x3"/>
   <p:notesSz cx="6858000" cy="9144000"/>
@@ -3860,11 +3861,7 @@
           <a:p>
             <a:r>
               <a:rPr lang="en-US" dirty="0" smtClean="0"/>
-              <a:t>Uses the Google Maps SDK to show a satellite view of saved </a:t>
-            </a:r>
-            <a:r>
-              <a:rPr lang="en-US" dirty="0" smtClean="0"/>
-              <a:t>locations</a:t>
+              <a:t>Uses the Google Maps SDK to show a satellite view of saved locations</a:t>
             </a:r>
           </a:p>
           <a:p>
@@ -4414,6 +4411,97 @@
     <p:extLst>
       <p:ext uri="{BB962C8B-B14F-4D97-AF65-F5344CB8AC3E}">
         <p14:creationId xmlns:p14="http://schemas.microsoft.com/office/powerpoint/2010/main" val="3092310823"/>
+      </p:ext>
+    </p:extLst>
+  </p:cSld>
+  <p:clrMapOvr>
+    <a:masterClrMapping/>
+  </p:clrMapOvr>
+  <mc:AlternateContent xmlns:mc="http://schemas.openxmlformats.org/markup-compatibility/2006" xmlns:p14="http://schemas.microsoft.com/office/powerpoint/2010/main">
+    <mc:Choice Requires="p14">
+      <p:transition p14:dur="150">
+        <p:fade/>
+      </p:transition>
+    </mc:Choice>
+    <mc:Fallback xmlns="">
+      <p:transition>
+        <p:fade/>
+      </p:transition>
+    </mc:Fallback>
+  </mc:AlternateContent>
+  <p:timing>
+    <p:tnLst>
+      <p:par>
+        <p:cTn id="1" dur="indefinite" restart="never" nodeType="tmRoot"/>
+      </p:par>
+    </p:tnLst>
+  </p:timing>
+</p:sld>
+</file>
+
+<file path=ppt/slides/slide9.xml><?xml version="1.0" encoding="utf-8"?>
+<p:sld xmlns:a="http://schemas.openxmlformats.org/drawingml/2006/main" xmlns:r="http://schemas.openxmlformats.org/officeDocument/2006/relationships" xmlns:p="http://schemas.openxmlformats.org/presentationml/2006/main">
+  <p:cSld>
+    <p:spTree>
+      <p:nvGrpSpPr>
+        <p:cNvPr id="1" name=""/>
+        <p:cNvGrpSpPr/>
+        <p:nvPr/>
+      </p:nvGrpSpPr>
+      <p:grpSpPr>
+        <a:xfrm>
+          <a:off x="0" y="0"/>
+          <a:ext cx="0" cy="0"/>
+          <a:chOff x="0" y="0"/>
+          <a:chExt cx="0" cy="0"/>
+        </a:xfrm>
+      </p:grpSpPr>
+      <p:sp>
+        <p:nvSpPr>
+          <p:cNvPr id="2" name="Title 1"/>
+          <p:cNvSpPr>
+            <a:spLocks noGrp="1"/>
+          </p:cNvSpPr>
+          <p:nvPr>
+            <p:ph type="ctrTitle"/>
+          </p:nvPr>
+        </p:nvSpPr>
+        <p:spPr/>
+        <p:txBody>
+          <a:bodyPr/>
+          <a:lstStyle/>
+          <a:p>
+            <a:r>
+              <a:rPr lang="en-US" dirty="0" smtClean="0"/>
+              <a:t>Thank you!</a:t>
+            </a:r>
+            <a:endParaRPr lang="en-US" dirty="0"/>
+          </a:p>
+        </p:txBody>
+      </p:sp>
+      <p:sp>
+        <p:nvSpPr>
+          <p:cNvPr id="3" name="Subtitle 2"/>
+          <p:cNvSpPr>
+            <a:spLocks noGrp="1"/>
+          </p:cNvSpPr>
+          <p:nvPr>
+            <p:ph type="subTitle" idx="1"/>
+          </p:nvPr>
+        </p:nvSpPr>
+        <p:spPr/>
+        <p:txBody>
+          <a:bodyPr/>
+          <a:lstStyle/>
+          <a:p>
+            <a:endParaRPr lang="en-US"/>
+          </a:p>
+        </p:txBody>
+      </p:sp>
+    </p:spTree>
+    <p:extLst>
+      <p:ext uri="{BB962C8B-B14F-4D97-AF65-F5344CB8AC3E}">
+        <p14:creationId xmlns:p14="http://schemas.microsoft.com/office/powerpoint/2010/main" val="2542890997"/>
       </p:ext>
     </p:extLst>
   </p:cSld>

</xml_diff>

<commit_message>
presentation update, style and content added
</commit_message>
<xml_diff>
--- a/documents/Presentation.pptx
+++ b/documents/Presentation.pptx
@@ -7,13 +7,15 @@
   <p:sldIdLst>
     <p:sldId id="256" r:id="rId2"/>
     <p:sldId id="257" r:id="rId3"/>
-    <p:sldId id="258" r:id="rId4"/>
-    <p:sldId id="261" r:id="rId5"/>
-    <p:sldId id="260" r:id="rId6"/>
-    <p:sldId id="259" r:id="rId7"/>
-    <p:sldId id="262" r:id="rId8"/>
-    <p:sldId id="263" r:id="rId9"/>
-    <p:sldId id="264" r:id="rId10"/>
+    <p:sldId id="265" r:id="rId4"/>
+    <p:sldId id="266" r:id="rId5"/>
+    <p:sldId id="258" r:id="rId6"/>
+    <p:sldId id="261" r:id="rId7"/>
+    <p:sldId id="260" r:id="rId8"/>
+    <p:sldId id="259" r:id="rId9"/>
+    <p:sldId id="262" r:id="rId10"/>
+    <p:sldId id="263" r:id="rId11"/>
+    <p:sldId id="264" r:id="rId12"/>
   </p:sldIdLst>
   <p:sldSz cx="9144000" cy="6858000" type="screen4x3"/>
   <p:notesSz cx="6858000" cy="9144000"/>
@@ -195,10 +197,12 @@
           </a:xfrm>
         </p:spPr>
         <p:txBody>
-          <a:bodyPr/>
+          <a:bodyPr>
+            <a:noAutofit/>
+          </a:bodyPr>
           <a:lstStyle>
             <a:lvl1pPr>
-              <a:defRPr lang="en-US" sz="4400" b="0" kern="1200" spc="-200" baseline="0" dirty="0" smtClean="0">
+              <a:defRPr lang="en-US" sz="6000" b="0" kern="1200" spc="-300" baseline="0" dirty="0" smtClean="0">
                 <a:solidFill>
                   <a:schemeClr val="bg1"/>
                 </a:solidFill>
@@ -234,11 +238,13 @@
           </a:xfrm>
         </p:spPr>
         <p:txBody>
-          <a:bodyPr anchor="ctr"/>
+          <a:bodyPr anchor="ctr">
+            <a:normAutofit/>
+          </a:bodyPr>
           <a:lstStyle>
             <a:lvl1pPr marL="0" indent="0" algn="ctr">
               <a:buNone/>
-              <a:defRPr baseline="0">
+              <a:defRPr sz="3600" spc="-100" baseline="0">
                 <a:solidFill>
                   <a:schemeClr val="bg1"/>
                 </a:solidFill>
@@ -360,7 +366,7 @@
             <a:fld id="{1D8BD707-D9CF-40AE-B4C6-C98DA3205C09}" type="datetimeFigureOut">
               <a:rPr lang="en-US" smtClean="0"/>
               <a:pPr/>
-              <a:t>5/1/2013</a:t>
+              <a:t>5/2/2013</a:t>
             </a:fld>
             <a:endParaRPr lang="en-US"/>
           </a:p>
@@ -570,7 +576,7 @@
             <a:fld id="{1D8BD707-D9CF-40AE-B4C6-C98DA3205C09}" type="datetimeFigureOut">
               <a:rPr lang="en-US" smtClean="0"/>
               <a:pPr/>
-              <a:t>5/1/2013</a:t>
+              <a:t>5/2/2013</a:t>
             </a:fld>
             <a:endParaRPr lang="en-US"/>
           </a:p>
@@ -783,7 +789,7 @@
             <a:fld id="{1D8BD707-D9CF-40AE-B4C6-C98DA3205C09}" type="datetimeFigureOut">
               <a:rPr lang="en-US" smtClean="0"/>
               <a:pPr/>
-              <a:t>5/1/2013</a:t>
+              <a:t>5/2/2013</a:t>
             </a:fld>
             <a:endParaRPr lang="en-US"/>
           </a:p>
@@ -1006,6 +1012,144 @@
       </p:grpSpPr>
       <p:sp>
         <p:nvSpPr>
+          <p:cNvPr id="6" name="Rectangle 5"/>
+          <p:cNvSpPr/>
+          <p:nvPr userDrawn="1"/>
+        </p:nvSpPr>
+        <p:spPr>
+          <a:xfrm>
+            <a:off x="228600" y="4419600"/>
+            <a:ext cx="8686800" cy="1371600"/>
+          </a:xfrm>
+          <a:prstGeom prst="rect">
+            <a:avLst/>
+          </a:prstGeom>
+          <a:solidFill>
+            <a:srgbClr val="D8DF20"/>
+          </a:solidFill>
+          <a:ln>
+            <a:noFill/>
+          </a:ln>
+        </p:spPr>
+        <p:style>
+          <a:lnRef idx="2">
+            <a:schemeClr val="accent1">
+              <a:shade val="50000"/>
+            </a:schemeClr>
+          </a:lnRef>
+          <a:fillRef idx="1">
+            <a:schemeClr val="accent1"/>
+          </a:fillRef>
+          <a:effectRef idx="0">
+            <a:schemeClr val="accent1"/>
+          </a:effectRef>
+          <a:fontRef idx="minor">
+            <a:schemeClr val="lt1"/>
+          </a:fontRef>
+        </p:style>
+        <p:txBody>
+          <a:bodyPr rtlCol="0" anchor="ctr"/>
+          <a:lstStyle/>
+          <a:p>
+            <a:pPr algn="ctr"/>
+            <a:endParaRPr lang="en-US"/>
+          </a:p>
+        </p:txBody>
+      </p:sp>
+      <p:sp>
+        <p:nvSpPr>
+          <p:cNvPr id="5" name="Rectangle 4"/>
+          <p:cNvSpPr/>
+          <p:nvPr userDrawn="1"/>
+        </p:nvSpPr>
+        <p:spPr>
+          <a:xfrm>
+            <a:off x="228600" y="5791200"/>
+            <a:ext cx="8686800" cy="914400"/>
+          </a:xfrm>
+          <a:prstGeom prst="rect">
+            <a:avLst/>
+          </a:prstGeom>
+          <a:solidFill>
+            <a:srgbClr val="231F20"/>
+          </a:solidFill>
+          <a:ln>
+            <a:noFill/>
+          </a:ln>
+        </p:spPr>
+        <p:style>
+          <a:lnRef idx="2">
+            <a:schemeClr val="accent1">
+              <a:shade val="50000"/>
+            </a:schemeClr>
+          </a:lnRef>
+          <a:fillRef idx="1">
+            <a:schemeClr val="accent1"/>
+          </a:fillRef>
+          <a:effectRef idx="0">
+            <a:schemeClr val="accent1"/>
+          </a:effectRef>
+          <a:fontRef idx="minor">
+            <a:schemeClr val="lt1"/>
+          </a:fontRef>
+        </p:style>
+        <p:txBody>
+          <a:bodyPr rtlCol="0" anchor="ctr"/>
+          <a:lstStyle/>
+          <a:p>
+            <a:pPr algn="ctr"/>
+            <a:endParaRPr lang="en-US"/>
+          </a:p>
+        </p:txBody>
+      </p:sp>
+      <p:sp>
+        <p:nvSpPr>
+          <p:cNvPr id="4" name="Rectangle 3"/>
+          <p:cNvSpPr/>
+          <p:nvPr userDrawn="1"/>
+        </p:nvSpPr>
+        <p:spPr>
+          <a:xfrm>
+            <a:off x="228600" y="152400"/>
+            <a:ext cx="8686800" cy="4267200"/>
+          </a:xfrm>
+          <a:prstGeom prst="rect">
+            <a:avLst/>
+          </a:prstGeom>
+          <a:solidFill>
+            <a:srgbClr val="231F20"/>
+          </a:solidFill>
+          <a:ln>
+            <a:noFill/>
+          </a:ln>
+        </p:spPr>
+        <p:style>
+          <a:lnRef idx="2">
+            <a:schemeClr val="accent1">
+              <a:shade val="50000"/>
+            </a:schemeClr>
+          </a:lnRef>
+          <a:fillRef idx="1">
+            <a:schemeClr val="accent1"/>
+          </a:fillRef>
+          <a:effectRef idx="0">
+            <a:schemeClr val="accent1"/>
+          </a:effectRef>
+          <a:fontRef idx="minor">
+            <a:schemeClr val="lt1"/>
+          </a:fontRef>
+        </p:style>
+        <p:txBody>
+          <a:bodyPr rtlCol="0" anchor="ctr"/>
+          <a:lstStyle/>
+          <a:p>
+            <a:pPr algn="ctr"/>
+            <a:endParaRPr lang="en-US"/>
+          </a:p>
+        </p:txBody>
+      </p:sp>
+      <p:sp>
+        <p:nvSpPr>
           <p:cNvPr id="2" name="Title 1"/>
           <p:cNvSpPr>
             <a:spLocks noGrp="1"/>
@@ -1023,8 +1167,12 @@
         <p:txBody>
           <a:bodyPr anchor="ctr"/>
           <a:lstStyle>
-            <a:lvl1pPr algn="l">
-              <a:defRPr sz="4000" b="1" cap="all"/>
+            <a:lvl1pPr algn="ctr">
+              <a:defRPr sz="4000" b="1" cap="all">
+                <a:solidFill>
+                  <a:srgbClr val="231F20"/>
+                </a:solidFill>
+              </a:defRPr>
             </a:lvl1pPr>
           </a:lstStyle>
           <a:p>
@@ -1436,6 +1584,52 @@
       </p:grpSpPr>
       <p:sp>
         <p:nvSpPr>
+          <p:cNvPr id="7" name="Rectangle 6"/>
+          <p:cNvSpPr/>
+          <p:nvPr userDrawn="1"/>
+        </p:nvSpPr>
+        <p:spPr>
+          <a:xfrm>
+            <a:off x="304800" y="1447800"/>
+            <a:ext cx="8534400" cy="640080"/>
+          </a:xfrm>
+          <a:prstGeom prst="rect">
+            <a:avLst/>
+          </a:prstGeom>
+          <a:solidFill>
+            <a:srgbClr val="D8DF20"/>
+          </a:solidFill>
+          <a:ln>
+            <a:noFill/>
+          </a:ln>
+        </p:spPr>
+        <p:style>
+          <a:lnRef idx="2">
+            <a:schemeClr val="accent1">
+              <a:shade val="50000"/>
+            </a:schemeClr>
+          </a:lnRef>
+          <a:fillRef idx="1">
+            <a:schemeClr val="accent1"/>
+          </a:fillRef>
+          <a:effectRef idx="0">
+            <a:schemeClr val="accent1"/>
+          </a:effectRef>
+          <a:fontRef idx="minor">
+            <a:schemeClr val="lt1"/>
+          </a:fontRef>
+        </p:style>
+        <p:txBody>
+          <a:bodyPr rtlCol="0" anchor="ctr"/>
+          <a:lstStyle/>
+          <a:p>
+            <a:pPr algn="ctr"/>
+            <a:endParaRPr lang="en-US"/>
+          </a:p>
+        </p:txBody>
+      </p:sp>
+      <p:sp>
+        <p:nvSpPr>
           <p:cNvPr id="2" name="Title 1"/>
           <p:cNvSpPr>
             <a:spLocks noGrp="1"/>
@@ -1454,10 +1648,10 @@
           </a:lstStyle>
           <a:p>
             <a:r>
-              <a:rPr lang="en-US" smtClean="0"/>
+              <a:rPr lang="en-US" dirty="0" smtClean="0"/>
               <a:t>Click to edit Master title style</a:t>
             </a:r>
-            <a:endParaRPr lang="en-US"/>
+            <a:endParaRPr lang="en-US" dirty="0"/>
           </a:p>
         </p:txBody>
       </p:sp>
@@ -1473,16 +1667,20 @@
         </p:nvSpPr>
         <p:spPr>
           <a:xfrm>
-            <a:off x="457200" y="1535113"/>
-            <a:ext cx="4040188" cy="639762"/>
-          </a:xfrm>
-        </p:spPr>
-        <p:txBody>
-          <a:bodyPr anchor="t"/>
+            <a:off x="457200" y="1447801"/>
+            <a:ext cx="4040188" cy="609600"/>
+          </a:xfrm>
+        </p:spPr>
+        <p:txBody>
+          <a:bodyPr anchor="ctr"/>
           <a:lstStyle>
             <a:lvl1pPr marL="0" indent="0" algn="ctr">
               <a:buNone/>
-              <a:defRPr sz="2400" b="1" spc="-100" baseline="0"/>
+              <a:defRPr sz="2400" b="1" cap="small" spc="-100" baseline="0">
+                <a:solidFill>
+                  <a:srgbClr val="231F20"/>
+                </a:solidFill>
+              </a:defRPr>
             </a:lvl1pPr>
             <a:lvl2pPr marL="457200" indent="0">
               <a:buNone/>
@@ -1520,7 +1718,7 @@
           <a:p>
             <a:pPr lvl="0"/>
             <a:r>
-              <a:rPr lang="en-US" smtClean="0"/>
+              <a:rPr lang="en-US" dirty="0" smtClean="0"/>
               <a:t>Click to edit Master text styles</a:t>
             </a:r>
           </a:p>
@@ -1538,7 +1736,7 @@
         </p:nvSpPr>
         <p:spPr>
           <a:xfrm>
-            <a:off x="457200" y="2174874"/>
+            <a:off x="457200" y="2251075"/>
             <a:ext cx="4040188" cy="4302125"/>
           </a:xfrm>
         </p:spPr>
@@ -1576,38 +1774,38 @@
           <a:p>
             <a:pPr lvl="0"/>
             <a:r>
-              <a:rPr lang="en-US" smtClean="0"/>
+              <a:rPr lang="en-US" dirty="0" smtClean="0"/>
               <a:t>Click to edit Master text styles</a:t>
             </a:r>
           </a:p>
           <a:p>
             <a:pPr lvl="1"/>
             <a:r>
-              <a:rPr lang="en-US" smtClean="0"/>
+              <a:rPr lang="en-US" dirty="0" smtClean="0"/>
               <a:t>Second level</a:t>
             </a:r>
           </a:p>
           <a:p>
             <a:pPr lvl="2"/>
             <a:r>
-              <a:rPr lang="en-US" smtClean="0"/>
+              <a:rPr lang="en-US" dirty="0" smtClean="0"/>
               <a:t>Third level</a:t>
             </a:r>
           </a:p>
           <a:p>
             <a:pPr lvl="3"/>
             <a:r>
-              <a:rPr lang="en-US" smtClean="0"/>
+              <a:rPr lang="en-US" dirty="0" smtClean="0"/>
               <a:t>Fourth level</a:t>
             </a:r>
           </a:p>
           <a:p>
             <a:pPr lvl="4"/>
             <a:r>
-              <a:rPr lang="en-US" smtClean="0"/>
+              <a:rPr lang="en-US" dirty="0" smtClean="0"/>
               <a:t>Fifth level</a:t>
             </a:r>
-            <a:endParaRPr lang="en-US"/>
+            <a:endParaRPr lang="en-US" dirty="0"/>
           </a:p>
         </p:txBody>
       </p:sp>
@@ -1623,16 +1821,20 @@
         </p:nvSpPr>
         <p:spPr>
           <a:xfrm>
-            <a:off x="4645025" y="1535113"/>
-            <a:ext cx="4041775" cy="639762"/>
-          </a:xfrm>
-        </p:spPr>
-        <p:txBody>
-          <a:bodyPr anchor="t"/>
+            <a:off x="4645025" y="1447801"/>
+            <a:ext cx="4041775" cy="609600"/>
+          </a:xfrm>
+        </p:spPr>
+        <p:txBody>
+          <a:bodyPr anchor="ctr"/>
           <a:lstStyle>
             <a:lvl1pPr marL="0" indent="0" algn="ctr">
               <a:buNone/>
-              <a:defRPr sz="2400" b="1" spc="-100" baseline="0"/>
+              <a:defRPr sz="2400" b="1" cap="small" spc="-100" baseline="0">
+                <a:solidFill>
+                  <a:srgbClr val="231F20"/>
+                </a:solidFill>
+              </a:defRPr>
             </a:lvl1pPr>
             <a:lvl2pPr marL="457200" indent="0">
               <a:buNone/>
@@ -1670,7 +1872,7 @@
           <a:p>
             <a:pPr lvl="0"/>
             <a:r>
-              <a:rPr lang="en-US" smtClean="0"/>
+              <a:rPr lang="en-US" dirty="0" smtClean="0"/>
               <a:t>Click to edit Master text styles</a:t>
             </a:r>
           </a:p>
@@ -1688,7 +1890,7 @@
         </p:nvSpPr>
         <p:spPr>
           <a:xfrm>
-            <a:off x="4645025" y="2174874"/>
+            <a:off x="4645025" y="2251075"/>
             <a:ext cx="4041775" cy="4302125"/>
           </a:xfrm>
         </p:spPr>
@@ -1847,7 +2049,7 @@
             <a:fld id="{1D8BD707-D9CF-40AE-B4C6-C98DA3205C09}" type="datetimeFigureOut">
               <a:rPr lang="en-US" smtClean="0"/>
               <a:pPr/>
-              <a:t>5/1/2013</a:t>
+              <a:t>5/2/2013</a:t>
             </a:fld>
             <a:endParaRPr lang="en-US"/>
           </a:p>
@@ -1975,7 +2177,7 @@
             <a:fld id="{1D8BD707-D9CF-40AE-B4C6-C98DA3205C09}" type="datetimeFigureOut">
               <a:rPr lang="en-US" smtClean="0"/>
               <a:pPr/>
-              <a:t>5/1/2013</a:t>
+              <a:t>5/2/2013</a:t>
             </a:fld>
             <a:endParaRPr lang="en-US"/>
           </a:p>
@@ -2285,7 +2487,7 @@
             <a:fld id="{1D8BD707-D9CF-40AE-B4C6-C98DA3205C09}" type="datetimeFigureOut">
               <a:rPr lang="en-US" smtClean="0"/>
               <a:pPr/>
-              <a:t>5/1/2013</a:t>
+              <a:t>5/2/2013</a:t>
             </a:fld>
             <a:endParaRPr lang="en-US"/>
           </a:p>
@@ -2571,7 +2773,7 @@
             <a:fld id="{1D8BD707-D9CF-40AE-B4C6-C98DA3205C09}" type="datetimeFigureOut">
               <a:rPr lang="en-US" smtClean="0"/>
               <a:pPr/>
-              <a:t>5/1/2013</a:t>
+              <a:t>5/2/2013</a:t>
             </a:fld>
             <a:endParaRPr lang="en-US"/>
           </a:p>
@@ -3164,10 +3366,18 @@
           <a:lstStyle/>
           <a:p>
             <a:r>
-              <a:rPr lang="en-US" sz="6000" dirty="0" smtClean="0"/>
-              <a:t>Charter Fishing</a:t>
-            </a:r>
-            <a:endParaRPr lang="en-US" sz="6000" dirty="0"/>
+              <a:rPr lang="en-US" sz="6600" dirty="0" smtClean="0"/>
+              <a:t>Cha</a:t>
+            </a:r>
+            <a:r>
+              <a:rPr lang="en-US" sz="6600" spc="-200" dirty="0" smtClean="0"/>
+              <a:t>r</a:t>
+            </a:r>
+            <a:r>
+              <a:rPr lang="en-US" sz="6600" dirty="0" smtClean="0"/>
+              <a:t>ter Fishing</a:t>
+            </a:r>
+            <a:endParaRPr lang="en-US" sz="6600" dirty="0"/>
           </a:p>
         </p:txBody>
       </p:sp>
@@ -3207,6 +3417,287 @@
   <p:transition>
     <p:fade/>
   </p:transition>
+  <p:timing>
+    <p:tnLst>
+      <p:par>
+        <p:cTn id="1" dur="indefinite" restart="never" nodeType="tmRoot"/>
+      </p:par>
+    </p:tnLst>
+  </p:timing>
+</p:sld>
+</file>
+
+<file path=ppt/slides/slide10.xml><?xml version="1.0" encoding="utf-8"?>
+<p:sld xmlns:a="http://schemas.openxmlformats.org/drawingml/2006/main" xmlns:r="http://schemas.openxmlformats.org/officeDocument/2006/relationships" xmlns:p="http://schemas.openxmlformats.org/presentationml/2006/main">
+  <p:cSld>
+    <p:spTree>
+      <p:nvGrpSpPr>
+        <p:cNvPr id="1" name=""/>
+        <p:cNvGrpSpPr/>
+        <p:nvPr/>
+      </p:nvGrpSpPr>
+      <p:grpSpPr>
+        <a:xfrm>
+          <a:off x="0" y="0"/>
+          <a:ext cx="0" cy="0"/>
+          <a:chOff x="0" y="0"/>
+          <a:chExt cx="0" cy="0"/>
+        </a:xfrm>
+      </p:grpSpPr>
+      <p:sp>
+        <p:nvSpPr>
+          <p:cNvPr id="2" name="Title 1"/>
+          <p:cNvSpPr>
+            <a:spLocks noGrp="1"/>
+          </p:cNvSpPr>
+          <p:nvPr>
+            <p:ph type="title"/>
+          </p:nvPr>
+        </p:nvSpPr>
+        <p:spPr/>
+        <p:txBody>
+          <a:bodyPr>
+            <a:normAutofit fontScale="90000"/>
+          </a:bodyPr>
+          <a:lstStyle/>
+          <a:p>
+            <a:r>
+              <a:rPr lang="en-US" smtClean="0"/>
+              <a:t>Screenshots of Fish ‘n’ Spots</a:t>
+            </a:r>
+            <a:endParaRPr lang="en-US" dirty="0"/>
+          </a:p>
+        </p:txBody>
+      </p:sp>
+      <p:sp>
+        <p:nvSpPr>
+          <p:cNvPr id="3" name="Text Placeholder 2"/>
+          <p:cNvSpPr>
+            <a:spLocks noGrp="1"/>
+          </p:cNvSpPr>
+          <p:nvPr>
+            <p:ph type="body" idx="1"/>
+          </p:nvPr>
+        </p:nvSpPr>
+        <p:spPr/>
+        <p:txBody>
+          <a:bodyPr/>
+          <a:lstStyle/>
+          <a:p>
+            <a:r>
+              <a:rPr lang="en-US" smtClean="0"/>
+              <a:t>v</a:t>
+            </a:r>
+            <a:r>
+              <a:rPr lang="en-US" smtClean="0"/>
+              <a:t>iewing a location (phone)</a:t>
+            </a:r>
+            <a:endParaRPr lang="en-US" dirty="0"/>
+          </a:p>
+        </p:txBody>
+      </p:sp>
+      <p:pic>
+        <p:nvPicPr>
+          <p:cNvPr id="7" name="Content Placeholder 6"/>
+          <p:cNvPicPr>
+            <a:picLocks noGrp="1" noChangeAspect="1"/>
+          </p:cNvPicPr>
+          <p:nvPr>
+            <p:ph sz="half" idx="2"/>
+          </p:nvPr>
+        </p:nvPicPr>
+        <p:blipFill>
+          <a:blip r:embed="rId2" cstate="print">
+            <a:extLst>
+              <a:ext uri="{28A0092B-C50C-407E-A947-70E740481C1C}">
+                <a14:useLocalDpi xmlns:a14="http://schemas.microsoft.com/office/drawing/2010/main" val="0"/>
+              </a:ext>
+            </a:extLst>
+          </a:blip>
+          <a:stretch>
+            <a:fillRect/>
+          </a:stretch>
+        </p:blipFill>
+        <p:spPr>
+          <a:xfrm>
+            <a:off x="1365413" y="2425691"/>
+            <a:ext cx="2223762" cy="3952892"/>
+          </a:xfrm>
+        </p:spPr>
+      </p:pic>
+      <p:sp>
+        <p:nvSpPr>
+          <p:cNvPr id="5" name="Text Placeholder 4"/>
+          <p:cNvSpPr>
+            <a:spLocks noGrp="1"/>
+          </p:cNvSpPr>
+          <p:nvPr>
+            <p:ph type="body" sz="quarter" idx="3"/>
+          </p:nvPr>
+        </p:nvSpPr>
+        <p:spPr/>
+        <p:txBody>
+          <a:bodyPr/>
+          <a:lstStyle/>
+          <a:p>
+            <a:r>
+              <a:rPr lang="en-US" smtClean="0"/>
+              <a:t>viewing a </a:t>
+            </a:r>
+            <a:r>
+              <a:rPr lang="en-US" smtClean="0"/>
+              <a:t>l</a:t>
+            </a:r>
+            <a:r>
+              <a:rPr lang="en-US" smtClean="0"/>
+              <a:t>ocation (tablet)</a:t>
+            </a:r>
+            <a:endParaRPr lang="en-US" dirty="0"/>
+          </a:p>
+        </p:txBody>
+      </p:sp>
+      <p:pic>
+        <p:nvPicPr>
+          <p:cNvPr id="8" name="Content Placeholder 7"/>
+          <p:cNvPicPr>
+            <a:picLocks noGrp="1" noChangeAspect="1"/>
+          </p:cNvPicPr>
+          <p:nvPr>
+            <p:ph sz="quarter" idx="4"/>
+          </p:nvPr>
+        </p:nvPicPr>
+        <p:blipFill>
+          <a:blip r:embed="rId3" cstate="print">
+            <a:extLst>
+              <a:ext uri="{28A0092B-C50C-407E-A947-70E740481C1C}">
+                <a14:useLocalDpi xmlns:a14="http://schemas.microsoft.com/office/drawing/2010/main" val="0"/>
+              </a:ext>
+            </a:extLst>
+          </a:blip>
+          <a:stretch>
+            <a:fillRect/>
+          </a:stretch>
+        </p:blipFill>
+        <p:spPr>
+          <a:xfrm>
+            <a:off x="5429334" y="2425691"/>
+            <a:ext cx="2473156" cy="3952892"/>
+          </a:xfrm>
+        </p:spPr>
+      </p:pic>
+    </p:spTree>
+    <p:extLst>
+      <p:ext uri="{BB962C8B-B14F-4D97-AF65-F5344CB8AC3E}">
+        <p14:creationId xmlns:p14="http://schemas.microsoft.com/office/powerpoint/2010/main" val="3092310823"/>
+      </p:ext>
+    </p:extLst>
+  </p:cSld>
+  <p:clrMapOvr>
+    <a:masterClrMapping/>
+  </p:clrMapOvr>
+  <mc:AlternateContent xmlns:mc="http://schemas.openxmlformats.org/markup-compatibility/2006" xmlns:p14="http://schemas.microsoft.com/office/powerpoint/2010/main">
+    <mc:Choice Requires="p14">
+      <p:transition p14:dur="150">
+        <p:fade/>
+      </p:transition>
+    </mc:Choice>
+    <mc:Fallback xmlns="">
+      <p:transition>
+        <p:fade/>
+      </p:transition>
+    </mc:Fallback>
+  </mc:AlternateContent>
+  <p:timing>
+    <p:tnLst>
+      <p:par>
+        <p:cTn id="1" dur="indefinite" restart="never" nodeType="tmRoot"/>
+      </p:par>
+    </p:tnLst>
+  </p:timing>
+</p:sld>
+</file>
+
+<file path=ppt/slides/slide11.xml><?xml version="1.0" encoding="utf-8"?>
+<p:sld xmlns:a="http://schemas.openxmlformats.org/drawingml/2006/main" xmlns:r="http://schemas.openxmlformats.org/officeDocument/2006/relationships" xmlns:p="http://schemas.openxmlformats.org/presentationml/2006/main">
+  <p:cSld>
+    <p:spTree>
+      <p:nvGrpSpPr>
+        <p:cNvPr id="1" name=""/>
+        <p:cNvGrpSpPr/>
+        <p:nvPr/>
+      </p:nvGrpSpPr>
+      <p:grpSpPr>
+        <a:xfrm>
+          <a:off x="0" y="0"/>
+          <a:ext cx="0" cy="0"/>
+          <a:chOff x="0" y="0"/>
+          <a:chExt cx="0" cy="0"/>
+        </a:xfrm>
+      </p:grpSpPr>
+      <p:sp>
+        <p:nvSpPr>
+          <p:cNvPr id="2" name="Title 1"/>
+          <p:cNvSpPr>
+            <a:spLocks noGrp="1"/>
+          </p:cNvSpPr>
+          <p:nvPr>
+            <p:ph type="title"/>
+          </p:nvPr>
+        </p:nvSpPr>
+        <p:spPr/>
+        <p:txBody>
+          <a:bodyPr/>
+          <a:lstStyle/>
+          <a:p>
+            <a:r>
+              <a:rPr lang="en-US" dirty="0" smtClean="0"/>
+              <a:t>Thank you!</a:t>
+            </a:r>
+            <a:endParaRPr lang="en-US" dirty="0"/>
+          </a:p>
+        </p:txBody>
+      </p:sp>
+      <p:sp>
+        <p:nvSpPr>
+          <p:cNvPr id="4" name="Text Placeholder 3"/>
+          <p:cNvSpPr>
+            <a:spLocks noGrp="1"/>
+          </p:cNvSpPr>
+          <p:nvPr>
+            <p:ph type="body" idx="1"/>
+          </p:nvPr>
+        </p:nvSpPr>
+        <p:spPr/>
+        <p:txBody>
+          <a:bodyPr/>
+          <a:lstStyle/>
+          <a:p>
+            <a:endParaRPr lang="en-US"/>
+          </a:p>
+        </p:txBody>
+      </p:sp>
+    </p:spTree>
+    <p:extLst>
+      <p:ext uri="{BB962C8B-B14F-4D97-AF65-F5344CB8AC3E}">
+        <p14:creationId xmlns:p14="http://schemas.microsoft.com/office/powerpoint/2010/main" val="2542890997"/>
+      </p:ext>
+    </p:extLst>
+  </p:cSld>
+  <p:clrMapOvr>
+    <a:masterClrMapping/>
+  </p:clrMapOvr>
+  <mc:AlternateContent xmlns:mc="http://schemas.openxmlformats.org/markup-compatibility/2006" xmlns:p14="http://schemas.microsoft.com/office/powerpoint/2010/main">
+    <mc:Choice Requires="p14">
+      <p:transition p14:dur="150">
+        <p:fade/>
+      </p:transition>
+    </mc:Choice>
+    <mc:Fallback xmlns="">
+      <p:transition>
+        <p:fade/>
+      </p:transition>
+    </mc:Fallback>
+  </mc:AlternateContent>
   <p:timing>
     <p:tnLst>
       <p:par>
@@ -3251,7 +3742,7 @@
           <a:p>
             <a:r>
               <a:rPr lang="en-US" dirty="0" smtClean="0"/>
-              <a:t>Hello, World!</a:t>
+              <a:t>What is our DB used for?</a:t>
             </a:r>
             <a:endParaRPr lang="en-US" dirty="0"/>
           </a:p>
@@ -3269,14 +3760,84 @@
         </p:nvSpPr>
         <p:spPr/>
         <p:txBody>
-          <a:bodyPr/>
+          <a:bodyPr>
+            <a:normAutofit fontScale="92500" lnSpcReduction="10000"/>
+          </a:bodyPr>
           <a:lstStyle/>
           <a:p>
             <a:r>
               <a:rPr lang="en-US" dirty="0" smtClean="0"/>
-              <a:t>Here’s some text.</a:t>
-            </a:r>
-            <a:endParaRPr lang="en-US" dirty="0"/>
+              <a:t>Intended for Charter Fishing companies</a:t>
+            </a:r>
+          </a:p>
+          <a:p>
+            <a:r>
+              <a:rPr lang="en-US" dirty="0" smtClean="0"/>
+              <a:t>Stores information about</a:t>
+            </a:r>
+          </a:p>
+          <a:p>
+            <a:pPr lvl="1"/>
+            <a:r>
+              <a:rPr lang="en-US" dirty="0" smtClean="0"/>
+              <a:t>Groups</a:t>
+            </a:r>
+          </a:p>
+          <a:p>
+            <a:pPr lvl="2"/>
+            <a:r>
+              <a:rPr lang="en-US" dirty="0" smtClean="0"/>
+              <a:t>These are customers that want to go fishing</a:t>
+            </a:r>
+          </a:p>
+          <a:p>
+            <a:pPr lvl="1"/>
+            <a:r>
+              <a:rPr lang="en-US" dirty="0" smtClean="0"/>
+              <a:t>Boats</a:t>
+            </a:r>
+          </a:p>
+          <a:p>
+            <a:pPr lvl="1"/>
+            <a:r>
+              <a:rPr lang="en-US" dirty="0" smtClean="0"/>
+              <a:t>Crew Members</a:t>
+            </a:r>
+          </a:p>
+          <a:p>
+            <a:pPr lvl="2"/>
+            <a:r>
+              <a:rPr lang="en-US" dirty="0" smtClean="0"/>
+              <a:t>Captains and skippers</a:t>
+            </a:r>
+          </a:p>
+          <a:p>
+            <a:pPr lvl="1"/>
+            <a:r>
+              <a:rPr lang="en-US" dirty="0" smtClean="0"/>
+              <a:t>Fishing locations</a:t>
+            </a:r>
+          </a:p>
+          <a:p>
+            <a:pPr lvl="1"/>
+            <a:r>
+              <a:rPr lang="en-US" dirty="0" smtClean="0"/>
+              <a:t>Fishing equipment</a:t>
+            </a:r>
+          </a:p>
+          <a:p>
+            <a:pPr lvl="1"/>
+            <a:r>
+              <a:rPr lang="en-US" dirty="0" smtClean="0"/>
+              <a:t>Trips for customers to go on</a:t>
+            </a:r>
+          </a:p>
+          <a:p>
+            <a:pPr lvl="1"/>
+            <a:r>
+              <a:rPr lang="en-US" dirty="0" smtClean="0"/>
+              <a:t>Bunch more!</a:t>
+            </a:r>
           </a:p>
         </p:txBody>
       </p:sp>
@@ -3313,6 +3874,184 @@
 </file>
 
 <file path=ppt/slides/slide3.xml><?xml version="1.0" encoding="utf-8"?>
+<p:sld xmlns:a="http://schemas.openxmlformats.org/drawingml/2006/main" xmlns:r="http://schemas.openxmlformats.org/officeDocument/2006/relationships" xmlns:p="http://schemas.openxmlformats.org/presentationml/2006/main">
+  <p:cSld>
+    <p:spTree>
+      <p:nvGrpSpPr>
+        <p:cNvPr id="1" name=""/>
+        <p:cNvGrpSpPr/>
+        <p:nvPr/>
+      </p:nvGrpSpPr>
+      <p:grpSpPr>
+        <a:xfrm>
+          <a:off x="0" y="0"/>
+          <a:ext cx="0" cy="0"/>
+          <a:chOff x="0" y="0"/>
+          <a:chExt cx="0" cy="0"/>
+        </a:xfrm>
+      </p:grpSpPr>
+      <p:sp>
+        <p:nvSpPr>
+          <p:cNvPr id="2" name="Title 1"/>
+          <p:cNvSpPr>
+            <a:spLocks noGrp="1"/>
+          </p:cNvSpPr>
+          <p:nvPr>
+            <p:ph type="title"/>
+          </p:nvPr>
+        </p:nvSpPr>
+        <p:spPr/>
+        <p:txBody>
+          <a:bodyPr/>
+          <a:lstStyle/>
+          <a:p>
+            <a:endParaRPr lang="en-US"/>
+          </a:p>
+        </p:txBody>
+      </p:sp>
+      <p:sp>
+        <p:nvSpPr>
+          <p:cNvPr id="3" name="Content Placeholder 2"/>
+          <p:cNvSpPr>
+            <a:spLocks noGrp="1"/>
+          </p:cNvSpPr>
+          <p:nvPr>
+            <p:ph idx="1"/>
+          </p:nvPr>
+        </p:nvSpPr>
+        <p:spPr/>
+        <p:txBody>
+          <a:bodyPr/>
+          <a:lstStyle/>
+          <a:p>
+            <a:endParaRPr lang="en-US"/>
+          </a:p>
+        </p:txBody>
+      </p:sp>
+    </p:spTree>
+    <p:extLst>
+      <p:ext uri="{BB962C8B-B14F-4D97-AF65-F5344CB8AC3E}">
+        <p14:creationId xmlns:p14="http://schemas.microsoft.com/office/powerpoint/2010/main" val="2817422361"/>
+      </p:ext>
+    </p:extLst>
+  </p:cSld>
+  <p:clrMapOvr>
+    <a:masterClrMapping/>
+  </p:clrMapOvr>
+  <mc:AlternateContent xmlns:mc="http://schemas.openxmlformats.org/markup-compatibility/2006" xmlns:p14="http://schemas.microsoft.com/office/powerpoint/2010/main">
+    <mc:Choice Requires="p14">
+      <p:transition p14:dur="150">
+        <p:fade/>
+      </p:transition>
+    </mc:Choice>
+    <mc:Fallback xmlns="">
+      <p:transition>
+        <p:fade/>
+      </p:transition>
+    </mc:Fallback>
+  </mc:AlternateContent>
+  <p:timing>
+    <p:tnLst>
+      <p:par>
+        <p:cTn id="1" dur="indefinite" restart="never" nodeType="tmRoot"/>
+      </p:par>
+    </p:tnLst>
+  </p:timing>
+</p:sld>
+</file>
+
+<file path=ppt/slides/slide4.xml><?xml version="1.0" encoding="utf-8"?>
+<p:sld xmlns:a="http://schemas.openxmlformats.org/drawingml/2006/main" xmlns:r="http://schemas.openxmlformats.org/officeDocument/2006/relationships" xmlns:p="http://schemas.openxmlformats.org/presentationml/2006/main">
+  <p:cSld>
+    <p:spTree>
+      <p:nvGrpSpPr>
+        <p:cNvPr id="1" name=""/>
+        <p:cNvGrpSpPr/>
+        <p:nvPr/>
+      </p:nvGrpSpPr>
+      <p:grpSpPr>
+        <a:xfrm>
+          <a:off x="0" y="0"/>
+          <a:ext cx="0" cy="0"/>
+          <a:chOff x="0" y="0"/>
+          <a:chExt cx="0" cy="0"/>
+        </a:xfrm>
+      </p:grpSpPr>
+      <p:sp>
+        <p:nvSpPr>
+          <p:cNvPr id="2" name="Title 1"/>
+          <p:cNvSpPr>
+            <a:spLocks noGrp="1"/>
+          </p:cNvSpPr>
+          <p:nvPr>
+            <p:ph type="title"/>
+          </p:nvPr>
+        </p:nvSpPr>
+        <p:spPr/>
+        <p:txBody>
+          <a:bodyPr/>
+          <a:lstStyle/>
+          <a:p>
+            <a:r>
+              <a:rPr lang="en-US" dirty="0" smtClean="0"/>
+              <a:t>Making it Special</a:t>
+            </a:r>
+            <a:endParaRPr lang="en-US" dirty="0"/>
+          </a:p>
+        </p:txBody>
+      </p:sp>
+      <p:sp>
+        <p:nvSpPr>
+          <p:cNvPr id="3" name="Text Placeholder 2"/>
+          <p:cNvSpPr>
+            <a:spLocks noGrp="1"/>
+          </p:cNvSpPr>
+          <p:nvPr>
+            <p:ph type="body" idx="1"/>
+          </p:nvPr>
+        </p:nvSpPr>
+        <p:spPr/>
+        <p:txBody>
+          <a:bodyPr/>
+          <a:lstStyle/>
+          <a:p>
+            <a:endParaRPr lang="en-US"/>
+          </a:p>
+        </p:txBody>
+      </p:sp>
+    </p:spTree>
+    <p:extLst>
+      <p:ext uri="{BB962C8B-B14F-4D97-AF65-F5344CB8AC3E}">
+        <p14:creationId xmlns:p14="http://schemas.microsoft.com/office/powerpoint/2010/main" val="1499921711"/>
+      </p:ext>
+    </p:extLst>
+  </p:cSld>
+  <p:clrMapOvr>
+    <a:masterClrMapping/>
+  </p:clrMapOvr>
+  <mc:AlternateContent xmlns:mc="http://schemas.openxmlformats.org/markup-compatibility/2006" xmlns:p14="http://schemas.microsoft.com/office/powerpoint/2010/main">
+    <mc:Choice Requires="p14">
+      <p:transition p14:dur="150">
+        <p:fade/>
+      </p:transition>
+    </mc:Choice>
+    <mc:Fallback xmlns="">
+      <p:transition>
+        <p:fade/>
+      </p:transition>
+    </mc:Fallback>
+  </mc:AlternateContent>
+  <p:timing>
+    <p:tnLst>
+      <p:par>
+        <p:cTn id="1" dur="indefinite" restart="never" nodeType="tmRoot"/>
+      </p:par>
+    </p:tnLst>
+  </p:timing>
+</p:sld>
+</file>
+
+<file path=ppt/slides/slide5.xml><?xml version="1.0" encoding="utf-8"?>
 <p:sld xmlns:a="http://schemas.openxmlformats.org/drawingml/2006/main" xmlns:r="http://schemas.openxmlformats.org/officeDocument/2006/relationships" xmlns:p="http://schemas.openxmlformats.org/presentationml/2006/main">
   <p:cSld>
     <p:spTree>
@@ -3594,317 +4333,6 @@
 </p:sld>
 </file>
 
-<file path=ppt/slides/slide4.xml><?xml version="1.0" encoding="utf-8"?>
-<p:sld xmlns:a="http://schemas.openxmlformats.org/drawingml/2006/main" xmlns:r="http://schemas.openxmlformats.org/officeDocument/2006/relationships" xmlns:p="http://schemas.openxmlformats.org/presentationml/2006/main">
-  <p:cSld>
-    <p:spTree>
-      <p:nvGrpSpPr>
-        <p:cNvPr id="1" name=""/>
-        <p:cNvGrpSpPr/>
-        <p:nvPr/>
-      </p:nvGrpSpPr>
-      <p:grpSpPr>
-        <a:xfrm>
-          <a:off x="0" y="0"/>
-          <a:ext cx="0" cy="0"/>
-          <a:chOff x="0" y="0"/>
-          <a:chExt cx="0" cy="0"/>
-        </a:xfrm>
-      </p:grpSpPr>
-      <p:sp>
-        <p:nvSpPr>
-          <p:cNvPr id="2" name="Title 1"/>
-          <p:cNvSpPr>
-            <a:spLocks noGrp="1"/>
-          </p:cNvSpPr>
-          <p:nvPr>
-            <p:ph type="title"/>
-          </p:nvPr>
-        </p:nvSpPr>
-        <p:spPr/>
-        <p:txBody>
-          <a:bodyPr/>
-          <a:lstStyle/>
-          <a:p>
-            <a:r>
-              <a:rPr lang="en-US" dirty="0" smtClean="0"/>
-              <a:t>What is Fish ‘n’ Spots?</a:t>
-            </a:r>
-            <a:endParaRPr lang="en-US" dirty="0"/>
-          </a:p>
-        </p:txBody>
-      </p:sp>
-      <p:sp>
-        <p:nvSpPr>
-          <p:cNvPr id="3" name="Content Placeholder 2"/>
-          <p:cNvSpPr>
-            <a:spLocks noGrp="1"/>
-          </p:cNvSpPr>
-          <p:nvPr>
-            <p:ph sz="half" idx="1"/>
-          </p:nvPr>
-        </p:nvSpPr>
-        <p:spPr/>
-        <p:txBody>
-          <a:bodyPr>
-            <a:normAutofit fontScale="92500" lnSpcReduction="10000"/>
-          </a:bodyPr>
-          <a:lstStyle/>
-          <a:p>
-            <a:r>
-              <a:rPr lang="en-US" dirty="0" smtClean="0"/>
-              <a:t>An application that can allow a fisherman to save their current location</a:t>
-            </a:r>
-          </a:p>
-          <a:p>
-            <a:pPr lvl="1"/>
-            <a:r>
-              <a:rPr lang="en-US" dirty="0" smtClean="0"/>
-              <a:t>Location is found using the device’s GPS</a:t>
-            </a:r>
-          </a:p>
-          <a:p>
-            <a:r>
-              <a:rPr lang="en-US" dirty="0" smtClean="0"/>
-              <a:t>Allows angler to build up a list of locations</a:t>
-            </a:r>
-          </a:p>
-          <a:p>
-            <a:pPr lvl="1"/>
-            <a:r>
-              <a:rPr lang="en-US" dirty="0" smtClean="0"/>
-              <a:t>These are their favorite fishing spots!</a:t>
-            </a:r>
-          </a:p>
-          <a:p>
-            <a:r>
-              <a:rPr lang="en-US" dirty="0" smtClean="0"/>
-              <a:t>Shows a Google satellite picture of the </a:t>
-            </a:r>
-            <a:r>
-              <a:rPr lang="en-US" dirty="0" err="1" smtClean="0"/>
-              <a:t>fishin</a:t>
-            </a:r>
-            <a:r>
-              <a:rPr lang="en-US" dirty="0" smtClean="0"/>
-              <a:t>’ spot</a:t>
-            </a:r>
-            <a:endParaRPr lang="en-US" dirty="0"/>
-          </a:p>
-        </p:txBody>
-      </p:sp>
-      <p:pic>
-        <p:nvPicPr>
-          <p:cNvPr id="5" name="Content Placeholder 4"/>
-          <p:cNvPicPr>
-            <a:picLocks noGrp="1" noChangeAspect="1"/>
-          </p:cNvPicPr>
-          <p:nvPr>
-            <p:ph sz="half" idx="2"/>
-          </p:nvPr>
-        </p:nvPicPr>
-        <p:blipFill>
-          <a:blip r:embed="rId2" cstate="print">
-            <a:extLst>
-              <a:ext uri="{28A0092B-C50C-407E-A947-70E740481C1C}">
-                <a14:useLocalDpi xmlns:a14="http://schemas.microsoft.com/office/drawing/2010/main" val="0"/>
-              </a:ext>
-            </a:extLst>
-          </a:blip>
-          <a:stretch>
-            <a:fillRect/>
-          </a:stretch>
-        </p:blipFill>
-        <p:spPr>
-          <a:xfrm>
-            <a:off x="5253137" y="1600200"/>
-            <a:ext cx="2828726" cy="4525963"/>
-          </a:xfrm>
-        </p:spPr>
-      </p:pic>
-    </p:spTree>
-    <p:extLst>
-      <p:ext uri="{BB962C8B-B14F-4D97-AF65-F5344CB8AC3E}">
-        <p14:creationId xmlns:p14="http://schemas.microsoft.com/office/powerpoint/2010/main" val="3448264058"/>
-      </p:ext>
-    </p:extLst>
-  </p:cSld>
-  <p:clrMapOvr>
-    <a:masterClrMapping/>
-  </p:clrMapOvr>
-  <mc:AlternateContent xmlns:mc="http://schemas.openxmlformats.org/markup-compatibility/2006" xmlns:p14="http://schemas.microsoft.com/office/powerpoint/2010/main">
-    <mc:Choice Requires="p14">
-      <p:transition p14:dur="150">
-        <p:fade/>
-      </p:transition>
-    </mc:Choice>
-    <mc:Fallback xmlns="">
-      <p:transition>
-        <p:fade/>
-      </p:transition>
-    </mc:Fallback>
-  </mc:AlternateContent>
-  <p:timing>
-    <p:tnLst>
-      <p:par>
-        <p:cTn id="1" dur="indefinite" restart="never" nodeType="tmRoot"/>
-      </p:par>
-    </p:tnLst>
-  </p:timing>
-</p:sld>
-</file>
-
-<file path=ppt/slides/slide5.xml><?xml version="1.0" encoding="utf-8"?>
-<p:sld xmlns:a="http://schemas.openxmlformats.org/drawingml/2006/main" xmlns:r="http://schemas.openxmlformats.org/officeDocument/2006/relationships" xmlns:p="http://schemas.openxmlformats.org/presentationml/2006/main">
-  <p:cSld>
-    <p:spTree>
-      <p:nvGrpSpPr>
-        <p:cNvPr id="1" name=""/>
-        <p:cNvGrpSpPr/>
-        <p:nvPr/>
-      </p:nvGrpSpPr>
-      <p:grpSpPr>
-        <a:xfrm>
-          <a:off x="0" y="0"/>
-          <a:ext cx="0" cy="0"/>
-          <a:chOff x="0" y="0"/>
-          <a:chExt cx="0" cy="0"/>
-        </a:xfrm>
-      </p:grpSpPr>
-      <p:sp>
-        <p:nvSpPr>
-          <p:cNvPr id="2" name="Title 1"/>
-          <p:cNvSpPr>
-            <a:spLocks noGrp="1"/>
-          </p:cNvSpPr>
-          <p:nvPr>
-            <p:ph type="title"/>
-          </p:nvPr>
-        </p:nvSpPr>
-        <p:spPr/>
-        <p:txBody>
-          <a:bodyPr/>
-          <a:lstStyle/>
-          <a:p>
-            <a:r>
-              <a:rPr lang="en-US" dirty="0" smtClean="0"/>
-              <a:t>Technology in Fish ‘n’ Spots</a:t>
-            </a:r>
-            <a:endParaRPr lang="en-US" dirty="0"/>
-          </a:p>
-        </p:txBody>
-      </p:sp>
-      <p:pic>
-        <p:nvPicPr>
-          <p:cNvPr id="7" name="Content Placeholder 6"/>
-          <p:cNvPicPr>
-            <a:picLocks noGrp="1" noChangeAspect="1"/>
-          </p:cNvPicPr>
-          <p:nvPr>
-            <p:ph sz="half" idx="1"/>
-          </p:nvPr>
-        </p:nvPicPr>
-        <p:blipFill>
-          <a:blip r:embed="rId2" cstate="print">
-            <a:extLst>
-              <a:ext uri="{28A0092B-C50C-407E-A947-70E740481C1C}">
-                <a14:useLocalDpi xmlns:a14="http://schemas.microsoft.com/office/drawing/2010/main" val="0"/>
-              </a:ext>
-            </a:extLst>
-          </a:blip>
-          <a:stretch>
-            <a:fillRect/>
-          </a:stretch>
-        </p:blipFill>
-        <p:spPr>
-          <a:xfrm>
-            <a:off x="560428" y="1600200"/>
-            <a:ext cx="3832143" cy="4525963"/>
-          </a:xfrm>
-        </p:spPr>
-      </p:pic>
-      <p:sp>
-        <p:nvSpPr>
-          <p:cNvPr id="4" name="Content Placeholder 3"/>
-          <p:cNvSpPr>
-            <a:spLocks noGrp="1"/>
-          </p:cNvSpPr>
-          <p:nvPr>
-            <p:ph sz="half" idx="2"/>
-          </p:nvPr>
-        </p:nvSpPr>
-        <p:spPr/>
-        <p:txBody>
-          <a:bodyPr>
-            <a:normAutofit fontScale="92500" lnSpcReduction="20000"/>
-          </a:bodyPr>
-          <a:lstStyle/>
-          <a:p>
-            <a:r>
-              <a:rPr lang="en-US" dirty="0"/>
-              <a:t>Built for Android v4.0 (Ice Cream Sandwich) and above</a:t>
-            </a:r>
-          </a:p>
-          <a:p>
-            <a:r>
-              <a:rPr lang="en-US" dirty="0" smtClean="0"/>
-              <a:t>Uses the Fragment class</a:t>
-            </a:r>
-          </a:p>
-          <a:p>
-            <a:pPr lvl="1"/>
-            <a:r>
-              <a:rPr lang="en-US" dirty="0" smtClean="0"/>
-              <a:t>This means that it works awesomely (and differently) on devices with bigger screens</a:t>
-            </a:r>
-          </a:p>
-          <a:p>
-            <a:r>
-              <a:rPr lang="en-US" dirty="0" smtClean="0"/>
-              <a:t>Uses the Google Maps SDK to show a satellite view of saved locations</a:t>
-            </a:r>
-          </a:p>
-          <a:p>
-            <a:r>
-              <a:rPr lang="en-US" dirty="0" smtClean="0"/>
-              <a:t>SQLite is used to store the list of locations</a:t>
-            </a:r>
-            <a:endParaRPr lang="en-US" dirty="0"/>
-          </a:p>
-        </p:txBody>
-      </p:sp>
-    </p:spTree>
-    <p:extLst>
-      <p:ext uri="{BB962C8B-B14F-4D97-AF65-F5344CB8AC3E}">
-        <p14:creationId xmlns:p14="http://schemas.microsoft.com/office/powerpoint/2010/main" val="3951424718"/>
-      </p:ext>
-    </p:extLst>
-  </p:cSld>
-  <p:clrMapOvr>
-    <a:masterClrMapping/>
-  </p:clrMapOvr>
-  <mc:AlternateContent xmlns:mc="http://schemas.openxmlformats.org/markup-compatibility/2006" xmlns:p14="http://schemas.microsoft.com/office/powerpoint/2010/main">
-    <mc:Choice Requires="p14">
-      <p:transition p14:dur="150">
-        <p:fade/>
-      </p:transition>
-    </mc:Choice>
-    <mc:Fallback xmlns="">
-      <p:transition>
-        <p:fade/>
-      </p:transition>
-    </mc:Fallback>
-  </mc:AlternateContent>
-  <p:timing>
-    <p:tnLst>
-      <p:par>
-        <p:cTn id="1" dur="indefinite" restart="never" nodeType="tmRoot"/>
-      </p:par>
-    </p:tnLst>
-  </p:timing>
-</p:sld>
-</file>
-
 <file path=ppt/slides/slide6.xml><?xml version="1.0" encoding="utf-8"?>
 <p:sld xmlns:a="http://schemas.openxmlformats.org/drawingml/2006/main" xmlns:r="http://schemas.openxmlformats.org/officeDocument/2006/relationships" xmlns:p="http://schemas.openxmlformats.org/presentationml/2006/main">
   <p:cSld>
@@ -3934,37 +4362,71 @@
         </p:nvSpPr>
         <p:spPr/>
         <p:txBody>
+          <a:bodyPr/>
+          <a:lstStyle/>
+          <a:p>
+            <a:r>
+              <a:rPr lang="en-US" dirty="0" smtClean="0"/>
+              <a:t>What is Fish ‘n’ Spots?</a:t>
+            </a:r>
+            <a:endParaRPr lang="en-US" dirty="0"/>
+          </a:p>
+        </p:txBody>
+      </p:sp>
+      <p:sp>
+        <p:nvSpPr>
+          <p:cNvPr id="3" name="Content Placeholder 2"/>
+          <p:cNvSpPr>
+            <a:spLocks noGrp="1"/>
+          </p:cNvSpPr>
+          <p:nvPr>
+            <p:ph sz="half" idx="1"/>
+          </p:nvPr>
+        </p:nvSpPr>
+        <p:spPr/>
+        <p:txBody>
           <a:bodyPr>
-            <a:normAutofit fontScale="90000"/>
+            <a:normAutofit fontScale="92500" lnSpcReduction="10000"/>
           </a:bodyPr>
           <a:lstStyle/>
           <a:p>
             <a:r>
               <a:rPr lang="en-US" dirty="0" smtClean="0"/>
-              <a:t>Screenshots of Fish ‘n’ Spots</a:t>
-            </a:r>
-            <a:endParaRPr lang="en-US" dirty="0"/>
-          </a:p>
-        </p:txBody>
-      </p:sp>
-      <p:sp>
-        <p:nvSpPr>
-          <p:cNvPr id="3" name="Text Placeholder 2"/>
-          <p:cNvSpPr>
-            <a:spLocks noGrp="1"/>
-          </p:cNvSpPr>
-          <p:nvPr>
-            <p:ph type="body" idx="1"/>
-          </p:nvPr>
-        </p:nvSpPr>
-        <p:spPr/>
-        <p:txBody>
-          <a:bodyPr/>
-          <a:lstStyle/>
-          <a:p>
+              <a:t>An application that can allow a fisherman to save their current location</a:t>
+            </a:r>
+          </a:p>
+          <a:p>
+            <a:pPr lvl="1"/>
             <a:r>
               <a:rPr lang="en-US" dirty="0" smtClean="0"/>
-              <a:t>Location List (Phone)</a:t>
+              <a:t>Location is found using the device’s GPS</a:t>
+            </a:r>
+          </a:p>
+          <a:p>
+            <a:r>
+              <a:rPr lang="en-US" dirty="0" smtClean="0"/>
+              <a:t>Allows angler to build up a list of locations</a:t>
+            </a:r>
+          </a:p>
+          <a:p>
+            <a:pPr lvl="1"/>
+            <a:r>
+              <a:rPr lang="en-US" dirty="0" smtClean="0"/>
+              <a:t>These are their favorite fishing spots!</a:t>
+            </a:r>
+          </a:p>
+          <a:p>
+            <a:r>
+              <a:rPr lang="en-US" dirty="0" smtClean="0"/>
+              <a:t>Shows a Google satellite picture of the </a:t>
+            </a:r>
+            <a:r>
+              <a:rPr lang="en-US" dirty="0" err="1" smtClean="0"/>
+              <a:t>fishin</a:t>
+            </a:r>
+            <a:r>
+              <a:rPr lang="en-US" dirty="0" smtClean="0"/>
+              <a:t>’ spot</a:t>
             </a:r>
             <a:endParaRPr lang="en-US" dirty="0"/>
           </a:p>
@@ -3972,7 +4434,7 @@
       </p:sp>
       <p:pic>
         <p:nvPicPr>
-          <p:cNvPr id="7" name="Content Placeholder 6"/>
+          <p:cNvPr id="5" name="Content Placeholder 4"/>
           <p:cNvPicPr>
             <a:picLocks noGrp="1" noChangeAspect="1"/>
           </p:cNvPicPr>
@@ -3994,67 +4456,15 @@
         </p:blipFill>
         <p:spPr>
           <a:xfrm>
-            <a:off x="1365994" y="2174875"/>
-            <a:ext cx="2222599" cy="3951288"/>
-          </a:xfrm>
-        </p:spPr>
-      </p:pic>
-      <p:sp>
-        <p:nvSpPr>
-          <p:cNvPr id="5" name="Text Placeholder 4"/>
-          <p:cNvSpPr>
-            <a:spLocks noGrp="1"/>
-          </p:cNvSpPr>
-          <p:nvPr>
-            <p:ph type="body" sz="quarter" idx="3"/>
-          </p:nvPr>
-        </p:nvSpPr>
-        <p:spPr/>
-        <p:txBody>
-          <a:bodyPr/>
-          <a:lstStyle/>
-          <a:p>
-            <a:r>
-              <a:rPr lang="en-US" dirty="0" smtClean="0"/>
-              <a:t>Location List (Tablet)</a:t>
-            </a:r>
-            <a:endParaRPr lang="en-US" dirty="0"/>
-          </a:p>
-        </p:txBody>
-      </p:sp>
-      <p:pic>
-        <p:nvPicPr>
-          <p:cNvPr id="8" name="Content Placeholder 7"/>
-          <p:cNvPicPr>
-            <a:picLocks noGrp="1" noChangeAspect="1"/>
-          </p:cNvPicPr>
-          <p:nvPr>
-            <p:ph sz="quarter" idx="4"/>
-          </p:nvPr>
-        </p:nvPicPr>
-        <p:blipFill>
-          <a:blip r:embed="rId3" cstate="print">
-            <a:extLst>
-              <a:ext uri="{28A0092B-C50C-407E-A947-70E740481C1C}">
-                <a14:useLocalDpi xmlns:a14="http://schemas.microsoft.com/office/drawing/2010/main" val="0"/>
-              </a:ext>
-            </a:extLst>
-          </a:blip>
-          <a:stretch>
-            <a:fillRect/>
-          </a:stretch>
-        </p:blipFill>
-        <p:spPr>
-          <a:xfrm>
-            <a:off x="5431135" y="2174875"/>
-            <a:ext cx="2469555" cy="3951288"/>
+            <a:off x="5253137" y="1600200"/>
+            <a:ext cx="2828726" cy="4525963"/>
           </a:xfrm>
         </p:spPr>
       </p:pic>
     </p:spTree>
     <p:extLst>
       <p:ext uri="{BB962C8B-B14F-4D97-AF65-F5344CB8AC3E}">
-        <p14:creationId xmlns:p14="http://schemas.microsoft.com/office/powerpoint/2010/main" val="2020334194"/>
+        <p14:creationId xmlns:p14="http://schemas.microsoft.com/office/powerpoint/2010/main" val="3448264058"/>
       </p:ext>
     </p:extLst>
   </p:cSld>
@@ -4112,37 +4522,12 @@
         </p:nvSpPr>
         <p:spPr/>
         <p:txBody>
-          <a:bodyPr>
-            <a:normAutofit fontScale="90000"/>
-          </a:bodyPr>
+          <a:bodyPr/>
           <a:lstStyle/>
           <a:p>
             <a:r>
               <a:rPr lang="en-US" dirty="0" smtClean="0"/>
-              <a:t>Screenshots of Fish ‘n’ Spots</a:t>
-            </a:r>
-            <a:endParaRPr lang="en-US" dirty="0"/>
-          </a:p>
-        </p:txBody>
-      </p:sp>
-      <p:sp>
-        <p:nvSpPr>
-          <p:cNvPr id="3" name="Text Placeholder 2"/>
-          <p:cNvSpPr>
-            <a:spLocks noGrp="1"/>
-          </p:cNvSpPr>
-          <p:nvPr>
-            <p:ph type="body" idx="1"/>
-          </p:nvPr>
-        </p:nvSpPr>
-        <p:spPr/>
-        <p:txBody>
-          <a:bodyPr/>
-          <a:lstStyle/>
-          <a:p>
-            <a:r>
-              <a:rPr lang="en-US" dirty="0" smtClean="0"/>
-              <a:t>Creating a Location (Phone)</a:t>
+              <a:t>Technology in Fish ‘n’ Spots</a:t>
             </a:r>
             <a:endParaRPr lang="en-US" dirty="0"/>
           </a:p>
@@ -4155,7 +4540,7 @@
             <a:picLocks noGrp="1" noChangeAspect="1"/>
           </p:cNvPicPr>
           <p:nvPr>
-            <p:ph sz="half" idx="2"/>
+            <p:ph sz="half" idx="1"/>
           </p:nvPr>
         </p:nvPicPr>
         <p:blipFill>
@@ -4172,67 +4557,65 @@
         </p:blipFill>
         <p:spPr>
           <a:xfrm>
-            <a:off x="1365994" y="2174875"/>
-            <a:ext cx="2222599" cy="3951288"/>
+            <a:off x="560428" y="1600200"/>
+            <a:ext cx="3832143" cy="4525963"/>
           </a:xfrm>
         </p:spPr>
       </p:pic>
       <p:sp>
         <p:nvSpPr>
-          <p:cNvPr id="5" name="Text Placeholder 4"/>
-          <p:cNvSpPr>
-            <a:spLocks noGrp="1"/>
-          </p:cNvSpPr>
-          <p:nvPr>
-            <p:ph type="body" sz="quarter" idx="3"/>
+          <p:cNvPr id="4" name="Content Placeholder 3"/>
+          <p:cNvSpPr>
+            <a:spLocks noGrp="1"/>
+          </p:cNvSpPr>
+          <p:nvPr>
+            <p:ph sz="half" idx="2"/>
           </p:nvPr>
         </p:nvSpPr>
         <p:spPr/>
         <p:txBody>
-          <a:bodyPr/>
-          <a:lstStyle/>
+          <a:bodyPr>
+            <a:normAutofit fontScale="92500" lnSpcReduction="20000"/>
+          </a:bodyPr>
+          <a:lstStyle/>
+          <a:p>
+            <a:r>
+              <a:rPr lang="en-US" dirty="0"/>
+              <a:t>Built for Android v4.0 (Ice Cream Sandwich) and above</a:t>
+            </a:r>
+          </a:p>
           <a:p>
             <a:r>
               <a:rPr lang="en-US" dirty="0" smtClean="0"/>
-              <a:t>Deleting a Location (Tablet)</a:t>
+              <a:t>Uses the Fragment class</a:t>
+            </a:r>
+          </a:p>
+          <a:p>
+            <a:pPr lvl="1"/>
+            <a:r>
+              <a:rPr lang="en-US" dirty="0" smtClean="0"/>
+              <a:t>This means that it works awesomely (and differently) on devices with bigger screens</a:t>
+            </a:r>
+          </a:p>
+          <a:p>
+            <a:r>
+              <a:rPr lang="en-US" dirty="0" smtClean="0"/>
+              <a:t>Uses the Google Maps SDK to show a satellite view of saved locations</a:t>
+            </a:r>
+          </a:p>
+          <a:p>
+            <a:r>
+              <a:rPr lang="en-US" dirty="0" smtClean="0"/>
+              <a:t>SQLite is used to store the list of locations</a:t>
             </a:r>
             <a:endParaRPr lang="en-US" dirty="0"/>
           </a:p>
         </p:txBody>
       </p:sp>
-      <p:pic>
-        <p:nvPicPr>
-          <p:cNvPr id="8" name="Content Placeholder 7"/>
-          <p:cNvPicPr>
-            <a:picLocks noGrp="1" noChangeAspect="1"/>
-          </p:cNvPicPr>
-          <p:nvPr>
-            <p:ph sz="quarter" idx="4"/>
-          </p:nvPr>
-        </p:nvPicPr>
-        <p:blipFill>
-          <a:blip r:embed="rId3" cstate="print">
-            <a:extLst>
-              <a:ext uri="{28A0092B-C50C-407E-A947-70E740481C1C}">
-                <a14:useLocalDpi xmlns:a14="http://schemas.microsoft.com/office/drawing/2010/main" val="0"/>
-              </a:ext>
-            </a:extLst>
-          </a:blip>
-          <a:stretch>
-            <a:fillRect/>
-          </a:stretch>
-        </p:blipFill>
-        <p:spPr>
-          <a:xfrm>
-            <a:off x="5431135" y="2174875"/>
-            <a:ext cx="2469555" cy="3951288"/>
-          </a:xfrm>
-        </p:spPr>
-      </p:pic>
     </p:spTree>
     <p:extLst>
       <p:ext uri="{BB962C8B-B14F-4D97-AF65-F5344CB8AC3E}">
-        <p14:creationId xmlns:p14="http://schemas.microsoft.com/office/powerpoint/2010/main" val="1633303520"/>
+        <p14:creationId xmlns:p14="http://schemas.microsoft.com/office/powerpoint/2010/main" val="3951424718"/>
       </p:ext>
     </p:extLst>
   </p:cSld>
@@ -4319,8 +4702,8 @@
           <a:lstStyle/>
           <a:p>
             <a:r>
-              <a:rPr lang="en-US" dirty="0" smtClean="0"/>
-              <a:t>Viewing a Location (Phone)</a:t>
+              <a:rPr lang="en-US" smtClean="0"/>
+              <a:t>location list (phone)</a:t>
             </a:r>
             <a:endParaRPr lang="en-US" dirty="0"/>
           </a:p>
@@ -4350,8 +4733,8 @@
         </p:blipFill>
         <p:spPr>
           <a:xfrm>
-            <a:off x="1365994" y="2174875"/>
-            <a:ext cx="2222599" cy="3951288"/>
+            <a:off x="1365466" y="2425786"/>
+            <a:ext cx="2223655" cy="3952702"/>
           </a:xfrm>
         </p:spPr>
       </p:pic>
@@ -4371,8 +4754,8 @@
           <a:lstStyle/>
           <a:p>
             <a:r>
-              <a:rPr lang="en-US" dirty="0" smtClean="0"/>
-              <a:t>Viewing a Location (Tablet)</a:t>
+              <a:rPr lang="en-US" smtClean="0"/>
+              <a:t>location list (tablet)</a:t>
             </a:r>
             <a:endParaRPr lang="en-US" dirty="0"/>
           </a:p>
@@ -4402,15 +4785,15 @@
         </p:blipFill>
         <p:spPr>
           <a:xfrm>
-            <a:off x="5431135" y="2174875"/>
-            <a:ext cx="2469555" cy="3951288"/>
+            <a:off x="5321498" y="2251075"/>
+            <a:ext cx="2688828" cy="4302125"/>
           </a:xfrm>
         </p:spPr>
       </p:pic>
     </p:spTree>
     <p:extLst>
       <p:ext uri="{BB962C8B-B14F-4D97-AF65-F5344CB8AC3E}">
-        <p14:creationId xmlns:p14="http://schemas.microsoft.com/office/powerpoint/2010/main" val="3092310823"/>
+        <p14:creationId xmlns:p14="http://schemas.microsoft.com/office/powerpoint/2010/main" val="2020334194"/>
       </p:ext>
     </p:extLst>
   </p:cSld>
@@ -4463,30 +4846,84 @@
             <a:spLocks noGrp="1"/>
           </p:cNvSpPr>
           <p:nvPr>
-            <p:ph type="ctrTitle"/>
+            <p:ph type="title"/>
           </p:nvPr>
         </p:nvSpPr>
         <p:spPr/>
         <p:txBody>
+          <a:bodyPr>
+            <a:normAutofit fontScale="90000"/>
+          </a:bodyPr>
+          <a:lstStyle/>
+          <a:p>
+            <a:r>
+              <a:rPr lang="en-US" smtClean="0"/>
+              <a:t>Screenshots of Fish ‘n’ Spots</a:t>
+            </a:r>
+            <a:endParaRPr lang="en-US" dirty="0"/>
+          </a:p>
+        </p:txBody>
+      </p:sp>
+      <p:sp>
+        <p:nvSpPr>
+          <p:cNvPr id="3" name="Text Placeholder 2"/>
+          <p:cNvSpPr>
+            <a:spLocks noGrp="1"/>
+          </p:cNvSpPr>
+          <p:nvPr>
+            <p:ph type="body" idx="1"/>
+          </p:nvPr>
+        </p:nvSpPr>
+        <p:spPr/>
+        <p:txBody>
           <a:bodyPr/>
           <a:lstStyle/>
           <a:p>
             <a:r>
-              <a:rPr lang="en-US" dirty="0" smtClean="0"/>
-              <a:t>Thank you!</a:t>
+              <a:rPr lang="en-US" smtClean="0"/>
+              <a:t>creating a location (phone)</a:t>
             </a:r>
             <a:endParaRPr lang="en-US" dirty="0"/>
           </a:p>
         </p:txBody>
       </p:sp>
-      <p:sp>
-        <p:nvSpPr>
-          <p:cNvPr id="3" name="Subtitle 2"/>
-          <p:cNvSpPr>
-            <a:spLocks noGrp="1"/>
-          </p:cNvSpPr>
-          <p:nvPr>
-            <p:ph type="subTitle" idx="1"/>
+      <p:pic>
+        <p:nvPicPr>
+          <p:cNvPr id="7" name="Content Placeholder 6"/>
+          <p:cNvPicPr>
+            <a:picLocks noGrp="1" noChangeAspect="1"/>
+          </p:cNvPicPr>
+          <p:nvPr>
+            <p:ph sz="half" idx="2"/>
+          </p:nvPr>
+        </p:nvPicPr>
+        <p:blipFill>
+          <a:blip r:embed="rId2" cstate="print">
+            <a:extLst>
+              <a:ext uri="{28A0092B-C50C-407E-A947-70E740481C1C}">
+                <a14:useLocalDpi xmlns:a14="http://schemas.microsoft.com/office/drawing/2010/main" val="0"/>
+              </a:ext>
+            </a:extLst>
+          </a:blip>
+          <a:stretch>
+            <a:fillRect/>
+          </a:stretch>
+        </p:blipFill>
+        <p:spPr>
+          <a:xfrm>
+            <a:off x="1365466" y="2425786"/>
+            <a:ext cx="2223655" cy="3952702"/>
+          </a:xfrm>
+        </p:spPr>
+      </p:pic>
+      <p:sp>
+        <p:nvSpPr>
+          <p:cNvPr id="5" name="Text Placeholder 4"/>
+          <p:cNvSpPr>
+            <a:spLocks noGrp="1"/>
+          </p:cNvSpPr>
+          <p:nvPr>
+            <p:ph type="body" sz="quarter" idx="3"/>
           </p:nvPr>
         </p:nvSpPr>
         <p:spPr/>
@@ -4494,14 +4931,47 @@
           <a:bodyPr/>
           <a:lstStyle/>
           <a:p>
-            <a:endParaRPr lang="en-US"/>
-          </a:p>
-        </p:txBody>
-      </p:sp>
+            <a:r>
+              <a:rPr lang="en-US" smtClean="0"/>
+              <a:t>deleting a location (tablet)</a:t>
+            </a:r>
+            <a:endParaRPr lang="en-US" dirty="0"/>
+          </a:p>
+        </p:txBody>
+      </p:sp>
+      <p:pic>
+        <p:nvPicPr>
+          <p:cNvPr id="8" name="Content Placeholder 7"/>
+          <p:cNvPicPr>
+            <a:picLocks noGrp="1" noChangeAspect="1"/>
+          </p:cNvPicPr>
+          <p:nvPr>
+            <p:ph sz="quarter" idx="4"/>
+          </p:nvPr>
+        </p:nvPicPr>
+        <p:blipFill>
+          <a:blip r:embed="rId3" cstate="print">
+            <a:extLst>
+              <a:ext uri="{28A0092B-C50C-407E-A947-70E740481C1C}">
+                <a14:useLocalDpi xmlns:a14="http://schemas.microsoft.com/office/drawing/2010/main" val="0"/>
+              </a:ext>
+            </a:extLst>
+          </a:blip>
+          <a:stretch>
+            <a:fillRect/>
+          </a:stretch>
+        </p:blipFill>
+        <p:spPr>
+          <a:xfrm>
+            <a:off x="5429334" y="2425691"/>
+            <a:ext cx="2473156" cy="3952892"/>
+          </a:xfrm>
+        </p:spPr>
+      </p:pic>
     </p:spTree>
     <p:extLst>
       <p:ext uri="{BB962C8B-B14F-4D97-AF65-F5344CB8AC3E}">
-        <p14:creationId xmlns:p14="http://schemas.microsoft.com/office/powerpoint/2010/main" val="2542890997"/>
+        <p14:creationId xmlns:p14="http://schemas.microsoft.com/office/powerpoint/2010/main" val="1633303520"/>
       </p:ext>
     </p:extLst>
   </p:cSld>

</xml_diff>

<commit_message>
ER diagram zoom ins added to presentation
</commit_message>
<xml_diff>
--- a/documents/Presentation.pptx
+++ b/documents/Presentation.pptx
@@ -6,16 +6,20 @@
   </p:sldMasterIdLst>
   <p:sldIdLst>
     <p:sldId id="256" r:id="rId2"/>
-    <p:sldId id="257" r:id="rId3"/>
-    <p:sldId id="265" r:id="rId4"/>
-    <p:sldId id="266" r:id="rId5"/>
-    <p:sldId id="258" r:id="rId6"/>
-    <p:sldId id="261" r:id="rId7"/>
-    <p:sldId id="260" r:id="rId8"/>
-    <p:sldId id="259" r:id="rId9"/>
-    <p:sldId id="262" r:id="rId10"/>
-    <p:sldId id="263" r:id="rId11"/>
-    <p:sldId id="264" r:id="rId12"/>
+    <p:sldId id="270" r:id="rId3"/>
+    <p:sldId id="257" r:id="rId4"/>
+    <p:sldId id="265" r:id="rId5"/>
+    <p:sldId id="267" r:id="rId6"/>
+    <p:sldId id="268" r:id="rId7"/>
+    <p:sldId id="269" r:id="rId8"/>
+    <p:sldId id="266" r:id="rId9"/>
+    <p:sldId id="258" r:id="rId10"/>
+    <p:sldId id="261" r:id="rId11"/>
+    <p:sldId id="260" r:id="rId12"/>
+    <p:sldId id="259" r:id="rId13"/>
+    <p:sldId id="262" r:id="rId14"/>
+    <p:sldId id="263" r:id="rId15"/>
+    <p:sldId id="264" r:id="rId16"/>
   </p:sldIdLst>
   <p:sldSz cx="9144000" cy="6858000" type="screen4x3"/>
   <p:notesSz cx="6858000" cy="9144000"/>
@@ -195,6 +199,9 @@
             <a:off x="0" y="2130425"/>
             <a:ext cx="9144000" cy="1470025"/>
           </a:xfrm>
+          <a:solidFill>
+            <a:srgbClr val="D8DF20"/>
+          </a:solidFill>
         </p:spPr>
         <p:txBody>
           <a:bodyPr>
@@ -204,7 +211,7 @@
             <a:lvl1pPr>
               <a:defRPr lang="en-US" sz="6000" b="0" kern="1200" spc="-300" baseline="0" dirty="0" smtClean="0">
                 <a:solidFill>
-                  <a:schemeClr val="bg1"/>
+                  <a:srgbClr val="231F20"/>
                 </a:solidFill>
                 <a:latin typeface="Arial Black" pitchFamily="34" charset="0"/>
                 <a:ea typeface="+mj-ea"/>
@@ -3456,41 +3463,71 @@
         </p:nvSpPr>
         <p:spPr/>
         <p:txBody>
+          <a:bodyPr/>
+          <a:lstStyle/>
+          <a:p>
+            <a:r>
+              <a:rPr lang="en-US" dirty="0" smtClean="0"/>
+              <a:t>What is Fish ‘n’ Spots?</a:t>
+            </a:r>
+            <a:endParaRPr lang="en-US" dirty="0"/>
+          </a:p>
+        </p:txBody>
+      </p:sp>
+      <p:sp>
+        <p:nvSpPr>
+          <p:cNvPr id="3" name="Content Placeholder 2"/>
+          <p:cNvSpPr>
+            <a:spLocks noGrp="1"/>
+          </p:cNvSpPr>
+          <p:nvPr>
+            <p:ph sz="half" idx="1"/>
+          </p:nvPr>
+        </p:nvSpPr>
+        <p:spPr/>
+        <p:txBody>
           <a:bodyPr>
-            <a:normAutofit fontScale="90000"/>
+            <a:normAutofit fontScale="92500" lnSpcReduction="10000"/>
           </a:bodyPr>
           <a:lstStyle/>
           <a:p>
             <a:r>
-              <a:rPr lang="en-US" smtClean="0"/>
-              <a:t>Screenshots of Fish ‘n’ Spots</a:t>
-            </a:r>
-            <a:endParaRPr lang="en-US" dirty="0"/>
-          </a:p>
-        </p:txBody>
-      </p:sp>
-      <p:sp>
-        <p:nvSpPr>
-          <p:cNvPr id="3" name="Text Placeholder 2"/>
-          <p:cNvSpPr>
-            <a:spLocks noGrp="1"/>
-          </p:cNvSpPr>
-          <p:nvPr>
-            <p:ph type="body" idx="1"/>
-          </p:nvPr>
-        </p:nvSpPr>
-        <p:spPr/>
-        <p:txBody>
-          <a:bodyPr/>
-          <a:lstStyle/>
-          <a:p>
-            <a:r>
-              <a:rPr lang="en-US" smtClean="0"/>
-              <a:t>v</a:t>
-            </a:r>
-            <a:r>
-              <a:rPr lang="en-US" smtClean="0"/>
-              <a:t>iewing a location (phone)</a:t>
+              <a:rPr lang="en-US" dirty="0" smtClean="0"/>
+              <a:t>An application that can allow a fisherman to save their current location</a:t>
+            </a:r>
+          </a:p>
+          <a:p>
+            <a:pPr lvl="1"/>
+            <a:r>
+              <a:rPr lang="en-US" dirty="0" smtClean="0"/>
+              <a:t>Location is found using the device’s GPS</a:t>
+            </a:r>
+          </a:p>
+          <a:p>
+            <a:r>
+              <a:rPr lang="en-US" dirty="0" smtClean="0"/>
+              <a:t>Allows angler to build up a list of locations</a:t>
+            </a:r>
+          </a:p>
+          <a:p>
+            <a:pPr lvl="1"/>
+            <a:r>
+              <a:rPr lang="en-US" dirty="0" smtClean="0"/>
+              <a:t>These are their favorite fishing spots!</a:t>
+            </a:r>
+          </a:p>
+          <a:p>
+            <a:r>
+              <a:rPr lang="en-US" dirty="0" smtClean="0"/>
+              <a:t>Shows a Google satellite picture of the </a:t>
+            </a:r>
+            <a:r>
+              <a:rPr lang="en-US" dirty="0" err="1" smtClean="0"/>
+              <a:t>fishin</a:t>
+            </a:r>
+            <a:r>
+              <a:rPr lang="en-US" dirty="0" smtClean="0"/>
+              <a:t>’ spot</a:t>
             </a:r>
             <a:endParaRPr lang="en-US" dirty="0"/>
           </a:p>
@@ -3498,7 +3535,7 @@
       </p:sp>
       <p:pic>
         <p:nvPicPr>
-          <p:cNvPr id="7" name="Content Placeholder 6"/>
+          <p:cNvPr id="5" name="Content Placeholder 4"/>
           <p:cNvPicPr>
             <a:picLocks noGrp="1" noChangeAspect="1"/>
           </p:cNvPicPr>
@@ -3520,6 +3557,639 @@
         </p:blipFill>
         <p:spPr>
           <a:xfrm>
+            <a:off x="5253137" y="1600200"/>
+            <a:ext cx="2828726" cy="4525963"/>
+          </a:xfrm>
+        </p:spPr>
+      </p:pic>
+    </p:spTree>
+    <p:extLst>
+      <p:ext uri="{BB962C8B-B14F-4D97-AF65-F5344CB8AC3E}">
+        <p14:creationId xmlns:p14="http://schemas.microsoft.com/office/powerpoint/2010/main" val="3448264058"/>
+      </p:ext>
+    </p:extLst>
+  </p:cSld>
+  <p:clrMapOvr>
+    <a:masterClrMapping/>
+  </p:clrMapOvr>
+  <mc:AlternateContent xmlns:mc="http://schemas.openxmlformats.org/markup-compatibility/2006" xmlns:p14="http://schemas.microsoft.com/office/powerpoint/2010/main">
+    <mc:Choice Requires="p14">
+      <p:transition p14:dur="150">
+        <p:fade/>
+      </p:transition>
+    </mc:Choice>
+    <mc:Fallback xmlns="">
+      <p:transition>
+        <p:fade/>
+      </p:transition>
+    </mc:Fallback>
+  </mc:AlternateContent>
+  <p:timing>
+    <p:tnLst>
+      <p:par>
+        <p:cTn id="1" dur="indefinite" restart="never" nodeType="tmRoot"/>
+      </p:par>
+    </p:tnLst>
+  </p:timing>
+</p:sld>
+</file>
+
+<file path=ppt/slides/slide11.xml><?xml version="1.0" encoding="utf-8"?>
+<p:sld xmlns:a="http://schemas.openxmlformats.org/drawingml/2006/main" xmlns:r="http://schemas.openxmlformats.org/officeDocument/2006/relationships" xmlns:p="http://schemas.openxmlformats.org/presentationml/2006/main">
+  <p:cSld>
+    <p:spTree>
+      <p:nvGrpSpPr>
+        <p:cNvPr id="1" name=""/>
+        <p:cNvGrpSpPr/>
+        <p:nvPr/>
+      </p:nvGrpSpPr>
+      <p:grpSpPr>
+        <a:xfrm>
+          <a:off x="0" y="0"/>
+          <a:ext cx="0" cy="0"/>
+          <a:chOff x="0" y="0"/>
+          <a:chExt cx="0" cy="0"/>
+        </a:xfrm>
+      </p:grpSpPr>
+      <p:sp>
+        <p:nvSpPr>
+          <p:cNvPr id="2" name="Title 1"/>
+          <p:cNvSpPr>
+            <a:spLocks noGrp="1"/>
+          </p:cNvSpPr>
+          <p:nvPr>
+            <p:ph type="title"/>
+          </p:nvPr>
+        </p:nvSpPr>
+        <p:spPr/>
+        <p:txBody>
+          <a:bodyPr/>
+          <a:lstStyle/>
+          <a:p>
+            <a:r>
+              <a:rPr lang="en-US" dirty="0" smtClean="0"/>
+              <a:t>Technology in Fish ‘n’ Spots</a:t>
+            </a:r>
+            <a:endParaRPr lang="en-US" dirty="0"/>
+          </a:p>
+        </p:txBody>
+      </p:sp>
+      <p:pic>
+        <p:nvPicPr>
+          <p:cNvPr id="7" name="Content Placeholder 6"/>
+          <p:cNvPicPr>
+            <a:picLocks noGrp="1" noChangeAspect="1"/>
+          </p:cNvPicPr>
+          <p:nvPr>
+            <p:ph sz="half" idx="1"/>
+          </p:nvPr>
+        </p:nvPicPr>
+        <p:blipFill>
+          <a:blip r:embed="rId2" cstate="print">
+            <a:extLst>
+              <a:ext uri="{28A0092B-C50C-407E-A947-70E740481C1C}">
+                <a14:useLocalDpi xmlns:a14="http://schemas.microsoft.com/office/drawing/2010/main" val="0"/>
+              </a:ext>
+            </a:extLst>
+          </a:blip>
+          <a:stretch>
+            <a:fillRect/>
+          </a:stretch>
+        </p:blipFill>
+        <p:spPr>
+          <a:xfrm>
+            <a:off x="560428" y="1600200"/>
+            <a:ext cx="3832143" cy="4525963"/>
+          </a:xfrm>
+        </p:spPr>
+      </p:pic>
+      <p:sp>
+        <p:nvSpPr>
+          <p:cNvPr id="4" name="Content Placeholder 3"/>
+          <p:cNvSpPr>
+            <a:spLocks noGrp="1"/>
+          </p:cNvSpPr>
+          <p:nvPr>
+            <p:ph sz="half" idx="2"/>
+          </p:nvPr>
+        </p:nvSpPr>
+        <p:spPr/>
+        <p:txBody>
+          <a:bodyPr>
+            <a:normAutofit fontScale="92500" lnSpcReduction="20000"/>
+          </a:bodyPr>
+          <a:lstStyle/>
+          <a:p>
+            <a:r>
+              <a:rPr lang="en-US" dirty="0"/>
+              <a:t>Built for Android v4.0 (Ice Cream Sandwich) and above</a:t>
+            </a:r>
+          </a:p>
+          <a:p>
+            <a:r>
+              <a:rPr lang="en-US" dirty="0" smtClean="0"/>
+              <a:t>Uses the Fragment class</a:t>
+            </a:r>
+          </a:p>
+          <a:p>
+            <a:pPr lvl="1"/>
+            <a:r>
+              <a:rPr lang="en-US" dirty="0" smtClean="0"/>
+              <a:t>This means that it works awesomely (and differently) on devices with bigger screens</a:t>
+            </a:r>
+          </a:p>
+          <a:p>
+            <a:r>
+              <a:rPr lang="en-US" dirty="0" smtClean="0"/>
+              <a:t>Uses the Google Maps SDK to show a satellite view of saved locations</a:t>
+            </a:r>
+          </a:p>
+          <a:p>
+            <a:r>
+              <a:rPr lang="en-US" dirty="0" smtClean="0"/>
+              <a:t>SQLite is used to store the list of locations</a:t>
+            </a:r>
+            <a:endParaRPr lang="en-US" dirty="0"/>
+          </a:p>
+        </p:txBody>
+      </p:sp>
+    </p:spTree>
+    <p:extLst>
+      <p:ext uri="{BB962C8B-B14F-4D97-AF65-F5344CB8AC3E}">
+        <p14:creationId xmlns:p14="http://schemas.microsoft.com/office/powerpoint/2010/main" val="3951424718"/>
+      </p:ext>
+    </p:extLst>
+  </p:cSld>
+  <p:clrMapOvr>
+    <a:masterClrMapping/>
+  </p:clrMapOvr>
+  <mc:AlternateContent xmlns:mc="http://schemas.openxmlformats.org/markup-compatibility/2006" xmlns:p14="http://schemas.microsoft.com/office/powerpoint/2010/main">
+    <mc:Choice Requires="p14">
+      <p:transition p14:dur="150">
+        <p:fade/>
+      </p:transition>
+    </mc:Choice>
+    <mc:Fallback xmlns="">
+      <p:transition>
+        <p:fade/>
+      </p:transition>
+    </mc:Fallback>
+  </mc:AlternateContent>
+  <p:timing>
+    <p:tnLst>
+      <p:par>
+        <p:cTn id="1" dur="indefinite" restart="never" nodeType="tmRoot"/>
+      </p:par>
+    </p:tnLst>
+  </p:timing>
+</p:sld>
+</file>
+
+<file path=ppt/slides/slide12.xml><?xml version="1.0" encoding="utf-8"?>
+<p:sld xmlns:a="http://schemas.openxmlformats.org/drawingml/2006/main" xmlns:r="http://schemas.openxmlformats.org/officeDocument/2006/relationships" xmlns:p="http://schemas.openxmlformats.org/presentationml/2006/main">
+  <p:cSld>
+    <p:spTree>
+      <p:nvGrpSpPr>
+        <p:cNvPr id="1" name=""/>
+        <p:cNvGrpSpPr/>
+        <p:nvPr/>
+      </p:nvGrpSpPr>
+      <p:grpSpPr>
+        <a:xfrm>
+          <a:off x="0" y="0"/>
+          <a:ext cx="0" cy="0"/>
+          <a:chOff x="0" y="0"/>
+          <a:chExt cx="0" cy="0"/>
+        </a:xfrm>
+      </p:grpSpPr>
+      <p:sp>
+        <p:nvSpPr>
+          <p:cNvPr id="2" name="Title 1"/>
+          <p:cNvSpPr>
+            <a:spLocks noGrp="1"/>
+          </p:cNvSpPr>
+          <p:nvPr>
+            <p:ph type="title"/>
+          </p:nvPr>
+        </p:nvSpPr>
+        <p:spPr/>
+        <p:txBody>
+          <a:bodyPr>
+            <a:normAutofit fontScale="90000"/>
+          </a:bodyPr>
+          <a:lstStyle/>
+          <a:p>
+            <a:r>
+              <a:rPr lang="en-US" dirty="0" smtClean="0"/>
+              <a:t>Screenshots of Fish ‘n’ Spots</a:t>
+            </a:r>
+            <a:endParaRPr lang="en-US" dirty="0"/>
+          </a:p>
+        </p:txBody>
+      </p:sp>
+      <p:sp>
+        <p:nvSpPr>
+          <p:cNvPr id="3" name="Text Placeholder 2"/>
+          <p:cNvSpPr>
+            <a:spLocks noGrp="1"/>
+          </p:cNvSpPr>
+          <p:nvPr>
+            <p:ph type="body" idx="1"/>
+          </p:nvPr>
+        </p:nvSpPr>
+        <p:spPr/>
+        <p:txBody>
+          <a:bodyPr/>
+          <a:lstStyle/>
+          <a:p>
+            <a:r>
+              <a:rPr lang="en-US" smtClean="0"/>
+              <a:t>location list (phone)</a:t>
+            </a:r>
+            <a:endParaRPr lang="en-US" dirty="0"/>
+          </a:p>
+        </p:txBody>
+      </p:sp>
+      <p:pic>
+        <p:nvPicPr>
+          <p:cNvPr id="7" name="Content Placeholder 6"/>
+          <p:cNvPicPr>
+            <a:picLocks noGrp="1" noChangeAspect="1"/>
+          </p:cNvPicPr>
+          <p:nvPr>
+            <p:ph sz="half" idx="2"/>
+          </p:nvPr>
+        </p:nvPicPr>
+        <p:blipFill>
+          <a:blip r:embed="rId2" cstate="print">
+            <a:extLst>
+              <a:ext uri="{28A0092B-C50C-407E-A947-70E740481C1C}">
+                <a14:useLocalDpi xmlns:a14="http://schemas.microsoft.com/office/drawing/2010/main" val="0"/>
+              </a:ext>
+            </a:extLst>
+          </a:blip>
+          <a:stretch>
+            <a:fillRect/>
+          </a:stretch>
+        </p:blipFill>
+        <p:spPr>
+          <a:xfrm>
+            <a:off x="1365466" y="2425786"/>
+            <a:ext cx="2223655" cy="3952702"/>
+          </a:xfrm>
+        </p:spPr>
+      </p:pic>
+      <p:sp>
+        <p:nvSpPr>
+          <p:cNvPr id="5" name="Text Placeholder 4"/>
+          <p:cNvSpPr>
+            <a:spLocks noGrp="1"/>
+          </p:cNvSpPr>
+          <p:nvPr>
+            <p:ph type="body" sz="quarter" idx="3"/>
+          </p:nvPr>
+        </p:nvSpPr>
+        <p:spPr/>
+        <p:txBody>
+          <a:bodyPr/>
+          <a:lstStyle/>
+          <a:p>
+            <a:r>
+              <a:rPr lang="en-US" smtClean="0"/>
+              <a:t>location list (tablet)</a:t>
+            </a:r>
+            <a:endParaRPr lang="en-US" dirty="0"/>
+          </a:p>
+        </p:txBody>
+      </p:sp>
+      <p:pic>
+        <p:nvPicPr>
+          <p:cNvPr id="8" name="Content Placeholder 7"/>
+          <p:cNvPicPr>
+            <a:picLocks noGrp="1" noChangeAspect="1"/>
+          </p:cNvPicPr>
+          <p:nvPr>
+            <p:ph sz="quarter" idx="4"/>
+          </p:nvPr>
+        </p:nvPicPr>
+        <p:blipFill>
+          <a:blip r:embed="rId3" cstate="print">
+            <a:extLst>
+              <a:ext uri="{28A0092B-C50C-407E-A947-70E740481C1C}">
+                <a14:useLocalDpi xmlns:a14="http://schemas.microsoft.com/office/drawing/2010/main" val="0"/>
+              </a:ext>
+            </a:extLst>
+          </a:blip>
+          <a:stretch>
+            <a:fillRect/>
+          </a:stretch>
+        </p:blipFill>
+        <p:spPr>
+          <a:xfrm>
+            <a:off x="5321498" y="2251075"/>
+            <a:ext cx="2688828" cy="4302125"/>
+          </a:xfrm>
+        </p:spPr>
+      </p:pic>
+    </p:spTree>
+    <p:extLst>
+      <p:ext uri="{BB962C8B-B14F-4D97-AF65-F5344CB8AC3E}">
+        <p14:creationId xmlns:p14="http://schemas.microsoft.com/office/powerpoint/2010/main" val="2020334194"/>
+      </p:ext>
+    </p:extLst>
+  </p:cSld>
+  <p:clrMapOvr>
+    <a:masterClrMapping/>
+  </p:clrMapOvr>
+  <mc:AlternateContent xmlns:mc="http://schemas.openxmlformats.org/markup-compatibility/2006" xmlns:p14="http://schemas.microsoft.com/office/powerpoint/2010/main">
+    <mc:Choice Requires="p14">
+      <p:transition p14:dur="150">
+        <p:fade/>
+      </p:transition>
+    </mc:Choice>
+    <mc:Fallback xmlns="">
+      <p:transition>
+        <p:fade/>
+      </p:transition>
+    </mc:Fallback>
+  </mc:AlternateContent>
+  <p:timing>
+    <p:tnLst>
+      <p:par>
+        <p:cTn id="1" dur="indefinite" restart="never" nodeType="tmRoot"/>
+      </p:par>
+    </p:tnLst>
+  </p:timing>
+</p:sld>
+</file>
+
+<file path=ppt/slides/slide13.xml><?xml version="1.0" encoding="utf-8"?>
+<p:sld xmlns:a="http://schemas.openxmlformats.org/drawingml/2006/main" xmlns:r="http://schemas.openxmlformats.org/officeDocument/2006/relationships" xmlns:p="http://schemas.openxmlformats.org/presentationml/2006/main">
+  <p:cSld>
+    <p:spTree>
+      <p:nvGrpSpPr>
+        <p:cNvPr id="1" name=""/>
+        <p:cNvGrpSpPr/>
+        <p:nvPr/>
+      </p:nvGrpSpPr>
+      <p:grpSpPr>
+        <a:xfrm>
+          <a:off x="0" y="0"/>
+          <a:ext cx="0" cy="0"/>
+          <a:chOff x="0" y="0"/>
+          <a:chExt cx="0" cy="0"/>
+        </a:xfrm>
+      </p:grpSpPr>
+      <p:sp>
+        <p:nvSpPr>
+          <p:cNvPr id="2" name="Title 1"/>
+          <p:cNvSpPr>
+            <a:spLocks noGrp="1"/>
+          </p:cNvSpPr>
+          <p:nvPr>
+            <p:ph type="title"/>
+          </p:nvPr>
+        </p:nvSpPr>
+        <p:spPr/>
+        <p:txBody>
+          <a:bodyPr>
+            <a:normAutofit fontScale="90000"/>
+          </a:bodyPr>
+          <a:lstStyle/>
+          <a:p>
+            <a:r>
+              <a:rPr lang="en-US" smtClean="0"/>
+              <a:t>Screenshots of Fish ‘n’ Spots</a:t>
+            </a:r>
+            <a:endParaRPr lang="en-US" dirty="0"/>
+          </a:p>
+        </p:txBody>
+      </p:sp>
+      <p:sp>
+        <p:nvSpPr>
+          <p:cNvPr id="3" name="Text Placeholder 2"/>
+          <p:cNvSpPr>
+            <a:spLocks noGrp="1"/>
+          </p:cNvSpPr>
+          <p:nvPr>
+            <p:ph type="body" idx="1"/>
+          </p:nvPr>
+        </p:nvSpPr>
+        <p:spPr/>
+        <p:txBody>
+          <a:bodyPr/>
+          <a:lstStyle/>
+          <a:p>
+            <a:r>
+              <a:rPr lang="en-US" smtClean="0"/>
+              <a:t>creating a location (phone)</a:t>
+            </a:r>
+            <a:endParaRPr lang="en-US" dirty="0"/>
+          </a:p>
+        </p:txBody>
+      </p:sp>
+      <p:pic>
+        <p:nvPicPr>
+          <p:cNvPr id="7" name="Content Placeholder 6"/>
+          <p:cNvPicPr>
+            <a:picLocks noGrp="1" noChangeAspect="1"/>
+          </p:cNvPicPr>
+          <p:nvPr>
+            <p:ph sz="half" idx="2"/>
+          </p:nvPr>
+        </p:nvPicPr>
+        <p:blipFill>
+          <a:blip r:embed="rId2" cstate="print">
+            <a:extLst>
+              <a:ext uri="{28A0092B-C50C-407E-A947-70E740481C1C}">
+                <a14:useLocalDpi xmlns:a14="http://schemas.microsoft.com/office/drawing/2010/main" val="0"/>
+              </a:ext>
+            </a:extLst>
+          </a:blip>
+          <a:stretch>
+            <a:fillRect/>
+          </a:stretch>
+        </p:blipFill>
+        <p:spPr>
+          <a:xfrm>
+            <a:off x="1365466" y="2425786"/>
+            <a:ext cx="2223655" cy="3952702"/>
+          </a:xfrm>
+        </p:spPr>
+      </p:pic>
+      <p:sp>
+        <p:nvSpPr>
+          <p:cNvPr id="5" name="Text Placeholder 4"/>
+          <p:cNvSpPr>
+            <a:spLocks noGrp="1"/>
+          </p:cNvSpPr>
+          <p:nvPr>
+            <p:ph type="body" sz="quarter" idx="3"/>
+          </p:nvPr>
+        </p:nvSpPr>
+        <p:spPr/>
+        <p:txBody>
+          <a:bodyPr/>
+          <a:lstStyle/>
+          <a:p>
+            <a:r>
+              <a:rPr lang="en-US" smtClean="0"/>
+              <a:t>deleting a location (tablet)</a:t>
+            </a:r>
+            <a:endParaRPr lang="en-US" dirty="0"/>
+          </a:p>
+        </p:txBody>
+      </p:sp>
+      <p:pic>
+        <p:nvPicPr>
+          <p:cNvPr id="8" name="Content Placeholder 7"/>
+          <p:cNvPicPr>
+            <a:picLocks noGrp="1" noChangeAspect="1"/>
+          </p:cNvPicPr>
+          <p:nvPr>
+            <p:ph sz="quarter" idx="4"/>
+          </p:nvPr>
+        </p:nvPicPr>
+        <p:blipFill>
+          <a:blip r:embed="rId3" cstate="print">
+            <a:extLst>
+              <a:ext uri="{28A0092B-C50C-407E-A947-70E740481C1C}">
+                <a14:useLocalDpi xmlns:a14="http://schemas.microsoft.com/office/drawing/2010/main" val="0"/>
+              </a:ext>
+            </a:extLst>
+          </a:blip>
+          <a:stretch>
+            <a:fillRect/>
+          </a:stretch>
+        </p:blipFill>
+        <p:spPr>
+          <a:xfrm>
+            <a:off x="5429334" y="2425691"/>
+            <a:ext cx="2473156" cy="3952892"/>
+          </a:xfrm>
+        </p:spPr>
+      </p:pic>
+    </p:spTree>
+    <p:extLst>
+      <p:ext uri="{BB962C8B-B14F-4D97-AF65-F5344CB8AC3E}">
+        <p14:creationId xmlns:p14="http://schemas.microsoft.com/office/powerpoint/2010/main" val="1633303520"/>
+      </p:ext>
+    </p:extLst>
+  </p:cSld>
+  <p:clrMapOvr>
+    <a:masterClrMapping/>
+  </p:clrMapOvr>
+  <mc:AlternateContent xmlns:mc="http://schemas.openxmlformats.org/markup-compatibility/2006" xmlns:p14="http://schemas.microsoft.com/office/powerpoint/2010/main">
+    <mc:Choice Requires="p14">
+      <p:transition p14:dur="150">
+        <p:fade/>
+      </p:transition>
+    </mc:Choice>
+    <mc:Fallback xmlns="">
+      <p:transition>
+        <p:fade/>
+      </p:transition>
+    </mc:Fallback>
+  </mc:AlternateContent>
+  <p:timing>
+    <p:tnLst>
+      <p:par>
+        <p:cTn id="1" dur="indefinite" restart="never" nodeType="tmRoot"/>
+      </p:par>
+    </p:tnLst>
+  </p:timing>
+</p:sld>
+</file>
+
+<file path=ppt/slides/slide14.xml><?xml version="1.0" encoding="utf-8"?>
+<p:sld xmlns:a="http://schemas.openxmlformats.org/drawingml/2006/main" xmlns:r="http://schemas.openxmlformats.org/officeDocument/2006/relationships" xmlns:p="http://schemas.openxmlformats.org/presentationml/2006/main">
+  <p:cSld>
+    <p:spTree>
+      <p:nvGrpSpPr>
+        <p:cNvPr id="1" name=""/>
+        <p:cNvGrpSpPr/>
+        <p:nvPr/>
+      </p:nvGrpSpPr>
+      <p:grpSpPr>
+        <a:xfrm>
+          <a:off x="0" y="0"/>
+          <a:ext cx="0" cy="0"/>
+          <a:chOff x="0" y="0"/>
+          <a:chExt cx="0" cy="0"/>
+        </a:xfrm>
+      </p:grpSpPr>
+      <p:sp>
+        <p:nvSpPr>
+          <p:cNvPr id="2" name="Title 1"/>
+          <p:cNvSpPr>
+            <a:spLocks noGrp="1"/>
+          </p:cNvSpPr>
+          <p:nvPr>
+            <p:ph type="title"/>
+          </p:nvPr>
+        </p:nvSpPr>
+        <p:spPr/>
+        <p:txBody>
+          <a:bodyPr>
+            <a:normAutofit fontScale="90000"/>
+          </a:bodyPr>
+          <a:lstStyle/>
+          <a:p>
+            <a:r>
+              <a:rPr lang="en-US" smtClean="0"/>
+              <a:t>Screenshots of Fish ‘n’ Spots</a:t>
+            </a:r>
+            <a:endParaRPr lang="en-US" dirty="0"/>
+          </a:p>
+        </p:txBody>
+      </p:sp>
+      <p:sp>
+        <p:nvSpPr>
+          <p:cNvPr id="3" name="Text Placeholder 2"/>
+          <p:cNvSpPr>
+            <a:spLocks noGrp="1"/>
+          </p:cNvSpPr>
+          <p:nvPr>
+            <p:ph type="body" idx="1"/>
+          </p:nvPr>
+        </p:nvSpPr>
+        <p:spPr/>
+        <p:txBody>
+          <a:bodyPr/>
+          <a:lstStyle/>
+          <a:p>
+            <a:r>
+              <a:rPr lang="en-US" smtClean="0"/>
+              <a:t>viewing a location (phone)</a:t>
+            </a:r>
+            <a:endParaRPr lang="en-US" dirty="0"/>
+          </a:p>
+        </p:txBody>
+      </p:sp>
+      <p:pic>
+        <p:nvPicPr>
+          <p:cNvPr id="7" name="Content Placeholder 6"/>
+          <p:cNvPicPr>
+            <a:picLocks noGrp="1" noChangeAspect="1"/>
+          </p:cNvPicPr>
+          <p:nvPr>
+            <p:ph sz="half" idx="2"/>
+          </p:nvPr>
+        </p:nvPicPr>
+        <p:blipFill>
+          <a:blip r:embed="rId2" cstate="print">
+            <a:extLst>
+              <a:ext uri="{28A0092B-C50C-407E-A947-70E740481C1C}">
+                <a14:useLocalDpi xmlns:a14="http://schemas.microsoft.com/office/drawing/2010/main" val="0"/>
+              </a:ext>
+            </a:extLst>
+          </a:blip>
+          <a:stretch>
+            <a:fillRect/>
+          </a:stretch>
+        </p:blipFill>
+        <p:spPr>
+          <a:xfrm>
             <a:off x="1365413" y="2425691"/>
             <a:ext cx="2223762" cy="3952892"/>
           </a:xfrm>
@@ -3542,15 +4212,7 @@
           <a:p>
             <a:r>
               <a:rPr lang="en-US" smtClean="0"/>
-              <a:t>viewing a </a:t>
-            </a:r>
-            <a:r>
-              <a:rPr lang="en-US" smtClean="0"/>
-              <a:t>l</a:t>
-            </a:r>
-            <a:r>
-              <a:rPr lang="en-US" smtClean="0"/>
-              <a:t>ocation (tablet)</a:t>
+              <a:t>viewing a location (tablet)</a:t>
             </a:r>
             <a:endParaRPr lang="en-US" dirty="0"/>
           </a:p>
@@ -3617,7 +4279,7 @@
 </p:sld>
 </file>
 
-<file path=ppt/slides/slide11.xml><?xml version="1.0" encoding="utf-8"?>
+<file path=ppt/slides/slide15.xml><?xml version="1.0" encoding="utf-8"?>
 <p:sld xmlns:a="http://schemas.openxmlformats.org/drawingml/2006/main" xmlns:r="http://schemas.openxmlformats.org/officeDocument/2006/relationships" xmlns:p="http://schemas.openxmlformats.org/presentationml/2006/main">
   <p:cSld>
     <p:spTree>
@@ -3742,7 +4404,7 @@
           <a:p>
             <a:r>
               <a:rPr lang="en-US" dirty="0" smtClean="0"/>
-              <a:t>What is our DB used for?</a:t>
+              <a:t>Why Charter Fishing?</a:t>
             </a:r>
             <a:endParaRPr lang="en-US" dirty="0"/>
           </a:p>
@@ -3750,101 +4412,50 @@
       </p:sp>
       <p:sp>
         <p:nvSpPr>
-          <p:cNvPr id="3" name="Content Placeholder 2"/>
-          <p:cNvSpPr>
-            <a:spLocks noGrp="1"/>
-          </p:cNvSpPr>
-          <p:nvPr>
-            <p:ph idx="1"/>
+          <p:cNvPr id="4" name="Content Placeholder 3"/>
+          <p:cNvSpPr>
+            <a:spLocks noGrp="1"/>
+          </p:cNvSpPr>
+          <p:nvPr>
+            <p:ph sz="half" idx="1"/>
           </p:nvPr>
         </p:nvSpPr>
         <p:spPr/>
         <p:txBody>
-          <a:bodyPr>
-            <a:normAutofit fontScale="92500" lnSpcReduction="10000"/>
-          </a:bodyPr>
-          <a:lstStyle/>
-          <a:p>
-            <a:r>
-              <a:rPr lang="en-US" dirty="0" smtClean="0"/>
-              <a:t>Intended for Charter Fishing companies</a:t>
-            </a:r>
-          </a:p>
-          <a:p>
-            <a:r>
-              <a:rPr lang="en-US" dirty="0" smtClean="0"/>
-              <a:t>Stores information about</a:t>
-            </a:r>
-          </a:p>
-          <a:p>
-            <a:pPr lvl="1"/>
-            <a:r>
-              <a:rPr lang="en-US" dirty="0" smtClean="0"/>
-              <a:t>Groups</a:t>
-            </a:r>
-          </a:p>
-          <a:p>
-            <a:pPr lvl="2"/>
-            <a:r>
-              <a:rPr lang="en-US" dirty="0" smtClean="0"/>
-              <a:t>These are customers that want to go fishing</a:t>
-            </a:r>
-          </a:p>
-          <a:p>
-            <a:pPr lvl="1"/>
-            <a:r>
-              <a:rPr lang="en-US" dirty="0" smtClean="0"/>
-              <a:t>Boats</a:t>
-            </a:r>
-          </a:p>
-          <a:p>
-            <a:pPr lvl="1"/>
-            <a:r>
-              <a:rPr lang="en-US" dirty="0" smtClean="0"/>
-              <a:t>Crew Members</a:t>
-            </a:r>
-          </a:p>
-          <a:p>
-            <a:pPr lvl="2"/>
-            <a:r>
-              <a:rPr lang="en-US" dirty="0" smtClean="0"/>
-              <a:t>Captains and skippers</a:t>
-            </a:r>
-          </a:p>
-          <a:p>
-            <a:pPr lvl="1"/>
-            <a:r>
-              <a:rPr lang="en-US" dirty="0" smtClean="0"/>
-              <a:t>Fishing locations</a:t>
-            </a:r>
-          </a:p>
-          <a:p>
-            <a:pPr lvl="1"/>
-            <a:r>
-              <a:rPr lang="en-US" dirty="0" smtClean="0"/>
-              <a:t>Fishing equipment</a:t>
-            </a:r>
-          </a:p>
-          <a:p>
-            <a:pPr lvl="1"/>
-            <a:r>
-              <a:rPr lang="en-US" dirty="0" smtClean="0"/>
-              <a:t>Trips for customers to go on</a:t>
-            </a:r>
-          </a:p>
-          <a:p>
-            <a:pPr lvl="1"/>
-            <a:r>
-              <a:rPr lang="en-US" dirty="0" smtClean="0"/>
-              <a:t>Bunch more!</a:t>
-            </a:r>
+          <a:bodyPr/>
+          <a:lstStyle/>
+          <a:p>
+            <a:r>
+              <a:rPr lang="en-US" dirty="0" smtClean="0"/>
+              <a:t>We both enjoy fishing</a:t>
+            </a:r>
+            <a:endParaRPr lang="en-US" dirty="0"/>
+          </a:p>
+        </p:txBody>
+      </p:sp>
+      <p:sp>
+        <p:nvSpPr>
+          <p:cNvPr id="5" name="Content Placeholder 4"/>
+          <p:cNvSpPr>
+            <a:spLocks noGrp="1"/>
+          </p:cNvSpPr>
+          <p:nvPr>
+            <p:ph sz="half" idx="2"/>
+          </p:nvPr>
+        </p:nvSpPr>
+        <p:spPr/>
+        <p:txBody>
+          <a:bodyPr/>
+          <a:lstStyle/>
+          <a:p>
+            <a:endParaRPr lang="en-US" dirty="0"/>
           </a:p>
         </p:txBody>
       </p:sp>
     </p:spTree>
     <p:extLst>
       <p:ext uri="{BB962C8B-B14F-4D97-AF65-F5344CB8AC3E}">
-        <p14:creationId xmlns:p14="http://schemas.microsoft.com/office/powerpoint/2010/main" val="370417725"/>
+        <p14:creationId xmlns:p14="http://schemas.microsoft.com/office/powerpoint/2010/main" val="3379125149"/>
       </p:ext>
     </p:extLst>
   </p:cSld>
@@ -3863,13 +4474,6 @@
       </p:transition>
     </mc:Fallback>
   </mc:AlternateContent>
-  <p:timing>
-    <p:tnLst>
-      <p:par>
-        <p:cTn id="1" dur="indefinite" restart="never" nodeType="tmRoot"/>
-      </p:par>
-    </p:tnLst>
-  </p:timing>
 </p:sld>
 </file>
 
@@ -3905,7 +4509,11 @@
           <a:bodyPr/>
           <a:lstStyle/>
           <a:p>
-            <a:endParaRPr lang="en-US"/>
+            <a:r>
+              <a:rPr lang="en-US" dirty="0" smtClean="0"/>
+              <a:t>What is our DB used for?</a:t>
+            </a:r>
+            <a:endParaRPr lang="en-US" dirty="0"/>
           </a:p>
         </p:txBody>
       </p:sp>
@@ -3921,17 +4529,91 @@
         </p:nvSpPr>
         <p:spPr/>
         <p:txBody>
-          <a:bodyPr/>
-          <a:lstStyle/>
-          <a:p>
-            <a:endParaRPr lang="en-US"/>
+          <a:bodyPr>
+            <a:normAutofit fontScale="92500" lnSpcReduction="10000"/>
+          </a:bodyPr>
+          <a:lstStyle/>
+          <a:p>
+            <a:r>
+              <a:rPr lang="en-US" dirty="0" smtClean="0"/>
+              <a:t>Intended for Charter Fishing companies</a:t>
+            </a:r>
+          </a:p>
+          <a:p>
+            <a:r>
+              <a:rPr lang="en-US" dirty="0" smtClean="0"/>
+              <a:t>Stores information about</a:t>
+            </a:r>
+          </a:p>
+          <a:p>
+            <a:pPr lvl="1"/>
+            <a:r>
+              <a:rPr lang="en-US" dirty="0" smtClean="0"/>
+              <a:t>Groups</a:t>
+            </a:r>
+          </a:p>
+          <a:p>
+            <a:pPr lvl="2"/>
+            <a:r>
+              <a:rPr lang="en-US" dirty="0" smtClean="0"/>
+              <a:t>These are customers that want to go fishing</a:t>
+            </a:r>
+          </a:p>
+          <a:p>
+            <a:pPr lvl="1"/>
+            <a:r>
+              <a:rPr lang="en-US" dirty="0" smtClean="0"/>
+              <a:t>Boats</a:t>
+            </a:r>
+          </a:p>
+          <a:p>
+            <a:pPr lvl="1"/>
+            <a:r>
+              <a:rPr lang="en-US" dirty="0" smtClean="0"/>
+              <a:t>Crew Members</a:t>
+            </a:r>
+          </a:p>
+          <a:p>
+            <a:pPr lvl="2"/>
+            <a:r>
+              <a:rPr lang="en-US" dirty="0" smtClean="0"/>
+              <a:t>Captains and skippers</a:t>
+            </a:r>
+          </a:p>
+          <a:p>
+            <a:pPr lvl="1"/>
+            <a:r>
+              <a:rPr lang="en-US" dirty="0" smtClean="0"/>
+              <a:t>Fishing locations</a:t>
+            </a:r>
+          </a:p>
+          <a:p>
+            <a:pPr lvl="1"/>
+            <a:r>
+              <a:rPr lang="en-US" dirty="0" smtClean="0"/>
+              <a:t>Fishing equipment</a:t>
+            </a:r>
+          </a:p>
+          <a:p>
+            <a:pPr lvl="1"/>
+            <a:r>
+              <a:rPr lang="en-US" dirty="0" smtClean="0"/>
+              <a:t>Trips for customers to go on</a:t>
+            </a:r>
+          </a:p>
+          <a:p>
+            <a:pPr lvl="1"/>
+            <a:r>
+              <a:rPr lang="en-US" dirty="0" smtClean="0"/>
+              <a:t>Bunch more!</a:t>
+            </a:r>
           </a:p>
         </p:txBody>
       </p:sp>
     </p:spTree>
     <p:extLst>
       <p:ext uri="{BB962C8B-B14F-4D97-AF65-F5344CB8AC3E}">
-        <p14:creationId xmlns:p14="http://schemas.microsoft.com/office/powerpoint/2010/main" val="2817422361"/>
+        <p14:creationId xmlns:p14="http://schemas.microsoft.com/office/powerpoint/2010/main" val="370417725"/>
       </p:ext>
     </p:extLst>
   </p:cSld>
@@ -3989,40 +4671,52 @@
         </p:nvSpPr>
         <p:spPr/>
         <p:txBody>
-          <a:bodyPr/>
-          <a:lstStyle/>
-          <a:p>
-            <a:r>
-              <a:rPr lang="en-US" dirty="0" smtClean="0"/>
-              <a:t>Making it Special</a:t>
+          <a:bodyPr>
+            <a:normAutofit fontScale="90000"/>
+          </a:bodyPr>
+          <a:lstStyle/>
+          <a:p>
+            <a:r>
+              <a:rPr lang="en-US" dirty="0" smtClean="0"/>
+              <a:t>E/R Diagram (quick overview)</a:t>
             </a:r>
             <a:endParaRPr lang="en-US" dirty="0"/>
           </a:p>
         </p:txBody>
       </p:sp>
-      <p:sp>
-        <p:nvSpPr>
-          <p:cNvPr id="3" name="Text Placeholder 2"/>
-          <p:cNvSpPr>
-            <a:spLocks noGrp="1"/>
-          </p:cNvSpPr>
-          <p:nvPr>
-            <p:ph type="body" idx="1"/>
-          </p:nvPr>
-        </p:nvSpPr>
-        <p:spPr/>
-        <p:txBody>
-          <a:bodyPr/>
-          <a:lstStyle/>
-          <a:p>
-            <a:endParaRPr lang="en-US"/>
-          </a:p>
-        </p:txBody>
-      </p:sp>
+      <p:pic>
+        <p:nvPicPr>
+          <p:cNvPr id="5" name="Content Placeholder 4"/>
+          <p:cNvPicPr>
+            <a:picLocks noGrp="1" noChangeAspect="1"/>
+          </p:cNvPicPr>
+          <p:nvPr>
+            <p:ph idx="1"/>
+          </p:nvPr>
+        </p:nvPicPr>
+        <p:blipFill>
+          <a:blip r:embed="rId2" cstate="print">
+            <a:extLst>
+              <a:ext uri="{28A0092B-C50C-407E-A947-70E740481C1C}">
+                <a14:useLocalDpi xmlns:a14="http://schemas.microsoft.com/office/drawing/2010/main" val="0"/>
+              </a:ext>
+            </a:extLst>
+          </a:blip>
+          <a:stretch>
+            <a:fillRect/>
+          </a:stretch>
+        </p:blipFill>
+        <p:spPr>
+          <a:xfrm>
+            <a:off x="1094210" y="1600200"/>
+            <a:ext cx="6955579" cy="4876800"/>
+          </a:xfrm>
+        </p:spPr>
+      </p:pic>
     </p:spTree>
     <p:extLst>
       <p:ext uri="{BB962C8B-B14F-4D97-AF65-F5344CB8AC3E}">
-        <p14:creationId xmlns:p14="http://schemas.microsoft.com/office/powerpoint/2010/main" val="1499921711"/>
+        <p14:creationId xmlns:p14="http://schemas.microsoft.com/office/powerpoint/2010/main" val="2817422361"/>
       </p:ext>
     </p:extLst>
   </p:cSld>
@@ -4085,6 +4779,366 @@
           <a:p>
             <a:r>
               <a:rPr lang="en-US" dirty="0" smtClean="0"/>
+              <a:t>E/R Diagram (zoom in 1)</a:t>
+            </a:r>
+            <a:endParaRPr lang="en-US" dirty="0"/>
+          </a:p>
+        </p:txBody>
+      </p:sp>
+      <p:pic>
+        <p:nvPicPr>
+          <p:cNvPr id="4" name="Content Placeholder 3"/>
+          <p:cNvPicPr>
+            <a:picLocks noGrp="1" noChangeAspect="1"/>
+          </p:cNvPicPr>
+          <p:nvPr>
+            <p:ph sz="half" idx="1"/>
+          </p:nvPr>
+        </p:nvPicPr>
+        <p:blipFill>
+          <a:blip r:embed="rId2" cstate="print">
+            <a:extLst>
+              <a:ext uri="{28A0092B-C50C-407E-A947-70E740481C1C}">
+                <a14:useLocalDpi xmlns:a14="http://schemas.microsoft.com/office/drawing/2010/main" val="0"/>
+              </a:ext>
+            </a:extLst>
+          </a:blip>
+          <a:stretch>
+            <a:fillRect/>
+          </a:stretch>
+        </p:blipFill>
+        <p:spPr>
+          <a:xfrm>
+            <a:off x="665101" y="1828801"/>
+            <a:ext cx="3622798" cy="4419598"/>
+          </a:xfrm>
+        </p:spPr>
+      </p:pic>
+      <p:sp>
+        <p:nvSpPr>
+          <p:cNvPr id="5" name="Content Placeholder 4"/>
+          <p:cNvSpPr>
+            <a:spLocks noGrp="1"/>
+          </p:cNvSpPr>
+          <p:nvPr>
+            <p:ph sz="half" idx="2"/>
+          </p:nvPr>
+        </p:nvSpPr>
+        <p:spPr/>
+        <p:txBody>
+          <a:bodyPr/>
+          <a:lstStyle/>
+          <a:p>
+            <a:endParaRPr lang="en-US" dirty="0"/>
+          </a:p>
+        </p:txBody>
+      </p:sp>
+    </p:spTree>
+    <p:extLst>
+      <p:ext uri="{BB962C8B-B14F-4D97-AF65-F5344CB8AC3E}">
+        <p14:creationId xmlns:p14="http://schemas.microsoft.com/office/powerpoint/2010/main" val="3961838113"/>
+      </p:ext>
+    </p:extLst>
+  </p:cSld>
+  <p:clrMapOvr>
+    <a:masterClrMapping/>
+  </p:clrMapOvr>
+  <mc:AlternateContent xmlns:mc="http://schemas.openxmlformats.org/markup-compatibility/2006" xmlns:p14="http://schemas.microsoft.com/office/powerpoint/2010/main">
+    <mc:Choice Requires="p14">
+      <p:transition p14:dur="150">
+        <p:fade/>
+      </p:transition>
+    </mc:Choice>
+    <mc:Fallback xmlns="">
+      <p:transition>
+        <p:fade/>
+      </p:transition>
+    </mc:Fallback>
+  </mc:AlternateContent>
+  <p:timing>
+    <p:tnLst>
+      <p:par>
+        <p:cTn id="1" dur="indefinite" restart="never" nodeType="tmRoot"/>
+      </p:par>
+    </p:tnLst>
+  </p:timing>
+</p:sld>
+</file>
+
+<file path=ppt/slides/slide6.xml><?xml version="1.0" encoding="utf-8"?>
+<p:sld xmlns:a="http://schemas.openxmlformats.org/drawingml/2006/main" xmlns:r="http://schemas.openxmlformats.org/officeDocument/2006/relationships" xmlns:p="http://schemas.openxmlformats.org/presentationml/2006/main">
+  <p:cSld>
+    <p:spTree>
+      <p:nvGrpSpPr>
+        <p:cNvPr id="1" name=""/>
+        <p:cNvGrpSpPr/>
+        <p:nvPr/>
+      </p:nvGrpSpPr>
+      <p:grpSpPr>
+        <a:xfrm>
+          <a:off x="0" y="0"/>
+          <a:ext cx="0" cy="0"/>
+          <a:chOff x="0" y="0"/>
+          <a:chExt cx="0" cy="0"/>
+        </a:xfrm>
+      </p:grpSpPr>
+      <p:sp>
+        <p:nvSpPr>
+          <p:cNvPr id="2" name="Title 1"/>
+          <p:cNvSpPr>
+            <a:spLocks noGrp="1"/>
+          </p:cNvSpPr>
+          <p:nvPr>
+            <p:ph type="title"/>
+          </p:nvPr>
+        </p:nvSpPr>
+        <p:spPr/>
+        <p:txBody>
+          <a:bodyPr/>
+          <a:lstStyle/>
+          <a:p>
+            <a:r>
+              <a:rPr lang="en-US" dirty="0" smtClean="0"/>
+              <a:t>E/R Diagram (zoom in 2)</a:t>
+            </a:r>
+            <a:endParaRPr lang="en-US" dirty="0"/>
+          </a:p>
+        </p:txBody>
+      </p:sp>
+      <p:pic>
+        <p:nvPicPr>
+          <p:cNvPr id="4" name="Content Placeholder 3"/>
+          <p:cNvPicPr>
+            <a:picLocks noGrp="1" noChangeAspect="1"/>
+          </p:cNvPicPr>
+          <p:nvPr>
+            <p:ph sz="half" idx="1"/>
+          </p:nvPr>
+        </p:nvPicPr>
+        <p:blipFill>
+          <a:blip r:embed="rId2" cstate="print">
+            <a:extLst>
+              <a:ext uri="{28A0092B-C50C-407E-A947-70E740481C1C}">
+                <a14:useLocalDpi xmlns:a14="http://schemas.microsoft.com/office/drawing/2010/main" val="0"/>
+              </a:ext>
+            </a:extLst>
+          </a:blip>
+          <a:stretch>
+            <a:fillRect/>
+          </a:stretch>
+        </p:blipFill>
+        <p:spPr>
+          <a:xfrm>
+            <a:off x="838199" y="1922914"/>
+            <a:ext cx="3276602" cy="4231372"/>
+          </a:xfrm>
+        </p:spPr>
+      </p:pic>
+      <p:sp>
+        <p:nvSpPr>
+          <p:cNvPr id="5" name="Content Placeholder 4"/>
+          <p:cNvSpPr>
+            <a:spLocks noGrp="1"/>
+          </p:cNvSpPr>
+          <p:nvPr>
+            <p:ph sz="half" idx="2"/>
+          </p:nvPr>
+        </p:nvSpPr>
+        <p:spPr/>
+        <p:txBody>
+          <a:bodyPr/>
+          <a:lstStyle/>
+          <a:p>
+            <a:endParaRPr lang="en-US"/>
+          </a:p>
+        </p:txBody>
+      </p:sp>
+    </p:spTree>
+    <p:extLst>
+      <p:ext uri="{BB962C8B-B14F-4D97-AF65-F5344CB8AC3E}">
+        <p14:creationId xmlns:p14="http://schemas.microsoft.com/office/powerpoint/2010/main" val="152845798"/>
+      </p:ext>
+    </p:extLst>
+  </p:cSld>
+  <p:clrMapOvr>
+    <a:masterClrMapping/>
+  </p:clrMapOvr>
+  <mc:AlternateContent xmlns:mc="http://schemas.openxmlformats.org/markup-compatibility/2006" xmlns:p14="http://schemas.microsoft.com/office/powerpoint/2010/main">
+    <mc:Choice Requires="p14">
+      <p:transition p14:dur="150">
+        <p:fade/>
+      </p:transition>
+    </mc:Choice>
+    <mc:Fallback xmlns="">
+      <p:transition>
+        <p:fade/>
+      </p:transition>
+    </mc:Fallback>
+  </mc:AlternateContent>
+  <p:timing>
+    <p:tnLst>
+      <p:par>
+        <p:cTn id="1" dur="indefinite" restart="never" nodeType="tmRoot"/>
+      </p:par>
+    </p:tnLst>
+  </p:timing>
+</p:sld>
+</file>
+
+<file path=ppt/slides/slide7.xml><?xml version="1.0" encoding="utf-8"?>
+<p:sld xmlns:a="http://schemas.openxmlformats.org/drawingml/2006/main" xmlns:r="http://schemas.openxmlformats.org/officeDocument/2006/relationships" xmlns:p="http://schemas.openxmlformats.org/presentationml/2006/main">
+  <p:cSld>
+    <p:spTree>
+      <p:nvGrpSpPr>
+        <p:cNvPr id="1" name=""/>
+        <p:cNvGrpSpPr/>
+        <p:nvPr/>
+      </p:nvGrpSpPr>
+      <p:grpSpPr>
+        <a:xfrm>
+          <a:off x="0" y="0"/>
+          <a:ext cx="0" cy="0"/>
+          <a:chOff x="0" y="0"/>
+          <a:chExt cx="0" cy="0"/>
+        </a:xfrm>
+      </p:grpSpPr>
+      <p:sp>
+        <p:nvSpPr>
+          <p:cNvPr id="2" name="Title 1"/>
+          <p:cNvSpPr>
+            <a:spLocks noGrp="1"/>
+          </p:cNvSpPr>
+          <p:nvPr>
+            <p:ph type="title"/>
+          </p:nvPr>
+        </p:nvSpPr>
+        <p:spPr/>
+        <p:txBody>
+          <a:bodyPr/>
+          <a:lstStyle/>
+          <a:p>
+            <a:r>
+              <a:rPr lang="en-US" dirty="0" smtClean="0"/>
+              <a:t>E/R Diagram (zoom in 3)</a:t>
+            </a:r>
+            <a:endParaRPr lang="en-US" dirty="0"/>
+          </a:p>
+        </p:txBody>
+      </p:sp>
+      <p:pic>
+        <p:nvPicPr>
+          <p:cNvPr id="4" name="Content Placeholder 3"/>
+          <p:cNvPicPr>
+            <a:picLocks noGrp="1" noChangeAspect="1"/>
+          </p:cNvPicPr>
+          <p:nvPr>
+            <p:ph sz="half" idx="1"/>
+          </p:nvPr>
+        </p:nvPicPr>
+        <p:blipFill>
+          <a:blip r:embed="rId2" cstate="print">
+            <a:extLst>
+              <a:ext uri="{28A0092B-C50C-407E-A947-70E740481C1C}">
+                <a14:useLocalDpi xmlns:a14="http://schemas.microsoft.com/office/drawing/2010/main" val="0"/>
+              </a:ext>
+            </a:extLst>
+          </a:blip>
+          <a:stretch>
+            <a:fillRect/>
+          </a:stretch>
+        </p:blipFill>
+        <p:spPr>
+          <a:xfrm>
+            <a:off x="356347" y="2362201"/>
+            <a:ext cx="4240306" cy="3352798"/>
+          </a:xfrm>
+        </p:spPr>
+      </p:pic>
+      <p:sp>
+        <p:nvSpPr>
+          <p:cNvPr id="5" name="Content Placeholder 4"/>
+          <p:cNvSpPr>
+            <a:spLocks noGrp="1"/>
+          </p:cNvSpPr>
+          <p:nvPr>
+            <p:ph sz="half" idx="2"/>
+          </p:nvPr>
+        </p:nvSpPr>
+        <p:spPr/>
+        <p:txBody>
+          <a:bodyPr/>
+          <a:lstStyle/>
+          <a:p>
+            <a:endParaRPr lang="en-US"/>
+          </a:p>
+        </p:txBody>
+      </p:sp>
+    </p:spTree>
+    <p:extLst>
+      <p:ext uri="{BB962C8B-B14F-4D97-AF65-F5344CB8AC3E}">
+        <p14:creationId xmlns:p14="http://schemas.microsoft.com/office/powerpoint/2010/main" val="2831425928"/>
+      </p:ext>
+    </p:extLst>
+  </p:cSld>
+  <p:clrMapOvr>
+    <a:masterClrMapping/>
+  </p:clrMapOvr>
+  <mc:AlternateContent xmlns:mc="http://schemas.openxmlformats.org/markup-compatibility/2006" xmlns:p14="http://schemas.microsoft.com/office/powerpoint/2010/main">
+    <mc:Choice Requires="p14">
+      <p:transition p14:dur="150">
+        <p:fade/>
+      </p:transition>
+    </mc:Choice>
+    <mc:Fallback xmlns="">
+      <p:transition>
+        <p:fade/>
+      </p:transition>
+    </mc:Fallback>
+  </mc:AlternateContent>
+  <p:timing>
+    <p:tnLst>
+      <p:par>
+        <p:cTn id="1" dur="indefinite" restart="never" nodeType="tmRoot"/>
+      </p:par>
+    </p:tnLst>
+  </p:timing>
+</p:sld>
+</file>
+
+<file path=ppt/slides/slide8.xml><?xml version="1.0" encoding="utf-8"?>
+<p:sld xmlns:a="http://schemas.openxmlformats.org/drawingml/2006/main" xmlns:r="http://schemas.openxmlformats.org/officeDocument/2006/relationships" xmlns:p="http://schemas.openxmlformats.org/presentationml/2006/main">
+  <p:cSld>
+    <p:spTree>
+      <p:nvGrpSpPr>
+        <p:cNvPr id="1" name=""/>
+        <p:cNvGrpSpPr/>
+        <p:nvPr/>
+      </p:nvGrpSpPr>
+      <p:grpSpPr>
+        <a:xfrm>
+          <a:off x="0" y="0"/>
+          <a:ext cx="0" cy="0"/>
+          <a:chOff x="0" y="0"/>
+          <a:chExt cx="0" cy="0"/>
+        </a:xfrm>
+      </p:grpSpPr>
+      <p:sp>
+        <p:nvSpPr>
+          <p:cNvPr id="2" name="Title 1"/>
+          <p:cNvSpPr>
+            <a:spLocks noGrp="1"/>
+          </p:cNvSpPr>
+          <p:nvPr>
+            <p:ph type="title"/>
+          </p:nvPr>
+        </p:nvSpPr>
+        <p:spPr/>
+        <p:txBody>
+          <a:bodyPr/>
+          <a:lstStyle/>
+          <a:p>
+            <a:r>
+              <a:rPr lang="en-US" dirty="0" smtClean="0"/>
               <a:t>Making it Special</a:t>
             </a:r>
             <a:endParaRPr lang="en-US" dirty="0"/>
@@ -4093,6 +5147,97 @@
       </p:sp>
       <p:sp>
         <p:nvSpPr>
+          <p:cNvPr id="3" name="Text Placeholder 2"/>
+          <p:cNvSpPr>
+            <a:spLocks noGrp="1"/>
+          </p:cNvSpPr>
+          <p:nvPr>
+            <p:ph type="body" idx="1"/>
+          </p:nvPr>
+        </p:nvSpPr>
+        <p:spPr/>
+        <p:txBody>
+          <a:bodyPr/>
+          <a:lstStyle/>
+          <a:p>
+            <a:endParaRPr lang="en-US"/>
+          </a:p>
+        </p:txBody>
+      </p:sp>
+    </p:spTree>
+    <p:extLst>
+      <p:ext uri="{BB962C8B-B14F-4D97-AF65-F5344CB8AC3E}">
+        <p14:creationId xmlns:p14="http://schemas.microsoft.com/office/powerpoint/2010/main" val="1499921711"/>
+      </p:ext>
+    </p:extLst>
+  </p:cSld>
+  <p:clrMapOvr>
+    <a:masterClrMapping/>
+  </p:clrMapOvr>
+  <mc:AlternateContent xmlns:mc="http://schemas.openxmlformats.org/markup-compatibility/2006" xmlns:p14="http://schemas.microsoft.com/office/powerpoint/2010/main">
+    <mc:Choice Requires="p14">
+      <p:transition p14:dur="150">
+        <p:fade/>
+      </p:transition>
+    </mc:Choice>
+    <mc:Fallback xmlns="">
+      <p:transition>
+        <p:fade/>
+      </p:transition>
+    </mc:Fallback>
+  </mc:AlternateContent>
+  <p:timing>
+    <p:tnLst>
+      <p:par>
+        <p:cTn id="1" dur="indefinite" restart="never" nodeType="tmRoot"/>
+      </p:par>
+    </p:tnLst>
+  </p:timing>
+</p:sld>
+</file>
+
+<file path=ppt/slides/slide9.xml><?xml version="1.0" encoding="utf-8"?>
+<p:sld xmlns:a="http://schemas.openxmlformats.org/drawingml/2006/main" xmlns:r="http://schemas.openxmlformats.org/officeDocument/2006/relationships" xmlns:p="http://schemas.openxmlformats.org/presentationml/2006/main">
+  <p:cSld>
+    <p:spTree>
+      <p:nvGrpSpPr>
+        <p:cNvPr id="1" name=""/>
+        <p:cNvGrpSpPr/>
+        <p:nvPr/>
+      </p:nvGrpSpPr>
+      <p:grpSpPr>
+        <a:xfrm>
+          <a:off x="0" y="0"/>
+          <a:ext cx="0" cy="0"/>
+          <a:chOff x="0" y="0"/>
+          <a:chExt cx="0" cy="0"/>
+        </a:xfrm>
+      </p:grpSpPr>
+      <p:sp>
+        <p:nvSpPr>
+          <p:cNvPr id="2" name="Title 1"/>
+          <p:cNvSpPr>
+            <a:spLocks noGrp="1"/>
+          </p:cNvSpPr>
+          <p:nvPr>
+            <p:ph type="title"/>
+          </p:nvPr>
+        </p:nvSpPr>
+        <p:spPr/>
+        <p:txBody>
+          <a:bodyPr/>
+          <a:lstStyle/>
+          <a:p>
+            <a:r>
+              <a:rPr lang="en-US" dirty="0" smtClean="0"/>
+              <a:t>Making it Special</a:t>
+            </a:r>
+            <a:endParaRPr lang="en-US" dirty="0"/>
+          </a:p>
+        </p:txBody>
+      </p:sp>
+      <p:sp>
+        <p:nvSpPr>
           <p:cNvPr id="3" name="Content Placeholder 2"/>
           <p:cNvSpPr>
             <a:spLocks noGrp="1"/>
@@ -4103,7 +5248,9 @@
         </p:nvSpPr>
         <p:spPr/>
         <p:txBody>
-          <a:bodyPr/>
+          <a:bodyPr>
+            <a:normAutofit lnSpcReduction="10000"/>
+          </a:bodyPr>
           <a:lstStyle/>
           <a:p>
             <a:r>
@@ -4139,8 +5286,19 @@
             <a:pPr lvl="1"/>
             <a:r>
               <a:rPr lang="en-US" dirty="0" smtClean="0"/>
-              <a:t>We haven’t yet decided what kind of fish that is</a:t>
-            </a:r>
+              <a:t>We haven’t yet decided what kind of fish that </a:t>
+            </a:r>
+            <a:r>
+              <a:rPr lang="en-US" dirty="0" smtClean="0"/>
+              <a:t>is</a:t>
+            </a:r>
+          </a:p>
+          <a:p>
+            <a:r>
+              <a:rPr lang="en-US" dirty="0" smtClean="0"/>
+              <a:t>And it’s open source on GitHub</a:t>
+            </a:r>
+            <a:endParaRPr lang="en-US" dirty="0" smtClean="0"/>
           </a:p>
         </p:txBody>
       </p:sp>
@@ -4327,673 +5485,6 @@
             </p:seq>
           </p:childTnLst>
         </p:cTn>
-      </p:par>
-    </p:tnLst>
-  </p:timing>
-</p:sld>
-</file>
-
-<file path=ppt/slides/slide6.xml><?xml version="1.0" encoding="utf-8"?>
-<p:sld xmlns:a="http://schemas.openxmlformats.org/drawingml/2006/main" xmlns:r="http://schemas.openxmlformats.org/officeDocument/2006/relationships" xmlns:p="http://schemas.openxmlformats.org/presentationml/2006/main">
-  <p:cSld>
-    <p:spTree>
-      <p:nvGrpSpPr>
-        <p:cNvPr id="1" name=""/>
-        <p:cNvGrpSpPr/>
-        <p:nvPr/>
-      </p:nvGrpSpPr>
-      <p:grpSpPr>
-        <a:xfrm>
-          <a:off x="0" y="0"/>
-          <a:ext cx="0" cy="0"/>
-          <a:chOff x="0" y="0"/>
-          <a:chExt cx="0" cy="0"/>
-        </a:xfrm>
-      </p:grpSpPr>
-      <p:sp>
-        <p:nvSpPr>
-          <p:cNvPr id="2" name="Title 1"/>
-          <p:cNvSpPr>
-            <a:spLocks noGrp="1"/>
-          </p:cNvSpPr>
-          <p:nvPr>
-            <p:ph type="title"/>
-          </p:nvPr>
-        </p:nvSpPr>
-        <p:spPr/>
-        <p:txBody>
-          <a:bodyPr/>
-          <a:lstStyle/>
-          <a:p>
-            <a:r>
-              <a:rPr lang="en-US" dirty="0" smtClean="0"/>
-              <a:t>What is Fish ‘n’ Spots?</a:t>
-            </a:r>
-            <a:endParaRPr lang="en-US" dirty="0"/>
-          </a:p>
-        </p:txBody>
-      </p:sp>
-      <p:sp>
-        <p:nvSpPr>
-          <p:cNvPr id="3" name="Content Placeholder 2"/>
-          <p:cNvSpPr>
-            <a:spLocks noGrp="1"/>
-          </p:cNvSpPr>
-          <p:nvPr>
-            <p:ph sz="half" idx="1"/>
-          </p:nvPr>
-        </p:nvSpPr>
-        <p:spPr/>
-        <p:txBody>
-          <a:bodyPr>
-            <a:normAutofit fontScale="92500" lnSpcReduction="10000"/>
-          </a:bodyPr>
-          <a:lstStyle/>
-          <a:p>
-            <a:r>
-              <a:rPr lang="en-US" dirty="0" smtClean="0"/>
-              <a:t>An application that can allow a fisherman to save their current location</a:t>
-            </a:r>
-          </a:p>
-          <a:p>
-            <a:pPr lvl="1"/>
-            <a:r>
-              <a:rPr lang="en-US" dirty="0" smtClean="0"/>
-              <a:t>Location is found using the device’s GPS</a:t>
-            </a:r>
-          </a:p>
-          <a:p>
-            <a:r>
-              <a:rPr lang="en-US" dirty="0" smtClean="0"/>
-              <a:t>Allows angler to build up a list of locations</a:t>
-            </a:r>
-          </a:p>
-          <a:p>
-            <a:pPr lvl="1"/>
-            <a:r>
-              <a:rPr lang="en-US" dirty="0" smtClean="0"/>
-              <a:t>These are their favorite fishing spots!</a:t>
-            </a:r>
-          </a:p>
-          <a:p>
-            <a:r>
-              <a:rPr lang="en-US" dirty="0" smtClean="0"/>
-              <a:t>Shows a Google satellite picture of the </a:t>
-            </a:r>
-            <a:r>
-              <a:rPr lang="en-US" dirty="0" err="1" smtClean="0"/>
-              <a:t>fishin</a:t>
-            </a:r>
-            <a:r>
-              <a:rPr lang="en-US" dirty="0" smtClean="0"/>
-              <a:t>’ spot</a:t>
-            </a:r>
-            <a:endParaRPr lang="en-US" dirty="0"/>
-          </a:p>
-        </p:txBody>
-      </p:sp>
-      <p:pic>
-        <p:nvPicPr>
-          <p:cNvPr id="5" name="Content Placeholder 4"/>
-          <p:cNvPicPr>
-            <a:picLocks noGrp="1" noChangeAspect="1"/>
-          </p:cNvPicPr>
-          <p:nvPr>
-            <p:ph sz="half" idx="2"/>
-          </p:nvPr>
-        </p:nvPicPr>
-        <p:blipFill>
-          <a:blip r:embed="rId2" cstate="print">
-            <a:extLst>
-              <a:ext uri="{28A0092B-C50C-407E-A947-70E740481C1C}">
-                <a14:useLocalDpi xmlns:a14="http://schemas.microsoft.com/office/drawing/2010/main" val="0"/>
-              </a:ext>
-            </a:extLst>
-          </a:blip>
-          <a:stretch>
-            <a:fillRect/>
-          </a:stretch>
-        </p:blipFill>
-        <p:spPr>
-          <a:xfrm>
-            <a:off x="5253137" y="1600200"/>
-            <a:ext cx="2828726" cy="4525963"/>
-          </a:xfrm>
-        </p:spPr>
-      </p:pic>
-    </p:spTree>
-    <p:extLst>
-      <p:ext uri="{BB962C8B-B14F-4D97-AF65-F5344CB8AC3E}">
-        <p14:creationId xmlns:p14="http://schemas.microsoft.com/office/powerpoint/2010/main" val="3448264058"/>
-      </p:ext>
-    </p:extLst>
-  </p:cSld>
-  <p:clrMapOvr>
-    <a:masterClrMapping/>
-  </p:clrMapOvr>
-  <mc:AlternateContent xmlns:mc="http://schemas.openxmlformats.org/markup-compatibility/2006" xmlns:p14="http://schemas.microsoft.com/office/powerpoint/2010/main">
-    <mc:Choice Requires="p14">
-      <p:transition p14:dur="150">
-        <p:fade/>
-      </p:transition>
-    </mc:Choice>
-    <mc:Fallback xmlns="">
-      <p:transition>
-        <p:fade/>
-      </p:transition>
-    </mc:Fallback>
-  </mc:AlternateContent>
-  <p:timing>
-    <p:tnLst>
-      <p:par>
-        <p:cTn id="1" dur="indefinite" restart="never" nodeType="tmRoot"/>
-      </p:par>
-    </p:tnLst>
-  </p:timing>
-</p:sld>
-</file>
-
-<file path=ppt/slides/slide7.xml><?xml version="1.0" encoding="utf-8"?>
-<p:sld xmlns:a="http://schemas.openxmlformats.org/drawingml/2006/main" xmlns:r="http://schemas.openxmlformats.org/officeDocument/2006/relationships" xmlns:p="http://schemas.openxmlformats.org/presentationml/2006/main">
-  <p:cSld>
-    <p:spTree>
-      <p:nvGrpSpPr>
-        <p:cNvPr id="1" name=""/>
-        <p:cNvGrpSpPr/>
-        <p:nvPr/>
-      </p:nvGrpSpPr>
-      <p:grpSpPr>
-        <a:xfrm>
-          <a:off x="0" y="0"/>
-          <a:ext cx="0" cy="0"/>
-          <a:chOff x="0" y="0"/>
-          <a:chExt cx="0" cy="0"/>
-        </a:xfrm>
-      </p:grpSpPr>
-      <p:sp>
-        <p:nvSpPr>
-          <p:cNvPr id="2" name="Title 1"/>
-          <p:cNvSpPr>
-            <a:spLocks noGrp="1"/>
-          </p:cNvSpPr>
-          <p:nvPr>
-            <p:ph type="title"/>
-          </p:nvPr>
-        </p:nvSpPr>
-        <p:spPr/>
-        <p:txBody>
-          <a:bodyPr/>
-          <a:lstStyle/>
-          <a:p>
-            <a:r>
-              <a:rPr lang="en-US" dirty="0" smtClean="0"/>
-              <a:t>Technology in Fish ‘n’ Spots</a:t>
-            </a:r>
-            <a:endParaRPr lang="en-US" dirty="0"/>
-          </a:p>
-        </p:txBody>
-      </p:sp>
-      <p:pic>
-        <p:nvPicPr>
-          <p:cNvPr id="7" name="Content Placeholder 6"/>
-          <p:cNvPicPr>
-            <a:picLocks noGrp="1" noChangeAspect="1"/>
-          </p:cNvPicPr>
-          <p:nvPr>
-            <p:ph sz="half" idx="1"/>
-          </p:nvPr>
-        </p:nvPicPr>
-        <p:blipFill>
-          <a:blip r:embed="rId2" cstate="print">
-            <a:extLst>
-              <a:ext uri="{28A0092B-C50C-407E-A947-70E740481C1C}">
-                <a14:useLocalDpi xmlns:a14="http://schemas.microsoft.com/office/drawing/2010/main" val="0"/>
-              </a:ext>
-            </a:extLst>
-          </a:blip>
-          <a:stretch>
-            <a:fillRect/>
-          </a:stretch>
-        </p:blipFill>
-        <p:spPr>
-          <a:xfrm>
-            <a:off x="560428" y="1600200"/>
-            <a:ext cx="3832143" cy="4525963"/>
-          </a:xfrm>
-        </p:spPr>
-      </p:pic>
-      <p:sp>
-        <p:nvSpPr>
-          <p:cNvPr id="4" name="Content Placeholder 3"/>
-          <p:cNvSpPr>
-            <a:spLocks noGrp="1"/>
-          </p:cNvSpPr>
-          <p:nvPr>
-            <p:ph sz="half" idx="2"/>
-          </p:nvPr>
-        </p:nvSpPr>
-        <p:spPr/>
-        <p:txBody>
-          <a:bodyPr>
-            <a:normAutofit fontScale="92500" lnSpcReduction="20000"/>
-          </a:bodyPr>
-          <a:lstStyle/>
-          <a:p>
-            <a:r>
-              <a:rPr lang="en-US" dirty="0"/>
-              <a:t>Built for Android v4.0 (Ice Cream Sandwich) and above</a:t>
-            </a:r>
-          </a:p>
-          <a:p>
-            <a:r>
-              <a:rPr lang="en-US" dirty="0" smtClean="0"/>
-              <a:t>Uses the Fragment class</a:t>
-            </a:r>
-          </a:p>
-          <a:p>
-            <a:pPr lvl="1"/>
-            <a:r>
-              <a:rPr lang="en-US" dirty="0" smtClean="0"/>
-              <a:t>This means that it works awesomely (and differently) on devices with bigger screens</a:t>
-            </a:r>
-          </a:p>
-          <a:p>
-            <a:r>
-              <a:rPr lang="en-US" dirty="0" smtClean="0"/>
-              <a:t>Uses the Google Maps SDK to show a satellite view of saved locations</a:t>
-            </a:r>
-          </a:p>
-          <a:p>
-            <a:r>
-              <a:rPr lang="en-US" dirty="0" smtClean="0"/>
-              <a:t>SQLite is used to store the list of locations</a:t>
-            </a:r>
-            <a:endParaRPr lang="en-US" dirty="0"/>
-          </a:p>
-        </p:txBody>
-      </p:sp>
-    </p:spTree>
-    <p:extLst>
-      <p:ext uri="{BB962C8B-B14F-4D97-AF65-F5344CB8AC3E}">
-        <p14:creationId xmlns:p14="http://schemas.microsoft.com/office/powerpoint/2010/main" val="3951424718"/>
-      </p:ext>
-    </p:extLst>
-  </p:cSld>
-  <p:clrMapOvr>
-    <a:masterClrMapping/>
-  </p:clrMapOvr>
-  <mc:AlternateContent xmlns:mc="http://schemas.openxmlformats.org/markup-compatibility/2006" xmlns:p14="http://schemas.microsoft.com/office/powerpoint/2010/main">
-    <mc:Choice Requires="p14">
-      <p:transition p14:dur="150">
-        <p:fade/>
-      </p:transition>
-    </mc:Choice>
-    <mc:Fallback xmlns="">
-      <p:transition>
-        <p:fade/>
-      </p:transition>
-    </mc:Fallback>
-  </mc:AlternateContent>
-  <p:timing>
-    <p:tnLst>
-      <p:par>
-        <p:cTn id="1" dur="indefinite" restart="never" nodeType="tmRoot"/>
-      </p:par>
-    </p:tnLst>
-  </p:timing>
-</p:sld>
-</file>
-
-<file path=ppt/slides/slide8.xml><?xml version="1.0" encoding="utf-8"?>
-<p:sld xmlns:a="http://schemas.openxmlformats.org/drawingml/2006/main" xmlns:r="http://schemas.openxmlformats.org/officeDocument/2006/relationships" xmlns:p="http://schemas.openxmlformats.org/presentationml/2006/main">
-  <p:cSld>
-    <p:spTree>
-      <p:nvGrpSpPr>
-        <p:cNvPr id="1" name=""/>
-        <p:cNvGrpSpPr/>
-        <p:nvPr/>
-      </p:nvGrpSpPr>
-      <p:grpSpPr>
-        <a:xfrm>
-          <a:off x="0" y="0"/>
-          <a:ext cx="0" cy="0"/>
-          <a:chOff x="0" y="0"/>
-          <a:chExt cx="0" cy="0"/>
-        </a:xfrm>
-      </p:grpSpPr>
-      <p:sp>
-        <p:nvSpPr>
-          <p:cNvPr id="2" name="Title 1"/>
-          <p:cNvSpPr>
-            <a:spLocks noGrp="1"/>
-          </p:cNvSpPr>
-          <p:nvPr>
-            <p:ph type="title"/>
-          </p:nvPr>
-        </p:nvSpPr>
-        <p:spPr/>
-        <p:txBody>
-          <a:bodyPr>
-            <a:normAutofit fontScale="90000"/>
-          </a:bodyPr>
-          <a:lstStyle/>
-          <a:p>
-            <a:r>
-              <a:rPr lang="en-US" dirty="0" smtClean="0"/>
-              <a:t>Screenshots of Fish ‘n’ Spots</a:t>
-            </a:r>
-            <a:endParaRPr lang="en-US" dirty="0"/>
-          </a:p>
-        </p:txBody>
-      </p:sp>
-      <p:sp>
-        <p:nvSpPr>
-          <p:cNvPr id="3" name="Text Placeholder 2"/>
-          <p:cNvSpPr>
-            <a:spLocks noGrp="1"/>
-          </p:cNvSpPr>
-          <p:nvPr>
-            <p:ph type="body" idx="1"/>
-          </p:nvPr>
-        </p:nvSpPr>
-        <p:spPr/>
-        <p:txBody>
-          <a:bodyPr/>
-          <a:lstStyle/>
-          <a:p>
-            <a:r>
-              <a:rPr lang="en-US" smtClean="0"/>
-              <a:t>location list (phone)</a:t>
-            </a:r>
-            <a:endParaRPr lang="en-US" dirty="0"/>
-          </a:p>
-        </p:txBody>
-      </p:sp>
-      <p:pic>
-        <p:nvPicPr>
-          <p:cNvPr id="7" name="Content Placeholder 6"/>
-          <p:cNvPicPr>
-            <a:picLocks noGrp="1" noChangeAspect="1"/>
-          </p:cNvPicPr>
-          <p:nvPr>
-            <p:ph sz="half" idx="2"/>
-          </p:nvPr>
-        </p:nvPicPr>
-        <p:blipFill>
-          <a:blip r:embed="rId2" cstate="print">
-            <a:extLst>
-              <a:ext uri="{28A0092B-C50C-407E-A947-70E740481C1C}">
-                <a14:useLocalDpi xmlns:a14="http://schemas.microsoft.com/office/drawing/2010/main" val="0"/>
-              </a:ext>
-            </a:extLst>
-          </a:blip>
-          <a:stretch>
-            <a:fillRect/>
-          </a:stretch>
-        </p:blipFill>
-        <p:spPr>
-          <a:xfrm>
-            <a:off x="1365466" y="2425786"/>
-            <a:ext cx="2223655" cy="3952702"/>
-          </a:xfrm>
-        </p:spPr>
-      </p:pic>
-      <p:sp>
-        <p:nvSpPr>
-          <p:cNvPr id="5" name="Text Placeholder 4"/>
-          <p:cNvSpPr>
-            <a:spLocks noGrp="1"/>
-          </p:cNvSpPr>
-          <p:nvPr>
-            <p:ph type="body" sz="quarter" idx="3"/>
-          </p:nvPr>
-        </p:nvSpPr>
-        <p:spPr/>
-        <p:txBody>
-          <a:bodyPr/>
-          <a:lstStyle/>
-          <a:p>
-            <a:r>
-              <a:rPr lang="en-US" smtClean="0"/>
-              <a:t>location list (tablet)</a:t>
-            </a:r>
-            <a:endParaRPr lang="en-US" dirty="0"/>
-          </a:p>
-        </p:txBody>
-      </p:sp>
-      <p:pic>
-        <p:nvPicPr>
-          <p:cNvPr id="8" name="Content Placeholder 7"/>
-          <p:cNvPicPr>
-            <a:picLocks noGrp="1" noChangeAspect="1"/>
-          </p:cNvPicPr>
-          <p:nvPr>
-            <p:ph sz="quarter" idx="4"/>
-          </p:nvPr>
-        </p:nvPicPr>
-        <p:blipFill>
-          <a:blip r:embed="rId3" cstate="print">
-            <a:extLst>
-              <a:ext uri="{28A0092B-C50C-407E-A947-70E740481C1C}">
-                <a14:useLocalDpi xmlns:a14="http://schemas.microsoft.com/office/drawing/2010/main" val="0"/>
-              </a:ext>
-            </a:extLst>
-          </a:blip>
-          <a:stretch>
-            <a:fillRect/>
-          </a:stretch>
-        </p:blipFill>
-        <p:spPr>
-          <a:xfrm>
-            <a:off x="5321498" y="2251075"/>
-            <a:ext cx="2688828" cy="4302125"/>
-          </a:xfrm>
-        </p:spPr>
-      </p:pic>
-    </p:spTree>
-    <p:extLst>
-      <p:ext uri="{BB962C8B-B14F-4D97-AF65-F5344CB8AC3E}">
-        <p14:creationId xmlns:p14="http://schemas.microsoft.com/office/powerpoint/2010/main" val="2020334194"/>
-      </p:ext>
-    </p:extLst>
-  </p:cSld>
-  <p:clrMapOvr>
-    <a:masterClrMapping/>
-  </p:clrMapOvr>
-  <mc:AlternateContent xmlns:mc="http://schemas.openxmlformats.org/markup-compatibility/2006" xmlns:p14="http://schemas.microsoft.com/office/powerpoint/2010/main">
-    <mc:Choice Requires="p14">
-      <p:transition p14:dur="150">
-        <p:fade/>
-      </p:transition>
-    </mc:Choice>
-    <mc:Fallback xmlns="">
-      <p:transition>
-        <p:fade/>
-      </p:transition>
-    </mc:Fallback>
-  </mc:AlternateContent>
-  <p:timing>
-    <p:tnLst>
-      <p:par>
-        <p:cTn id="1" dur="indefinite" restart="never" nodeType="tmRoot"/>
-      </p:par>
-    </p:tnLst>
-  </p:timing>
-</p:sld>
-</file>
-
-<file path=ppt/slides/slide9.xml><?xml version="1.0" encoding="utf-8"?>
-<p:sld xmlns:a="http://schemas.openxmlformats.org/drawingml/2006/main" xmlns:r="http://schemas.openxmlformats.org/officeDocument/2006/relationships" xmlns:p="http://schemas.openxmlformats.org/presentationml/2006/main">
-  <p:cSld>
-    <p:spTree>
-      <p:nvGrpSpPr>
-        <p:cNvPr id="1" name=""/>
-        <p:cNvGrpSpPr/>
-        <p:nvPr/>
-      </p:nvGrpSpPr>
-      <p:grpSpPr>
-        <a:xfrm>
-          <a:off x="0" y="0"/>
-          <a:ext cx="0" cy="0"/>
-          <a:chOff x="0" y="0"/>
-          <a:chExt cx="0" cy="0"/>
-        </a:xfrm>
-      </p:grpSpPr>
-      <p:sp>
-        <p:nvSpPr>
-          <p:cNvPr id="2" name="Title 1"/>
-          <p:cNvSpPr>
-            <a:spLocks noGrp="1"/>
-          </p:cNvSpPr>
-          <p:nvPr>
-            <p:ph type="title"/>
-          </p:nvPr>
-        </p:nvSpPr>
-        <p:spPr/>
-        <p:txBody>
-          <a:bodyPr>
-            <a:normAutofit fontScale="90000"/>
-          </a:bodyPr>
-          <a:lstStyle/>
-          <a:p>
-            <a:r>
-              <a:rPr lang="en-US" smtClean="0"/>
-              <a:t>Screenshots of Fish ‘n’ Spots</a:t>
-            </a:r>
-            <a:endParaRPr lang="en-US" dirty="0"/>
-          </a:p>
-        </p:txBody>
-      </p:sp>
-      <p:sp>
-        <p:nvSpPr>
-          <p:cNvPr id="3" name="Text Placeholder 2"/>
-          <p:cNvSpPr>
-            <a:spLocks noGrp="1"/>
-          </p:cNvSpPr>
-          <p:nvPr>
-            <p:ph type="body" idx="1"/>
-          </p:nvPr>
-        </p:nvSpPr>
-        <p:spPr/>
-        <p:txBody>
-          <a:bodyPr/>
-          <a:lstStyle/>
-          <a:p>
-            <a:r>
-              <a:rPr lang="en-US" smtClean="0"/>
-              <a:t>creating a location (phone)</a:t>
-            </a:r>
-            <a:endParaRPr lang="en-US" dirty="0"/>
-          </a:p>
-        </p:txBody>
-      </p:sp>
-      <p:pic>
-        <p:nvPicPr>
-          <p:cNvPr id="7" name="Content Placeholder 6"/>
-          <p:cNvPicPr>
-            <a:picLocks noGrp="1" noChangeAspect="1"/>
-          </p:cNvPicPr>
-          <p:nvPr>
-            <p:ph sz="half" idx="2"/>
-          </p:nvPr>
-        </p:nvPicPr>
-        <p:blipFill>
-          <a:blip r:embed="rId2" cstate="print">
-            <a:extLst>
-              <a:ext uri="{28A0092B-C50C-407E-A947-70E740481C1C}">
-                <a14:useLocalDpi xmlns:a14="http://schemas.microsoft.com/office/drawing/2010/main" val="0"/>
-              </a:ext>
-            </a:extLst>
-          </a:blip>
-          <a:stretch>
-            <a:fillRect/>
-          </a:stretch>
-        </p:blipFill>
-        <p:spPr>
-          <a:xfrm>
-            <a:off x="1365466" y="2425786"/>
-            <a:ext cx="2223655" cy="3952702"/>
-          </a:xfrm>
-        </p:spPr>
-      </p:pic>
-      <p:sp>
-        <p:nvSpPr>
-          <p:cNvPr id="5" name="Text Placeholder 4"/>
-          <p:cNvSpPr>
-            <a:spLocks noGrp="1"/>
-          </p:cNvSpPr>
-          <p:nvPr>
-            <p:ph type="body" sz="quarter" idx="3"/>
-          </p:nvPr>
-        </p:nvSpPr>
-        <p:spPr/>
-        <p:txBody>
-          <a:bodyPr/>
-          <a:lstStyle/>
-          <a:p>
-            <a:r>
-              <a:rPr lang="en-US" smtClean="0"/>
-              <a:t>deleting a location (tablet)</a:t>
-            </a:r>
-            <a:endParaRPr lang="en-US" dirty="0"/>
-          </a:p>
-        </p:txBody>
-      </p:sp>
-      <p:pic>
-        <p:nvPicPr>
-          <p:cNvPr id="8" name="Content Placeholder 7"/>
-          <p:cNvPicPr>
-            <a:picLocks noGrp="1" noChangeAspect="1"/>
-          </p:cNvPicPr>
-          <p:nvPr>
-            <p:ph sz="quarter" idx="4"/>
-          </p:nvPr>
-        </p:nvPicPr>
-        <p:blipFill>
-          <a:blip r:embed="rId3" cstate="print">
-            <a:extLst>
-              <a:ext uri="{28A0092B-C50C-407E-A947-70E740481C1C}">
-                <a14:useLocalDpi xmlns:a14="http://schemas.microsoft.com/office/drawing/2010/main" val="0"/>
-              </a:ext>
-            </a:extLst>
-          </a:blip>
-          <a:stretch>
-            <a:fillRect/>
-          </a:stretch>
-        </p:blipFill>
-        <p:spPr>
-          <a:xfrm>
-            <a:off x="5429334" y="2425691"/>
-            <a:ext cx="2473156" cy="3952892"/>
-          </a:xfrm>
-        </p:spPr>
-      </p:pic>
-    </p:spTree>
-    <p:extLst>
-      <p:ext uri="{BB962C8B-B14F-4D97-AF65-F5344CB8AC3E}">
-        <p14:creationId xmlns:p14="http://schemas.microsoft.com/office/powerpoint/2010/main" val="1633303520"/>
-      </p:ext>
-    </p:extLst>
-  </p:cSld>
-  <p:clrMapOvr>
-    <a:masterClrMapping/>
-  </p:clrMapOvr>
-  <mc:AlternateContent xmlns:mc="http://schemas.openxmlformats.org/markup-compatibility/2006" xmlns:p14="http://schemas.microsoft.com/office/powerpoint/2010/main">
-    <mc:Choice Requires="p14">
-      <p:transition p14:dur="150">
-        <p:fade/>
-      </p:transition>
-    </mc:Choice>
-    <mc:Fallback xmlns="">
-      <p:transition>
-        <p:fade/>
-      </p:transition>
-    </mc:Fallback>
-  </mc:AlternateContent>
-  <p:timing>
-    <p:tnLst>
-      <p:par>
-        <p:cTn id="1" dur="indefinite" restart="never" nodeType="tmRoot"/>
       </p:par>
     </p:tnLst>
   </p:timing>

</xml_diff>